<commit_message>
[update][vmqloan] Chỉnh sửa model và thêm reference.
</commit_message>
<xml_diff>
--- a/FederatedLearning.pptx
+++ b/FederatedLearning.pptx
@@ -5,8 +5,11 @@
     <p:sldMasterId id="2147483660" r:id="rId1"/>
   </p:sldMasterIdLst>
   <p:notesMasterIdLst>
-    <p:notesMasterId r:id="rId15"/>
+    <p:notesMasterId r:id="rId18"/>
   </p:notesMasterIdLst>
+  <p:handoutMasterIdLst>
+    <p:handoutMasterId r:id="rId19"/>
+  </p:handoutMasterIdLst>
   <p:sldIdLst>
     <p:sldId id="456" r:id="rId2"/>
     <p:sldId id="582" r:id="rId3"/>
@@ -19,8 +22,11 @@
     <p:sldId id="600" r:id="rId10"/>
     <p:sldId id="599" r:id="rId11"/>
     <p:sldId id="589" r:id="rId12"/>
-    <p:sldId id="601" r:id="rId13"/>
-    <p:sldId id="587" r:id="rId14"/>
+    <p:sldId id="604" r:id="rId13"/>
+    <p:sldId id="608" r:id="rId14"/>
+    <p:sldId id="601" r:id="rId15"/>
+    <p:sldId id="609" r:id="rId16"/>
+    <p:sldId id="587" r:id="rId17"/>
   </p:sldIdLst>
   <p:sldSz cx="9144000" cy="6858000" type="screen4x3"/>
   <p:notesSz cx="6858000" cy="9144000"/>
@@ -122,6 +128,9 @@
   <p:extLst>
     <p:ext uri="{EFAFB233-063F-42B5-8137-9DF3F51BA10A}">
       <p15:sldGuideLst xmlns:p15="http://schemas.microsoft.com/office/powerpoint/2012/main"/>
+    </p:ext>
+    <p:ext uri="{2D200454-40CA-4A62-9FC3-DE9A4176ACB9}">
+      <p15:notesGuideLst xmlns:p15="http://schemas.microsoft.com/office/powerpoint/2012/main"/>
     </p:ext>
   </p:extLst>
 </p:presentation>
@@ -2647,6 +2656,158 @@
 </pc:chgInfo>
 </file>
 
+<file path=ppt/handoutMasters/handoutMaster1.xml><?xml version="1.0" encoding="utf-8"?>
+<p:handoutMaster xmlns:a="http://schemas.openxmlformats.org/drawingml/2006/main" xmlns:r="http://schemas.openxmlformats.org/officeDocument/2006/relationships" xmlns:p="http://schemas.openxmlformats.org/presentationml/2006/main">
+  <p:cSld>
+    <p:bg>
+      <p:bgRef idx="1001">
+        <a:schemeClr val="bg1"/>
+      </p:bgRef>
+    </p:bg>
+    <p:spTree>
+      <p:nvGrpSpPr>
+        <p:cNvPr id="1" name=""/>
+        <p:cNvGrpSpPr/>
+        <p:nvPr/>
+      </p:nvGrpSpPr>
+      <p:grpSpPr>
+        <a:xfrm>
+          <a:off x="0" y="0"/>
+          <a:ext cx="0" cy="0"/>
+          <a:chOff x="0" y="0"/>
+          <a:chExt cx="0" cy="0"/>
+        </a:xfrm>
+      </p:grpSpPr>
+      <p:sp>
+        <p:nvSpPr>
+          <p:cNvPr id="2" name="Header Placeholder 1">
+            <a:extLst>
+              <a:ext uri="{FF2B5EF4-FFF2-40B4-BE49-F238E27FC236}">
+                <a16:creationId xmlns:a16="http://schemas.microsoft.com/office/drawing/2014/main" id="{6B794E61-476D-CE9E-3735-49C2164E177F}"/>
+              </a:ext>
+            </a:extLst>
+          </p:cNvPr>
+          <p:cNvSpPr>
+            <a:spLocks noGrp="1"/>
+          </p:cNvSpPr>
+          <p:nvPr>
+            <p:ph type="hdr" sz="quarter"/>
+          </p:nvPr>
+        </p:nvSpPr>
+        <p:spPr>
+          <a:xfrm>
+            <a:off x="0" y="0"/>
+            <a:ext cx="2971800" cy="458788"/>
+          </a:xfrm>
+          <a:prstGeom prst="rect">
+            <a:avLst/>
+          </a:prstGeom>
+        </p:spPr>
+        <p:txBody>
+          <a:bodyPr vert="horz" lIns="91440" tIns="45720" rIns="91440" bIns="45720" rtlCol="0"/>
+          <a:lstStyle>
+            <a:lvl1pPr algn="l">
+              <a:defRPr sz="1200"/>
+            </a:lvl1pPr>
+          </a:lstStyle>
+          <a:p>
+            <a:endParaRPr lang="en-US"/>
+          </a:p>
+        </p:txBody>
+      </p:sp>
+      <p:sp>
+        <p:nvSpPr>
+          <p:cNvPr id="3" name="Date Placeholder 2">
+            <a:extLst>
+              <a:ext uri="{FF2B5EF4-FFF2-40B4-BE49-F238E27FC236}">
+                <a16:creationId xmlns:a16="http://schemas.microsoft.com/office/drawing/2014/main" id="{E294E8B9-013E-6FC9-2BC5-789D86C3ACA0}"/>
+              </a:ext>
+            </a:extLst>
+          </p:cNvPr>
+          <p:cNvSpPr>
+            <a:spLocks noGrp="1"/>
+          </p:cNvSpPr>
+          <p:nvPr>
+            <p:ph type="dt" sz="quarter" idx="1"/>
+          </p:nvPr>
+        </p:nvSpPr>
+        <p:spPr>
+          <a:xfrm>
+            <a:off x="3884613" y="0"/>
+            <a:ext cx="2971800" cy="458788"/>
+          </a:xfrm>
+          <a:prstGeom prst="rect">
+            <a:avLst/>
+          </a:prstGeom>
+        </p:spPr>
+        <p:txBody>
+          <a:bodyPr vert="horz" lIns="91440" tIns="45720" rIns="91440" bIns="45720" rtlCol="0"/>
+          <a:lstStyle>
+            <a:lvl1pPr algn="r">
+              <a:defRPr sz="1200"/>
+            </a:lvl1pPr>
+          </a:lstStyle>
+          <a:p>
+            <a:fld id="{72A4000B-0CD0-4277-A3E0-0455A8F07DD0}" type="datetimeFigureOut">
+              <a:rPr lang="en-US" smtClean="0"/>
+              <a:t>12/8/2024</a:t>
+            </a:fld>
+            <a:endParaRPr lang="en-US"/>
+          </a:p>
+        </p:txBody>
+      </p:sp>
+      <p:sp>
+        <p:nvSpPr>
+          <p:cNvPr id="5" name="Slide Number Placeholder 4">
+            <a:extLst>
+              <a:ext uri="{FF2B5EF4-FFF2-40B4-BE49-F238E27FC236}">
+                <a16:creationId xmlns:a16="http://schemas.microsoft.com/office/drawing/2014/main" id="{A125E121-C26F-1374-C3B0-3595B216C8C9}"/>
+              </a:ext>
+            </a:extLst>
+          </p:cNvPr>
+          <p:cNvSpPr>
+            <a:spLocks noGrp="1"/>
+          </p:cNvSpPr>
+          <p:nvPr>
+            <p:ph type="sldNum" sz="quarter" idx="3"/>
+          </p:nvPr>
+        </p:nvSpPr>
+        <p:spPr>
+          <a:xfrm>
+            <a:off x="3884613" y="8685213"/>
+            <a:ext cx="2971800" cy="458787"/>
+          </a:xfrm>
+          <a:prstGeom prst="rect">
+            <a:avLst/>
+          </a:prstGeom>
+        </p:spPr>
+        <p:txBody>
+          <a:bodyPr vert="horz" lIns="91440" tIns="45720" rIns="91440" bIns="45720" rtlCol="0" anchor="b"/>
+          <a:lstStyle>
+            <a:lvl1pPr algn="r">
+              <a:defRPr sz="1200"/>
+            </a:lvl1pPr>
+          </a:lstStyle>
+          <a:p>
+            <a:fld id="{977E1523-1EE5-4F4A-9F3A-BAC054EE23AD}" type="slidenum">
+              <a:rPr lang="en-US" smtClean="0"/>
+              <a:t>‹#›</a:t>
+            </a:fld>
+            <a:endParaRPr lang="en-US"/>
+          </a:p>
+        </p:txBody>
+      </p:sp>
+    </p:spTree>
+    <p:extLst>
+      <p:ext uri="{BB962C8B-B14F-4D97-AF65-F5344CB8AC3E}">
+        <p14:creationId xmlns:p14="http://schemas.microsoft.com/office/powerpoint/2010/main" val="4230127649"/>
+      </p:ext>
+    </p:extLst>
+  </p:cSld>
+  <p:clrMap bg1="lt1" tx1="dk1" bg2="lt2" tx2="dk2" accent1="accent1" accent2="accent2" accent3="accent3" accent4="accent4" accent5="accent5" accent6="accent6" hlink="hlink" folHlink="folHlink"/>
+</p:handoutMaster>
+</file>
+
 <file path=ppt/notesMasters/notesMaster1.xml><?xml version="1.0" encoding="utf-8"?>
 <p:notesMaster xmlns:a="http://schemas.openxmlformats.org/drawingml/2006/main" xmlns:r="http://schemas.openxmlformats.org/officeDocument/2006/relationships" xmlns:p="http://schemas.openxmlformats.org/presentationml/2006/main">
   <p:cSld>
@@ -3984,114 +4145,6 @@
           <a:p>
             <a:pPr marL="1200120" algn="ctr"/>
             <a:r>
-              <a:rPr lang="en-US" sz="1200" b="0" i="1" dirty="0" err="1">
-                <a:solidFill>
-                  <a:schemeClr val="bg1"/>
-                </a:solidFill>
-                <a:latin typeface="Arial Nova Cond" panose="020B0506020202020204" pitchFamily="34" charset="0"/>
-              </a:rPr>
-              <a:t>Báo</a:t>
-            </a:r>
-            <a:r>
-              <a:rPr lang="en-US" sz="1200" b="0" i="1" dirty="0">
-                <a:solidFill>
-                  <a:schemeClr val="bg1"/>
-                </a:solidFill>
-                <a:latin typeface="Arial Nova Cond" panose="020B0506020202020204" pitchFamily="34" charset="0"/>
-              </a:rPr>
-              <a:t> </a:t>
-            </a:r>
-            <a:r>
-              <a:rPr lang="en-US" sz="1200" b="0" i="1" dirty="0" err="1">
-                <a:solidFill>
-                  <a:schemeClr val="bg1"/>
-                </a:solidFill>
-                <a:latin typeface="Arial Nova Cond" panose="020B0506020202020204" pitchFamily="34" charset="0"/>
-              </a:rPr>
-              <a:t>cáo</a:t>
-            </a:r>
-            <a:r>
-              <a:rPr lang="en-US" sz="1200" b="0" i="1" dirty="0">
-                <a:solidFill>
-                  <a:schemeClr val="bg1"/>
-                </a:solidFill>
-                <a:latin typeface="Arial Nova Cond" panose="020B0506020202020204" pitchFamily="34" charset="0"/>
-              </a:rPr>
-              <a:t> </a:t>
-            </a:r>
-            <a:r>
-              <a:rPr lang="en-US" sz="1200" b="0" i="1" dirty="0" err="1">
-                <a:solidFill>
-                  <a:schemeClr val="bg1"/>
-                </a:solidFill>
-                <a:latin typeface="Arial Nova Cond" panose="020B0506020202020204" pitchFamily="34" charset="0"/>
-              </a:rPr>
-              <a:t>Khóa</a:t>
-            </a:r>
-            <a:r>
-              <a:rPr lang="en-US" sz="1200" b="0" i="1" dirty="0">
-                <a:solidFill>
-                  <a:schemeClr val="bg1"/>
-                </a:solidFill>
-                <a:latin typeface="Arial Nova Cond" panose="020B0506020202020204" pitchFamily="34" charset="0"/>
-              </a:rPr>
-              <a:t> </a:t>
-            </a:r>
-            <a:r>
-              <a:rPr lang="en-US" sz="1200" b="0" i="1" dirty="0" err="1">
-                <a:solidFill>
-                  <a:schemeClr val="bg1"/>
-                </a:solidFill>
-                <a:latin typeface="Arial Nova Cond" panose="020B0506020202020204" pitchFamily="34" charset="0"/>
-              </a:rPr>
-              <a:t>luận</a:t>
-            </a:r>
-            <a:r>
-              <a:rPr lang="en-US" sz="1200" b="0" i="1" dirty="0">
-                <a:solidFill>
-                  <a:schemeClr val="bg1"/>
-                </a:solidFill>
-                <a:latin typeface="Arial Nova Cond" panose="020B0506020202020204" pitchFamily="34" charset="0"/>
-              </a:rPr>
-              <a:t> </a:t>
-            </a:r>
-            <a:r>
-              <a:rPr lang="en-US" sz="1200" b="0" i="1" dirty="0" err="1">
-                <a:solidFill>
-                  <a:schemeClr val="bg1"/>
-                </a:solidFill>
-                <a:latin typeface="Arial Nova Cond" panose="020B0506020202020204" pitchFamily="34" charset="0"/>
-              </a:rPr>
-              <a:t>tốt</a:t>
-            </a:r>
-            <a:r>
-              <a:rPr lang="en-US" sz="1200" b="0" i="1" dirty="0">
-                <a:solidFill>
-                  <a:schemeClr val="bg1"/>
-                </a:solidFill>
-                <a:latin typeface="Arial Nova Cond" panose="020B0506020202020204" pitchFamily="34" charset="0"/>
-              </a:rPr>
-              <a:t> </a:t>
-            </a:r>
-            <a:r>
-              <a:rPr lang="en-US" sz="1200" b="0" i="1" dirty="0" err="1">
-                <a:solidFill>
-                  <a:schemeClr val="bg1"/>
-                </a:solidFill>
-                <a:latin typeface="Arial Nova Cond" panose="020B0506020202020204" pitchFamily="34" charset="0"/>
-              </a:rPr>
-              <a:t>nghiệp</a:t>
-            </a:r>
-            <a:endParaRPr lang="en-US" sz="1200" b="0" i="1" dirty="0">
-              <a:solidFill>
-                <a:schemeClr val="bg1"/>
-              </a:solidFill>
-              <a:latin typeface="Arial Nova Cond" panose="020B0506020202020204" pitchFamily="34" charset="0"/>
-            </a:endParaRPr>
-          </a:p>
-          <a:p>
-            <a:pPr marL="1200120" algn="ctr"/>
-            <a:r>
               <a:rPr lang="en-US" sz="1200" b="1" i="0" dirty="0" err="1">
                 <a:solidFill>
                   <a:schemeClr val="bg1"/>
@@ -4519,7 +4572,7 @@
         </p:blipFill>
         <p:spPr>
           <a:xfrm>
-            <a:off x="8694630" y="6424003"/>
+            <a:off x="8451548" y="6430098"/>
             <a:ext cx="417750" cy="472670"/>
           </a:xfrm>
           <a:prstGeom prst="rect">
@@ -4570,10 +4623,10 @@
       </p:cxnSp>
       <p:pic>
         <p:nvPicPr>
-          <p:cNvPr id="4" name="Picture 3" descr="A picture containing object, clock&#10;&#10;Description automatically generated">
+          <p:cNvPr id="4" name="Picture 3">
             <a:extLst>
               <a:ext uri="{FF2B5EF4-FFF2-40B4-BE49-F238E27FC236}">
-                <a16:creationId xmlns:a16="http://schemas.microsoft.com/office/drawing/2014/main" id="{0B17EB75-2C25-8D36-E7FA-24FB8C73EBAC}"/>
+                <a16:creationId xmlns:a16="http://schemas.microsoft.com/office/drawing/2014/main" id="{92099AC2-6C53-E470-5A26-2130B1CF2776}"/>
               </a:ext>
             </a:extLst>
           </p:cNvPr>
@@ -4590,14 +4643,13 @@
               </a:ext>
             </a:extLst>
           </a:blip>
-          <a:stretch>
-            <a:fillRect/>
-          </a:stretch>
+          <a:srcRect/>
+          <a:stretch/>
         </p:blipFill>
         <p:spPr>
           <a:xfrm>
-            <a:off x="8242795" y="6477407"/>
-            <a:ext cx="385886" cy="385886"/>
+            <a:off x="7680649" y="43720"/>
+            <a:ext cx="703369" cy="703369"/>
           </a:xfrm>
           <a:prstGeom prst="rect">
             <a:avLst/>
@@ -7206,7 +7258,7 @@
                     <a:schemeClr val="lt1"/>
                   </a:solidFill>
                 </a:rPr>
-                <a:t> – MSSV </a:t>
+                <a:t> – 240202016 </a:t>
               </a:r>
             </a:p>
             <a:p>
@@ -7455,42 +7507,6 @@
           </a:p>
         </p:txBody>
       </p:sp>
-      <p:pic>
-        <p:nvPicPr>
-          <p:cNvPr id="15" name="Picture 14" descr="A picture containing object, clock&#10;&#10;Description automatically generated">
-            <a:extLst>
-              <a:ext uri="{FF2B5EF4-FFF2-40B4-BE49-F238E27FC236}">
-                <a16:creationId xmlns:a16="http://schemas.microsoft.com/office/drawing/2014/main" id="{70514A20-AAE6-4C0B-BD55-D79A9292B1C2}"/>
-              </a:ext>
-            </a:extLst>
-          </p:cNvPr>
-          <p:cNvPicPr>
-            <a:picLocks noChangeAspect="1"/>
-          </p:cNvPicPr>
-          <p:nvPr/>
-        </p:nvPicPr>
-        <p:blipFill>
-          <a:blip r:embed="rId6">
-            <a:extLst>
-              <a:ext uri="{28A0092B-C50C-407E-A947-70E740481C1C}">
-                <a14:useLocalDpi xmlns:a14="http://schemas.microsoft.com/office/drawing/2010/main" val="0"/>
-              </a:ext>
-            </a:extLst>
-          </a:blip>
-          <a:stretch>
-            <a:fillRect/>
-          </a:stretch>
-        </p:blipFill>
-        <p:spPr>
-          <a:xfrm>
-            <a:off x="642397" y="4660459"/>
-            <a:ext cx="922754" cy="922754"/>
-          </a:xfrm>
-          <a:prstGeom prst="rect">
-            <a:avLst/>
-          </a:prstGeom>
-        </p:spPr>
-      </p:pic>
       <p:sp>
         <p:nvSpPr>
           <p:cNvPr id="17" name="Google Shape;109;p1">
@@ -7550,7 +7566,7 @@
           <p:nvPr/>
         </p:nvPicPr>
         <p:blipFill>
-          <a:blip r:embed="rId7">
+          <a:blip r:embed="rId6">
             <a:extLst>
               <a:ext uri="{28A0092B-C50C-407E-A947-70E740481C1C}">
                 <a14:useLocalDpi xmlns:a14="http://schemas.microsoft.com/office/drawing/2010/main" val="0"/>
@@ -7723,7 +7739,7 @@
           <p:nvPr>
             <p:extLst>
               <p:ext uri="{D42A27DB-BD31-4B8C-83A1-F6EECF244321}">
-                <p14:modId xmlns:p14="http://schemas.microsoft.com/office/powerpoint/2010/main" val="885328201"/>
+                <p14:modId xmlns:p14="http://schemas.microsoft.com/office/powerpoint/2010/main" val="1114592518"/>
               </p:ext>
             </p:extLst>
           </p:nvPr>
@@ -7739,14 +7755,14 @@
                 <a:tableStyleId>{E8B1032C-EA38-4F05-BA0D-38AFFFC7BED3}</a:tableStyleId>
               </a:tblPr>
               <a:tblGrid>
-                <a:gridCol w="2570481">
+                <a:gridCol w="2753361">
                   <a:extLst>
                     <a:ext uri="{9D8B030D-6E8A-4147-A177-3AD203B41FA5}">
                       <a16:colId xmlns:a16="http://schemas.microsoft.com/office/drawing/2014/main" val="1734667223"/>
                     </a:ext>
                   </a:extLst>
                 </a:gridCol>
-                <a:gridCol w="5872480">
+                <a:gridCol w="5689600">
                   <a:extLst>
                     <a:ext uri="{9D8B030D-6E8A-4147-A177-3AD203B41FA5}">
                       <a16:colId xmlns:a16="http://schemas.microsoft.com/office/drawing/2014/main" val="1678196743"/>
@@ -7787,7 +7803,29 @@
                           <a:latin typeface="+mn-lt"/>
                           <a:cs typeface="Arial" panose="020B0604020202020204" pitchFamily="34" charset="0"/>
                         </a:rPr>
-                        <a:t>, tổng hợp tham số mô hình bằng trung vị thay vì trung bình, giúp giảm ảnh hưởng của outliers và cải thiện độ tin cậy.</a:t>
+                        <a:t>, tổng hợp tham số mô hình bằng trung vị thay vì trung bình, giúp giảm ảnh hưởng của outliers và cải thiện độ tin cậy</a:t>
+                      </a:r>
+                      <a:r>
+                        <a:rPr lang="en-US" sz="1800" b="0" dirty="0">
+                          <a:latin typeface="+mn-lt"/>
+                          <a:cs typeface="Arial" panose="020B0604020202020204" pitchFamily="34" charset="0"/>
+                        </a:rPr>
+                        <a:t> </a:t>
+                      </a:r>
+                      <a:r>
+                        <a:rPr lang="en-US" sz="1800" b="0" baseline="30000" dirty="0">
+                          <a:latin typeface="+mn-lt"/>
+                          <a:cs typeface="Arial" panose="020B0604020202020204" pitchFamily="34" charset="0"/>
+                          <a:hlinkClick r:id="rId2" action="ppaction://hlinksldjump"/>
+                        </a:rPr>
+                        <a:t>[5]</a:t>
+                      </a:r>
+                      <a:r>
+                        <a:rPr lang="vi-VN" sz="1800" b="0" dirty="0">
+                          <a:latin typeface="+mn-lt"/>
+                          <a:cs typeface="Arial" panose="020B0604020202020204" pitchFamily="34" charset="0"/>
+                        </a:rPr>
+                        <a:t>.</a:t>
                       </a:r>
                     </a:p>
                   </a:txBody>
@@ -7971,6 +8009,730 @@
         <p:cNvPr id="1" name="">
           <a:extLst>
             <a:ext uri="{FF2B5EF4-FFF2-40B4-BE49-F238E27FC236}">
+              <a16:creationId xmlns:a16="http://schemas.microsoft.com/office/drawing/2014/main" id="{2F017755-D697-005A-368C-3B5DDC8A893C}"/>
+            </a:ext>
+          </a:extLst>
+        </p:cNvPr>
+        <p:cNvGrpSpPr/>
+        <p:nvPr/>
+      </p:nvGrpSpPr>
+      <p:grpSpPr>
+        <a:xfrm>
+          <a:off x="0" y="0"/>
+          <a:ext cx="0" cy="0"/>
+          <a:chOff x="0" y="0"/>
+          <a:chExt cx="0" cy="0"/>
+        </a:xfrm>
+      </p:grpSpPr>
+      <p:sp>
+        <p:nvSpPr>
+          <p:cNvPr id="4" name="Slide Number Placeholder 3">
+            <a:extLst>
+              <a:ext uri="{FF2B5EF4-FFF2-40B4-BE49-F238E27FC236}">
+                <a16:creationId xmlns:a16="http://schemas.microsoft.com/office/drawing/2014/main" id="{2D5C9086-EB2B-192E-B068-23C0D57CB0C1}"/>
+              </a:ext>
+            </a:extLst>
+          </p:cNvPr>
+          <p:cNvSpPr>
+            <a:spLocks noGrp="1"/>
+          </p:cNvSpPr>
+          <p:nvPr>
+            <p:ph type="sldNum" sz="quarter" idx="12"/>
+          </p:nvPr>
+        </p:nvSpPr>
+        <p:spPr/>
+        <p:txBody>
+          <a:bodyPr/>
+          <a:lstStyle/>
+          <a:p>
+            <a:fld id="{B487F271-60DF-4592-BB7F-B45BB4441AA9}" type="slidenum">
+              <a:rPr lang="en-US" smtClean="0"/>
+              <a:pPr/>
+              <a:t>12</a:t>
+            </a:fld>
+            <a:endParaRPr lang="en-US" dirty="0"/>
+          </a:p>
+        </p:txBody>
+      </p:sp>
+      <p:sp>
+        <p:nvSpPr>
+          <p:cNvPr id="5" name="Title 1">
+            <a:extLst>
+              <a:ext uri="{FF2B5EF4-FFF2-40B4-BE49-F238E27FC236}">
+                <a16:creationId xmlns:a16="http://schemas.microsoft.com/office/drawing/2014/main" id="{3E1CA2F0-1F7C-93EB-87B7-1B97FB66508C}"/>
+              </a:ext>
+            </a:extLst>
+          </p:cNvPr>
+          <p:cNvSpPr>
+            <a:spLocks noGrp="1"/>
+          </p:cNvSpPr>
+          <p:nvPr>
+            <p:ph type="title"/>
+          </p:nvPr>
+        </p:nvSpPr>
+        <p:spPr>
+          <a:xfrm>
+            <a:off x="169946" y="144644"/>
+            <a:ext cx="8214072" cy="510111"/>
+          </a:xfrm>
+        </p:spPr>
+        <p:txBody>
+          <a:bodyPr/>
+          <a:lstStyle/>
+          <a:p>
+            <a:r>
+              <a:rPr lang="en-US" dirty="0"/>
+              <a:t>3. Demo</a:t>
+            </a:r>
+          </a:p>
+        </p:txBody>
+      </p:sp>
+      <p:graphicFrame>
+        <p:nvGraphicFramePr>
+          <p:cNvPr id="7" name="Table 6">
+            <a:extLst>
+              <a:ext uri="{FF2B5EF4-FFF2-40B4-BE49-F238E27FC236}">
+                <a16:creationId xmlns:a16="http://schemas.microsoft.com/office/drawing/2014/main" id="{2AFB9BB2-0841-C911-4476-3A735FB8E0E3}"/>
+              </a:ext>
+            </a:extLst>
+          </p:cNvPr>
+          <p:cNvGraphicFramePr>
+            <a:graphicFrameLocks noGrp="1"/>
+          </p:cNvGraphicFramePr>
+          <p:nvPr>
+            <p:extLst>
+              <p:ext uri="{D42A27DB-BD31-4B8C-83A1-F6EECF244321}">
+                <p14:modId xmlns:p14="http://schemas.microsoft.com/office/powerpoint/2010/main" val="2795774975"/>
+              </p:ext>
+            </p:extLst>
+          </p:nvPr>
+        </p:nvGraphicFramePr>
+        <p:xfrm>
+          <a:off x="169945" y="1016000"/>
+          <a:ext cx="8804722" cy="5294489"/>
+        </p:xfrm>
+        <a:graphic>
+          <a:graphicData uri="http://schemas.openxmlformats.org/drawingml/2006/table">
+            <a:tbl>
+              <a:tblPr firstRow="1" bandRow="1">
+                <a:tableStyleId>{BC89EF96-8CEA-46FF-86C4-4CE0E7609802}</a:tableStyleId>
+              </a:tblPr>
+              <a:tblGrid>
+                <a:gridCol w="2674855">
+                  <a:extLst>
+                    <a:ext uri="{9D8B030D-6E8A-4147-A177-3AD203B41FA5}">
+                      <a16:colId xmlns:a16="http://schemas.microsoft.com/office/drawing/2014/main" val="3237786599"/>
+                    </a:ext>
+                  </a:extLst>
+                </a:gridCol>
+                <a:gridCol w="6129867">
+                  <a:extLst>
+                    <a:ext uri="{9D8B030D-6E8A-4147-A177-3AD203B41FA5}">
+                      <a16:colId xmlns:a16="http://schemas.microsoft.com/office/drawing/2014/main" val="1523138655"/>
+                    </a:ext>
+                  </a:extLst>
+                </a:gridCol>
+              </a:tblGrid>
+              <a:tr h="722489">
+                <a:tc>
+                  <a:txBody>
+                    <a:bodyPr/>
+                    <a:lstStyle/>
+                    <a:p>
+                      <a:pPr algn="ctr"/>
+                      <a:r>
+                        <a:rPr lang="en-US" sz="2200" dirty="0">
+                          <a:latin typeface="Arial" panose="020B0604020202020204" pitchFamily="34" charset="0"/>
+                          <a:cs typeface="Arial" panose="020B0604020202020204" pitchFamily="34" charset="0"/>
+                        </a:rPr>
+                        <a:t>Demo</a:t>
+                      </a:r>
+                    </a:p>
+                  </a:txBody>
+                  <a:tcPr anchor="ctr"/>
+                </a:tc>
+                <a:tc>
+                  <a:txBody>
+                    <a:bodyPr/>
+                    <a:lstStyle/>
+                    <a:p>
+                      <a:pPr algn="ctr"/>
+                      <a:r>
+                        <a:rPr lang="en-US" sz="2200" dirty="0" err="1">
+                          <a:latin typeface="Arial" panose="020B0604020202020204" pitchFamily="34" charset="0"/>
+                          <a:cs typeface="Arial" panose="020B0604020202020204" pitchFamily="34" charset="0"/>
+                        </a:rPr>
+                        <a:t>Kịch</a:t>
+                      </a:r>
+                      <a:r>
+                        <a:rPr lang="en-US" sz="2200" dirty="0">
+                          <a:latin typeface="Arial" panose="020B0604020202020204" pitchFamily="34" charset="0"/>
+                          <a:cs typeface="Arial" panose="020B0604020202020204" pitchFamily="34" charset="0"/>
+                        </a:rPr>
+                        <a:t> </a:t>
+                      </a:r>
+                      <a:r>
+                        <a:rPr lang="en-US" sz="2200" dirty="0" err="1">
+                          <a:latin typeface="Arial" panose="020B0604020202020204" pitchFamily="34" charset="0"/>
+                          <a:cs typeface="Arial" panose="020B0604020202020204" pitchFamily="34" charset="0"/>
+                        </a:rPr>
+                        <a:t>bản</a:t>
+                      </a:r>
+                      <a:endParaRPr lang="en-US" sz="2200" dirty="0">
+                        <a:latin typeface="Arial" panose="020B0604020202020204" pitchFamily="34" charset="0"/>
+                        <a:cs typeface="Arial" panose="020B0604020202020204" pitchFamily="34" charset="0"/>
+                      </a:endParaRPr>
+                    </a:p>
+                  </a:txBody>
+                  <a:tcPr anchor="ctr"/>
+                </a:tc>
+                <a:extLst>
+                  <a:ext uri="{0D108BD9-81ED-4DB2-BD59-A6C34878D82A}">
+                    <a16:rowId xmlns:a16="http://schemas.microsoft.com/office/drawing/2014/main" val="2599299799"/>
+                  </a:ext>
+                </a:extLst>
+              </a:tr>
+              <a:tr h="1539534">
+                <a:tc>
+                  <a:txBody>
+                    <a:bodyPr/>
+                    <a:lstStyle/>
+                    <a:p>
+                      <a:pPr algn="ctr"/>
+                      <a:r>
+                        <a:rPr lang="en-US" dirty="0">
+                          <a:latin typeface="Arial" panose="020B0604020202020204" pitchFamily="34" charset="0"/>
+                          <a:cs typeface="Arial" panose="020B0604020202020204" pitchFamily="34" charset="0"/>
+                        </a:rPr>
+                        <a:t>1. </a:t>
+                      </a:r>
+                      <a:r>
+                        <a:rPr lang="vi-VN" dirty="0">
+                          <a:latin typeface="Arial" panose="020B0604020202020204" pitchFamily="34" charset="0"/>
+                          <a:cs typeface="Arial" panose="020B0604020202020204" pitchFamily="34" charset="0"/>
+                        </a:rPr>
+                        <a:t>Mô phỏng một số cách Tổng hợp Trọng số Thường dung trong Federated Learning</a:t>
+                      </a:r>
+                      <a:endParaRPr lang="en-US" dirty="0">
+                        <a:latin typeface="Arial" panose="020B0604020202020204" pitchFamily="34" charset="0"/>
+                        <a:cs typeface="Arial" panose="020B0604020202020204" pitchFamily="34" charset="0"/>
+                      </a:endParaRPr>
+                    </a:p>
+                  </a:txBody>
+                  <a:tcPr anchor="ctr"/>
+                </a:tc>
+                <a:tc>
+                  <a:txBody>
+                    <a:bodyPr/>
+                    <a:lstStyle/>
+                    <a:p>
+                      <a:pPr marL="342900" lvl="0" indent="-342900">
+                        <a:buFont typeface="+mj-lt"/>
+                        <a:buAutoNum type="arabicPeriod"/>
+                      </a:pPr>
+                      <a:r>
+                        <a:rPr lang="vi-VN" dirty="0">
+                          <a:latin typeface="Arial" panose="020B0604020202020204" pitchFamily="34" charset="0"/>
+                          <a:cs typeface="Arial" panose="020B0604020202020204" pitchFamily="34" charset="0"/>
+                        </a:rPr>
+                        <a:t>Hai client huấn luyện riêng biệt mô hình Logistic Regression trên tập dữ liệu mạng đã chia.</a:t>
+                      </a:r>
+                      <a:endParaRPr lang="en-US" dirty="0">
+                        <a:latin typeface="Arial" panose="020B0604020202020204" pitchFamily="34" charset="0"/>
+                        <a:cs typeface="Arial" panose="020B0604020202020204" pitchFamily="34" charset="0"/>
+                      </a:endParaRPr>
+                    </a:p>
+                    <a:p>
+                      <a:pPr marL="342900" lvl="0" indent="-342900">
+                        <a:buFont typeface="+mj-lt"/>
+                        <a:buAutoNum type="arabicPeriod"/>
+                      </a:pPr>
+                      <a:r>
+                        <a:rPr lang="vi-VN" dirty="0">
+                          <a:latin typeface="Arial" panose="020B0604020202020204" pitchFamily="34" charset="0"/>
+                          <a:cs typeface="Arial" panose="020B0604020202020204" pitchFamily="34" charset="0"/>
+                        </a:rPr>
+                        <a:t>Server trung tâm thực hiện tổng hợp trọng số từ các client bằng thuật toán FedAvg</a:t>
+                      </a:r>
+                      <a:r>
+                        <a:rPr lang="en-US" dirty="0">
+                          <a:latin typeface="Arial" panose="020B0604020202020204" pitchFamily="34" charset="0"/>
+                          <a:cs typeface="Arial" panose="020B0604020202020204" pitchFamily="34" charset="0"/>
+                        </a:rPr>
+                        <a:t> </a:t>
+                      </a:r>
+                      <a:r>
+                        <a:rPr lang="en-US" dirty="0" err="1">
+                          <a:latin typeface="Arial" panose="020B0604020202020204" pitchFamily="34" charset="0"/>
+                          <a:cs typeface="Arial" panose="020B0604020202020204" pitchFamily="34" charset="0"/>
+                        </a:rPr>
+                        <a:t>và</a:t>
+                      </a:r>
+                      <a:r>
+                        <a:rPr lang="en-US" dirty="0">
+                          <a:latin typeface="Arial" panose="020B0604020202020204" pitchFamily="34" charset="0"/>
+                          <a:cs typeface="Arial" panose="020B0604020202020204" pitchFamily="34" charset="0"/>
+                        </a:rPr>
+                        <a:t> </a:t>
+                      </a:r>
+                      <a:r>
+                        <a:rPr lang="en-US" dirty="0" err="1">
+                          <a:latin typeface="Arial" panose="020B0604020202020204" pitchFamily="34" charset="0"/>
+                          <a:cs typeface="Arial" panose="020B0604020202020204" pitchFamily="34" charset="0"/>
+                        </a:rPr>
+                        <a:t>WeightedFed</a:t>
+                      </a:r>
+                      <a:r>
+                        <a:rPr lang="vi-VN" dirty="0">
+                          <a:latin typeface="Arial" panose="020B0604020202020204" pitchFamily="34" charset="0"/>
+                          <a:cs typeface="Arial" panose="020B0604020202020204" pitchFamily="34" charset="0"/>
+                        </a:rPr>
+                        <a:t> để tạo mô hình toàn cầu.</a:t>
+                      </a:r>
+                    </a:p>
+                    <a:p>
+                      <a:pPr algn="ctr"/>
+                      <a:endParaRPr lang="en-US" dirty="0">
+                        <a:latin typeface="Arial" panose="020B0604020202020204" pitchFamily="34" charset="0"/>
+                        <a:cs typeface="Arial" panose="020B0604020202020204" pitchFamily="34" charset="0"/>
+                      </a:endParaRPr>
+                    </a:p>
+                  </a:txBody>
+                  <a:tcPr anchor="ctr"/>
+                </a:tc>
+                <a:extLst>
+                  <a:ext uri="{0D108BD9-81ED-4DB2-BD59-A6C34878D82A}">
+                    <a16:rowId xmlns:a16="http://schemas.microsoft.com/office/drawing/2014/main" val="1159398655"/>
+                  </a:ext>
+                </a:extLst>
+              </a:tr>
+              <a:tr h="1539534">
+                <a:tc>
+                  <a:txBody>
+                    <a:bodyPr/>
+                    <a:lstStyle/>
+                    <a:p>
+                      <a:pPr algn="ctr"/>
+                      <a:r>
+                        <a:rPr lang="en-US" dirty="0">
+                          <a:latin typeface="Arial" panose="020B0604020202020204" pitchFamily="34" charset="0"/>
+                          <a:cs typeface="Arial" panose="020B0604020202020204" pitchFamily="34" charset="0"/>
+                        </a:rPr>
+                        <a:t>2. Federated Learning: Binary vs Multi-class Classification</a:t>
+                      </a:r>
+                    </a:p>
+                  </a:txBody>
+                  <a:tcPr anchor="ctr"/>
+                </a:tc>
+                <a:tc>
+                  <a:txBody>
+                    <a:bodyPr/>
+                    <a:lstStyle/>
+                    <a:p>
+                      <a:pPr lvl="0"/>
+                      <a:r>
+                        <a:rPr lang="vi-VN" dirty="0">
+                          <a:latin typeface="Arial" panose="020B0604020202020204" pitchFamily="34" charset="0"/>
+                          <a:cs typeface="Arial" panose="020B0604020202020204" pitchFamily="34" charset="0"/>
+                        </a:rPr>
+                        <a:t>Federated Learning cho phép nhiều client huấn luyện mô hình trên dữ liệu cục bộ mà không chia sẻ dữ liệu thô. Trong demo này:</a:t>
+                      </a:r>
+                    </a:p>
+                    <a:p>
+                      <a:pPr lvl="1">
+                        <a:buFont typeface="+mj-lt"/>
+                        <a:buAutoNum type="arabicPeriod"/>
+                      </a:pPr>
+                      <a:r>
+                        <a:rPr lang="vi-VN" dirty="0">
+                          <a:latin typeface="Arial" panose="020B0604020202020204" pitchFamily="34" charset="0"/>
+                          <a:cs typeface="Arial" panose="020B0604020202020204" pitchFamily="34" charset="0"/>
+                        </a:rPr>
+                        <a:t>Mỗi client sử dụng tập dữ liệu riêng để huấn luyện mô hình cho bài toán phân loại.</a:t>
+                      </a:r>
+                    </a:p>
+                    <a:p>
+                      <a:pPr lvl="1">
+                        <a:buFont typeface="+mj-lt"/>
+                        <a:buAutoNum type="arabicPeriod"/>
+                      </a:pPr>
+                      <a:r>
+                        <a:rPr lang="vi-VN" dirty="0">
+                          <a:latin typeface="Arial" panose="020B0604020202020204" pitchFamily="34" charset="0"/>
+                          <a:cs typeface="Arial" panose="020B0604020202020204" pitchFamily="34" charset="0"/>
+                        </a:rPr>
+                        <a:t>Các client gửi trọng số mô hình về server trung tâm để tổng hợp.</a:t>
+                      </a:r>
+                    </a:p>
+                    <a:p>
+                      <a:pPr lvl="1">
+                        <a:buFont typeface="+mj-lt"/>
+                        <a:buAutoNum type="arabicPeriod"/>
+                      </a:pPr>
+                      <a:r>
+                        <a:rPr lang="vi-VN" dirty="0">
+                          <a:latin typeface="Arial" panose="020B0604020202020204" pitchFamily="34" charset="0"/>
+                          <a:cs typeface="Arial" panose="020B0604020202020204" pitchFamily="34" charset="0"/>
+                        </a:rPr>
+                        <a:t>Mô hình toàn cầu được đánh giá trên một tập kiểm thử chung để so sánh hiệu suất.</a:t>
+                      </a:r>
+                    </a:p>
+                    <a:p>
+                      <a:pPr algn="ctr"/>
+                      <a:endParaRPr lang="en-US" dirty="0">
+                        <a:latin typeface="Arial" panose="020B0604020202020204" pitchFamily="34" charset="0"/>
+                        <a:cs typeface="Arial" panose="020B0604020202020204" pitchFamily="34" charset="0"/>
+                      </a:endParaRPr>
+                    </a:p>
+                  </a:txBody>
+                  <a:tcPr anchor="ctr"/>
+                </a:tc>
+                <a:extLst>
+                  <a:ext uri="{0D108BD9-81ED-4DB2-BD59-A6C34878D82A}">
+                    <a16:rowId xmlns:a16="http://schemas.microsoft.com/office/drawing/2014/main" val="973041276"/>
+                  </a:ext>
+                </a:extLst>
+              </a:tr>
+            </a:tbl>
+          </a:graphicData>
+        </a:graphic>
+      </p:graphicFrame>
+    </p:spTree>
+    <p:extLst>
+      <p:ext uri="{BB962C8B-B14F-4D97-AF65-F5344CB8AC3E}">
+        <p14:creationId xmlns:p14="http://schemas.microsoft.com/office/powerpoint/2010/main" val="3165335602"/>
+      </p:ext>
+    </p:extLst>
+  </p:cSld>
+  <p:clrMapOvr>
+    <a:masterClrMapping/>
+  </p:clrMapOvr>
+</p:sld>
+</file>
+
+<file path=ppt/slides/slide13.xml><?xml version="1.0" encoding="utf-8"?>
+<p:sld xmlns:a="http://schemas.openxmlformats.org/drawingml/2006/main" xmlns:r="http://schemas.openxmlformats.org/officeDocument/2006/relationships" xmlns:p="http://schemas.openxmlformats.org/presentationml/2006/main">
+  <p:cSld>
+    <p:spTree>
+      <p:nvGrpSpPr>
+        <p:cNvPr id="1" name="">
+          <a:extLst>
+            <a:ext uri="{FF2B5EF4-FFF2-40B4-BE49-F238E27FC236}">
+              <a16:creationId xmlns:a16="http://schemas.microsoft.com/office/drawing/2014/main" id="{9BCF1D17-6A2A-9E63-1900-6D206098804F}"/>
+            </a:ext>
+          </a:extLst>
+        </p:cNvPr>
+        <p:cNvGrpSpPr/>
+        <p:nvPr/>
+      </p:nvGrpSpPr>
+      <p:grpSpPr>
+        <a:xfrm>
+          <a:off x="0" y="0"/>
+          <a:ext cx="0" cy="0"/>
+          <a:chOff x="0" y="0"/>
+          <a:chExt cx="0" cy="0"/>
+        </a:xfrm>
+      </p:grpSpPr>
+      <p:sp>
+        <p:nvSpPr>
+          <p:cNvPr id="4" name="Slide Number Placeholder 3">
+            <a:extLst>
+              <a:ext uri="{FF2B5EF4-FFF2-40B4-BE49-F238E27FC236}">
+                <a16:creationId xmlns:a16="http://schemas.microsoft.com/office/drawing/2014/main" id="{0F68D2A2-D814-13CD-0A44-AADEC37BA404}"/>
+              </a:ext>
+            </a:extLst>
+          </p:cNvPr>
+          <p:cNvSpPr>
+            <a:spLocks noGrp="1"/>
+          </p:cNvSpPr>
+          <p:nvPr>
+            <p:ph type="sldNum" sz="quarter" idx="12"/>
+          </p:nvPr>
+        </p:nvSpPr>
+        <p:spPr/>
+        <p:txBody>
+          <a:bodyPr/>
+          <a:lstStyle/>
+          <a:p>
+            <a:fld id="{B487F271-60DF-4592-BB7F-B45BB4441AA9}" type="slidenum">
+              <a:rPr lang="en-US" smtClean="0"/>
+              <a:pPr/>
+              <a:t>13</a:t>
+            </a:fld>
+            <a:endParaRPr lang="en-US" dirty="0"/>
+          </a:p>
+        </p:txBody>
+      </p:sp>
+      <p:sp>
+        <p:nvSpPr>
+          <p:cNvPr id="5" name="Title 1">
+            <a:extLst>
+              <a:ext uri="{FF2B5EF4-FFF2-40B4-BE49-F238E27FC236}">
+                <a16:creationId xmlns:a16="http://schemas.microsoft.com/office/drawing/2014/main" id="{2B7F035C-CDB9-0D2B-E6AC-FE88267F3E0C}"/>
+              </a:ext>
+            </a:extLst>
+          </p:cNvPr>
+          <p:cNvSpPr>
+            <a:spLocks noGrp="1"/>
+          </p:cNvSpPr>
+          <p:nvPr>
+            <p:ph type="title"/>
+          </p:nvPr>
+        </p:nvSpPr>
+        <p:spPr>
+          <a:xfrm>
+            <a:off x="169946" y="144644"/>
+            <a:ext cx="8214072" cy="510111"/>
+          </a:xfrm>
+        </p:spPr>
+        <p:txBody>
+          <a:bodyPr/>
+          <a:lstStyle/>
+          <a:p>
+            <a:r>
+              <a:rPr lang="en-US" dirty="0"/>
+              <a:t>3. Demo</a:t>
+            </a:r>
+          </a:p>
+        </p:txBody>
+      </p:sp>
+      <p:graphicFrame>
+        <p:nvGraphicFramePr>
+          <p:cNvPr id="7" name="Table 6">
+            <a:extLst>
+              <a:ext uri="{FF2B5EF4-FFF2-40B4-BE49-F238E27FC236}">
+                <a16:creationId xmlns:a16="http://schemas.microsoft.com/office/drawing/2014/main" id="{92D77425-D91E-586D-5878-D8274F960B02}"/>
+              </a:ext>
+            </a:extLst>
+          </p:cNvPr>
+          <p:cNvGraphicFramePr>
+            <a:graphicFrameLocks noGrp="1"/>
+          </p:cNvGraphicFramePr>
+          <p:nvPr>
+            <p:extLst>
+              <p:ext uri="{D42A27DB-BD31-4B8C-83A1-F6EECF244321}">
+                <p14:modId xmlns:p14="http://schemas.microsoft.com/office/powerpoint/2010/main" val="2329709822"/>
+              </p:ext>
+            </p:extLst>
+          </p:nvPr>
+        </p:nvGraphicFramePr>
+        <p:xfrm>
+          <a:off x="169945" y="1016000"/>
+          <a:ext cx="8804722" cy="2262023"/>
+        </p:xfrm>
+        <a:graphic>
+          <a:graphicData uri="http://schemas.openxmlformats.org/drawingml/2006/table">
+            <a:tbl>
+              <a:tblPr firstRow="1" bandRow="1">
+                <a:tableStyleId>{BC89EF96-8CEA-46FF-86C4-4CE0E7609802}</a:tableStyleId>
+              </a:tblPr>
+              <a:tblGrid>
+                <a:gridCol w="2674855">
+                  <a:extLst>
+                    <a:ext uri="{9D8B030D-6E8A-4147-A177-3AD203B41FA5}">
+                      <a16:colId xmlns:a16="http://schemas.microsoft.com/office/drawing/2014/main" val="3237786599"/>
+                    </a:ext>
+                  </a:extLst>
+                </a:gridCol>
+                <a:gridCol w="6129867">
+                  <a:extLst>
+                    <a:ext uri="{9D8B030D-6E8A-4147-A177-3AD203B41FA5}">
+                      <a16:colId xmlns:a16="http://schemas.microsoft.com/office/drawing/2014/main" val="1523138655"/>
+                    </a:ext>
+                  </a:extLst>
+                </a:gridCol>
+              </a:tblGrid>
+              <a:tr h="722489">
+                <a:tc>
+                  <a:txBody>
+                    <a:bodyPr/>
+                    <a:lstStyle/>
+                    <a:p>
+                      <a:pPr algn="ctr"/>
+                      <a:r>
+                        <a:rPr lang="en-US" sz="2200" dirty="0">
+                          <a:latin typeface="Arial" panose="020B0604020202020204" pitchFamily="34" charset="0"/>
+                          <a:cs typeface="Arial" panose="020B0604020202020204" pitchFamily="34" charset="0"/>
+                        </a:rPr>
+                        <a:t>Demo</a:t>
+                      </a:r>
+                    </a:p>
+                  </a:txBody>
+                  <a:tcPr anchor="ctr"/>
+                </a:tc>
+                <a:tc>
+                  <a:txBody>
+                    <a:bodyPr/>
+                    <a:lstStyle/>
+                    <a:p>
+                      <a:pPr algn="ctr"/>
+                      <a:r>
+                        <a:rPr lang="en-US" sz="2200" dirty="0" err="1">
+                          <a:latin typeface="Arial" panose="020B0604020202020204" pitchFamily="34" charset="0"/>
+                          <a:cs typeface="Arial" panose="020B0604020202020204" pitchFamily="34" charset="0"/>
+                        </a:rPr>
+                        <a:t>Kịch</a:t>
+                      </a:r>
+                      <a:r>
+                        <a:rPr lang="en-US" sz="2200" dirty="0">
+                          <a:latin typeface="Arial" panose="020B0604020202020204" pitchFamily="34" charset="0"/>
+                          <a:cs typeface="Arial" panose="020B0604020202020204" pitchFamily="34" charset="0"/>
+                        </a:rPr>
+                        <a:t> </a:t>
+                      </a:r>
+                      <a:r>
+                        <a:rPr lang="en-US" sz="2200" dirty="0" err="1">
+                          <a:latin typeface="Arial" panose="020B0604020202020204" pitchFamily="34" charset="0"/>
+                          <a:cs typeface="Arial" panose="020B0604020202020204" pitchFamily="34" charset="0"/>
+                        </a:rPr>
+                        <a:t>bản</a:t>
+                      </a:r>
+                      <a:endParaRPr lang="en-US" sz="2200" dirty="0">
+                        <a:latin typeface="Arial" panose="020B0604020202020204" pitchFamily="34" charset="0"/>
+                        <a:cs typeface="Arial" panose="020B0604020202020204" pitchFamily="34" charset="0"/>
+                      </a:endParaRPr>
+                    </a:p>
+                  </a:txBody>
+                  <a:tcPr anchor="ctr"/>
+                </a:tc>
+                <a:extLst>
+                  <a:ext uri="{0D108BD9-81ED-4DB2-BD59-A6C34878D82A}">
+                    <a16:rowId xmlns:a16="http://schemas.microsoft.com/office/drawing/2014/main" val="2599299799"/>
+                  </a:ext>
+                </a:extLst>
+              </a:tr>
+              <a:tr h="1539534">
+                <a:tc>
+                  <a:txBody>
+                    <a:bodyPr/>
+                    <a:lstStyle/>
+                    <a:p>
+                      <a:pPr algn="ctr"/>
+                      <a:r>
+                        <a:rPr lang="en-US" dirty="0">
+                          <a:latin typeface="Arial" panose="020B0604020202020204" pitchFamily="34" charset="0"/>
+                          <a:cs typeface="Arial" panose="020B0604020202020204" pitchFamily="34" charset="0"/>
+                        </a:rPr>
+                        <a:t>3. </a:t>
+                      </a:r>
+                      <a:r>
+                        <a:rPr lang="vi-VN" dirty="0">
+                          <a:latin typeface="Arial" panose="020B0604020202020204" pitchFamily="34" charset="0"/>
+                          <a:cs typeface="Arial" panose="020B0604020202020204" pitchFamily="34" charset="0"/>
+                        </a:rPr>
+                        <a:t>Phát Hiện Tấn Công Đặc Biệt Từ Dữ Liệu Riêng Của Khách Hàng</a:t>
+                      </a:r>
+                      <a:endParaRPr lang="en-US" dirty="0">
+                        <a:latin typeface="Arial" panose="020B0604020202020204" pitchFamily="34" charset="0"/>
+                        <a:cs typeface="Arial" panose="020B0604020202020204" pitchFamily="34" charset="0"/>
+                      </a:endParaRPr>
+                    </a:p>
+                  </a:txBody>
+                  <a:tcPr anchor="ctr"/>
+                </a:tc>
+                <a:tc>
+                  <a:txBody>
+                    <a:bodyPr/>
+                    <a:lstStyle/>
+                    <a:p>
+                      <a:pPr marL="342900" lvl="0" indent="-342900">
+                        <a:buFont typeface="+mj-lt"/>
+                        <a:buAutoNum type="arabicPeriod"/>
+                      </a:pPr>
+                      <a:r>
+                        <a:rPr lang="vi-VN" dirty="0">
+                          <a:latin typeface="Arial" panose="020B0604020202020204" pitchFamily="34" charset="0"/>
+                          <a:cs typeface="Arial" panose="020B0604020202020204" pitchFamily="34" charset="0"/>
+                        </a:rPr>
+                        <a:t>Hai client huấn luyện riêng biệt mô hình Logistic Regression trên tập dữ liệu mạng đã chia.</a:t>
+                      </a:r>
+                      <a:endParaRPr lang="en-US" dirty="0">
+                        <a:latin typeface="Arial" panose="020B0604020202020204" pitchFamily="34" charset="0"/>
+                        <a:cs typeface="Arial" panose="020B0604020202020204" pitchFamily="34" charset="0"/>
+                      </a:endParaRPr>
+                    </a:p>
+                    <a:p>
+                      <a:pPr marL="342900" lvl="0" indent="-342900">
+                        <a:buFont typeface="+mj-lt"/>
+                        <a:buAutoNum type="arabicPeriod"/>
+                      </a:pPr>
+                      <a:r>
+                        <a:rPr lang="vi-VN" dirty="0">
+                          <a:latin typeface="Arial" panose="020B0604020202020204" pitchFamily="34" charset="0"/>
+                          <a:cs typeface="Arial" panose="020B0604020202020204" pitchFamily="34" charset="0"/>
+                        </a:rPr>
+                        <a:t>Server trung tâm thực hiện tổng hợp trọng số từ các client bằng thuật toán FedAvg</a:t>
+                      </a:r>
+                      <a:r>
+                        <a:rPr lang="en-US" dirty="0">
+                          <a:latin typeface="Arial" panose="020B0604020202020204" pitchFamily="34" charset="0"/>
+                          <a:cs typeface="Arial" panose="020B0604020202020204" pitchFamily="34" charset="0"/>
+                        </a:rPr>
+                        <a:t> </a:t>
+                      </a:r>
+                      <a:r>
+                        <a:rPr lang="en-US" dirty="0" err="1">
+                          <a:latin typeface="Arial" panose="020B0604020202020204" pitchFamily="34" charset="0"/>
+                          <a:cs typeface="Arial" panose="020B0604020202020204" pitchFamily="34" charset="0"/>
+                        </a:rPr>
+                        <a:t>và</a:t>
+                      </a:r>
+                      <a:r>
+                        <a:rPr lang="en-US" dirty="0">
+                          <a:latin typeface="Arial" panose="020B0604020202020204" pitchFamily="34" charset="0"/>
+                          <a:cs typeface="Arial" panose="020B0604020202020204" pitchFamily="34" charset="0"/>
+                        </a:rPr>
+                        <a:t> </a:t>
+                      </a:r>
+                      <a:r>
+                        <a:rPr lang="en-US" dirty="0" err="1">
+                          <a:latin typeface="Arial" panose="020B0604020202020204" pitchFamily="34" charset="0"/>
+                          <a:cs typeface="Arial" panose="020B0604020202020204" pitchFamily="34" charset="0"/>
+                        </a:rPr>
+                        <a:t>WeightedFed</a:t>
+                      </a:r>
+                      <a:r>
+                        <a:rPr lang="vi-VN" dirty="0">
+                          <a:latin typeface="Arial" panose="020B0604020202020204" pitchFamily="34" charset="0"/>
+                          <a:cs typeface="Arial" panose="020B0604020202020204" pitchFamily="34" charset="0"/>
+                        </a:rPr>
+                        <a:t> để tạo mô hình toàn cầu.</a:t>
+                      </a:r>
+                    </a:p>
+                  </a:txBody>
+                  <a:tcPr anchor="ctr"/>
+                </a:tc>
+                <a:extLst>
+                  <a:ext uri="{0D108BD9-81ED-4DB2-BD59-A6C34878D82A}">
+                    <a16:rowId xmlns:a16="http://schemas.microsoft.com/office/drawing/2014/main" val="1159398655"/>
+                  </a:ext>
+                </a:extLst>
+              </a:tr>
+            </a:tbl>
+          </a:graphicData>
+        </a:graphic>
+      </p:graphicFrame>
+    </p:spTree>
+    <p:extLst>
+      <p:ext uri="{BB962C8B-B14F-4D97-AF65-F5344CB8AC3E}">
+        <p14:creationId xmlns:p14="http://schemas.microsoft.com/office/powerpoint/2010/main" val="1061348150"/>
+      </p:ext>
+    </p:extLst>
+  </p:cSld>
+  <p:clrMapOvr>
+    <a:masterClrMapping/>
+  </p:clrMapOvr>
+</p:sld>
+</file>
+
+<file path=ppt/slides/slide14.xml><?xml version="1.0" encoding="utf-8"?>
+<p:sld xmlns:a="http://schemas.openxmlformats.org/drawingml/2006/main" xmlns:r="http://schemas.openxmlformats.org/officeDocument/2006/relationships" xmlns:p="http://schemas.openxmlformats.org/presentationml/2006/main">
+  <p:cSld>
+    <p:spTree>
+      <p:nvGrpSpPr>
+        <p:cNvPr id="1" name="">
+          <a:extLst>
+            <a:ext uri="{FF2B5EF4-FFF2-40B4-BE49-F238E27FC236}">
               <a16:creationId xmlns:a16="http://schemas.microsoft.com/office/drawing/2014/main" id="{1FBDA32A-7D3E-89AB-BC2D-33F1659D325A}"/>
             </a:ext>
           </a:extLst>
@@ -8265,7 +9027,7 @@
             <a:fld id="{B487F271-60DF-4592-BB7F-B45BB4441AA9}" type="slidenum">
               <a:rPr lang="en-US" smtClean="0"/>
               <a:pPr/>
-              <a:t>12</a:t>
+              <a:t>14</a:t>
             </a:fld>
             <a:endParaRPr lang="en-US" dirty="0"/>
           </a:p>
@@ -8284,7 +9046,352 @@
 </p:sld>
 </file>
 
-<file path=ppt/slides/slide13.xml><?xml version="1.0" encoding="utf-8"?>
+<file path=ppt/slides/slide15.xml><?xml version="1.0" encoding="utf-8"?>
+<p:sld xmlns:a="http://schemas.openxmlformats.org/drawingml/2006/main" xmlns:r="http://schemas.openxmlformats.org/officeDocument/2006/relationships" xmlns:p="http://schemas.openxmlformats.org/presentationml/2006/main">
+  <p:cSld>
+    <p:spTree>
+      <p:nvGrpSpPr>
+        <p:cNvPr id="1" name="">
+          <a:extLst>
+            <a:ext uri="{FF2B5EF4-FFF2-40B4-BE49-F238E27FC236}">
+              <a16:creationId xmlns:a16="http://schemas.microsoft.com/office/drawing/2014/main" id="{63ABD2CD-547A-2007-1D56-DE7B82F94F06}"/>
+            </a:ext>
+          </a:extLst>
+        </p:cNvPr>
+        <p:cNvGrpSpPr/>
+        <p:nvPr/>
+      </p:nvGrpSpPr>
+      <p:grpSpPr>
+        <a:xfrm>
+          <a:off x="0" y="0"/>
+          <a:ext cx="0" cy="0"/>
+          <a:chOff x="0" y="0"/>
+          <a:chExt cx="0" cy="0"/>
+        </a:xfrm>
+      </p:grpSpPr>
+      <p:sp>
+        <p:nvSpPr>
+          <p:cNvPr id="2" name="Title 1">
+            <a:extLst>
+              <a:ext uri="{FF2B5EF4-FFF2-40B4-BE49-F238E27FC236}">
+                <a16:creationId xmlns:a16="http://schemas.microsoft.com/office/drawing/2014/main" id="{6AFA6925-E584-56E9-5A39-A7D5F67EF414}"/>
+              </a:ext>
+            </a:extLst>
+          </p:cNvPr>
+          <p:cNvSpPr>
+            <a:spLocks noGrp="1"/>
+          </p:cNvSpPr>
+          <p:nvPr>
+            <p:ph type="title"/>
+          </p:nvPr>
+        </p:nvSpPr>
+        <p:spPr/>
+        <p:txBody>
+          <a:bodyPr/>
+          <a:lstStyle/>
+          <a:p>
+            <a:r>
+              <a:rPr lang="en-US" dirty="0"/>
+              <a:t>References</a:t>
+            </a:r>
+          </a:p>
+        </p:txBody>
+      </p:sp>
+      <p:sp>
+        <p:nvSpPr>
+          <p:cNvPr id="3" name="Content Placeholder 2">
+            <a:extLst>
+              <a:ext uri="{FF2B5EF4-FFF2-40B4-BE49-F238E27FC236}">
+                <a16:creationId xmlns:a16="http://schemas.microsoft.com/office/drawing/2014/main" id="{E3D85BB9-5D25-204D-DC64-9F7548262F34}"/>
+              </a:ext>
+            </a:extLst>
+          </p:cNvPr>
+          <p:cNvSpPr>
+            <a:spLocks noGrp="1"/>
+          </p:cNvSpPr>
+          <p:nvPr>
+            <p:ph idx="1"/>
+          </p:nvPr>
+        </p:nvSpPr>
+        <p:spPr/>
+        <p:txBody>
+          <a:bodyPr>
+            <a:normAutofit/>
+          </a:bodyPr>
+          <a:lstStyle/>
+          <a:p>
+            <a:pPr marL="0" indent="0">
+              <a:buNone/>
+            </a:pPr>
+            <a:r>
+              <a:rPr lang="en-US" sz="1800" dirty="0"/>
+              <a:t>[1] Statio.vn, "Federated Learning </a:t>
+            </a:r>
+            <a:r>
+              <a:rPr lang="en-US" sz="1800" dirty="0" err="1"/>
+              <a:t>trong</a:t>
+            </a:r>
+            <a:r>
+              <a:rPr lang="en-US" sz="1800" dirty="0"/>
+              <a:t> AI </a:t>
+            </a:r>
+            <a:r>
+              <a:rPr lang="en-US" sz="1800" dirty="0" err="1"/>
+              <a:t>là</a:t>
+            </a:r>
+            <a:r>
+              <a:rPr lang="en-US" sz="1800" dirty="0"/>
+              <a:t> </a:t>
+            </a:r>
+            <a:r>
+              <a:rPr lang="en-US" sz="1800" dirty="0" err="1"/>
+              <a:t>gì</a:t>
+            </a:r>
+            <a:r>
+              <a:rPr lang="en-US" sz="1800" dirty="0"/>
+              <a:t>? </a:t>
+            </a:r>
+            <a:r>
+              <a:rPr lang="en-US" sz="1800" dirty="0" err="1"/>
+              <a:t>Giải</a:t>
+            </a:r>
+            <a:r>
+              <a:rPr lang="en-US" sz="1800" dirty="0"/>
+              <a:t> </a:t>
+            </a:r>
+            <a:r>
+              <a:rPr lang="en-US" sz="1800" dirty="0" err="1"/>
+              <a:t>thích</a:t>
+            </a:r>
+            <a:r>
+              <a:rPr lang="en-US" sz="1800" dirty="0"/>
+              <a:t> chi </a:t>
+            </a:r>
+            <a:r>
+              <a:rPr lang="en-US" sz="1800" dirty="0" err="1"/>
+              <a:t>tiết</a:t>
+            </a:r>
+            <a:r>
+              <a:rPr lang="en-US" sz="1800" dirty="0"/>
+              <a:t> </a:t>
+            </a:r>
+            <a:r>
+              <a:rPr lang="en-US" sz="1800" dirty="0" err="1"/>
+              <a:t>về</a:t>
+            </a:r>
+            <a:r>
+              <a:rPr lang="en-US" sz="1800" dirty="0"/>
+              <a:t> </a:t>
+            </a:r>
+            <a:r>
+              <a:rPr lang="en-US" sz="1800" dirty="0" err="1"/>
+              <a:t>học</a:t>
+            </a:r>
+            <a:r>
+              <a:rPr lang="en-US" sz="1800" dirty="0"/>
+              <a:t> </a:t>
+            </a:r>
+            <a:r>
+              <a:rPr lang="en-US" sz="1800" dirty="0" err="1"/>
+              <a:t>liên</a:t>
+            </a:r>
+            <a:r>
+              <a:rPr lang="en-US" sz="1800" dirty="0"/>
+              <a:t> </a:t>
+            </a:r>
+            <a:r>
+              <a:rPr lang="en-US" sz="1800" dirty="0" err="1"/>
+              <a:t>kết</a:t>
+            </a:r>
+            <a:r>
+              <a:rPr lang="en-US" sz="1800" dirty="0"/>
+              <a:t>, </a:t>
+            </a:r>
+            <a:r>
+              <a:rPr lang="en-US" sz="1800" dirty="0" err="1"/>
+              <a:t>cách</a:t>
+            </a:r>
+            <a:r>
+              <a:rPr lang="en-US" sz="1800" dirty="0"/>
+              <a:t> </a:t>
+            </a:r>
+            <a:r>
+              <a:rPr lang="en-US" sz="1800" dirty="0" err="1"/>
+              <a:t>hoạt</a:t>
+            </a:r>
+            <a:r>
+              <a:rPr lang="en-US" sz="1800" dirty="0"/>
+              <a:t> </a:t>
+            </a:r>
+            <a:r>
+              <a:rPr lang="en-US" sz="1800" dirty="0" err="1"/>
+              <a:t>động</a:t>
+            </a:r>
+            <a:r>
+              <a:rPr lang="en-US" sz="1800" dirty="0"/>
+              <a:t> </a:t>
+            </a:r>
+            <a:r>
+              <a:rPr lang="en-US" sz="1800" dirty="0" err="1"/>
+              <a:t>và</a:t>
+            </a:r>
+            <a:r>
+              <a:rPr lang="en-US" sz="1800" dirty="0"/>
+              <a:t> </a:t>
+            </a:r>
+            <a:r>
+              <a:rPr lang="en-US" sz="1800" dirty="0" err="1"/>
+              <a:t>lợi</a:t>
+            </a:r>
+            <a:r>
+              <a:rPr lang="en-US" sz="1800" dirty="0"/>
+              <a:t> </a:t>
+            </a:r>
+            <a:r>
+              <a:rPr lang="en-US" sz="1800" dirty="0" err="1"/>
+              <a:t>ích</a:t>
+            </a:r>
+            <a:r>
+              <a:rPr lang="en-US" sz="1800" dirty="0"/>
+              <a:t> </a:t>
+            </a:r>
+            <a:r>
+              <a:rPr lang="en-US" sz="1800" dirty="0" err="1"/>
+              <a:t>cho</a:t>
+            </a:r>
+            <a:r>
+              <a:rPr lang="en-US" sz="1800" dirty="0"/>
+              <a:t> </a:t>
+            </a:r>
+            <a:r>
+              <a:rPr lang="en-US" sz="1800" dirty="0" err="1"/>
+              <a:t>bảo</a:t>
+            </a:r>
+            <a:r>
+              <a:rPr lang="en-US" sz="1800" dirty="0"/>
+              <a:t> </a:t>
+            </a:r>
+            <a:r>
+              <a:rPr lang="en-US" sz="1800" dirty="0" err="1"/>
+              <a:t>mật</a:t>
+            </a:r>
+            <a:r>
+              <a:rPr lang="en-US" sz="1800" dirty="0"/>
+              <a:t> </a:t>
+            </a:r>
+            <a:r>
+              <a:rPr lang="en-US" sz="1800" dirty="0" err="1"/>
+              <a:t>dữ</a:t>
+            </a:r>
+            <a:r>
+              <a:rPr lang="en-US" sz="1800" dirty="0"/>
+              <a:t> </a:t>
+            </a:r>
+            <a:r>
+              <a:rPr lang="en-US" sz="1800" dirty="0" err="1"/>
+              <a:t>liệu</a:t>
+            </a:r>
+            <a:r>
+              <a:rPr lang="en-US" sz="1800" dirty="0"/>
+              <a:t>," [Online]. Available: https://statio.vn/blog/federated-learning-trong-ai-la-gi-giai-thich-chi-tiet-ve-hoc-lien-ket-cach-hoat-ong-va-loi-ich-cho-bao-mat-du-lieu. [Accessed: Dec. 8, 2024].</a:t>
+            </a:r>
+          </a:p>
+          <a:p>
+            <a:pPr marL="0" indent="0">
+              <a:buNone/>
+            </a:pPr>
+            <a:r>
+              <a:rPr lang="en-US" sz="1800" dirty="0"/>
+              <a:t>[2] UNB, "Datasets," [Online]. Available: https://www.unb.ca/cic/datasets/. [Accessed: Dec. 8, 2024].</a:t>
+            </a:r>
+          </a:p>
+          <a:p>
+            <a:pPr marL="0" indent="0">
+              <a:buNone/>
+            </a:pPr>
+            <a:r>
+              <a:rPr lang="en-US" sz="1800" dirty="0"/>
+              <a:t>[3] J. McMahan, E. Moore, D. Ramage, and B. A. y Federated Learning, "Communication-efficient learning of deep networks from decentralized data," </a:t>
+            </a:r>
+            <a:r>
+              <a:rPr lang="en-US" sz="1800" dirty="0" err="1"/>
+              <a:t>arXiv</a:t>
+            </a:r>
+            <a:r>
+              <a:rPr lang="en-US" sz="1800" dirty="0"/>
+              <a:t>, Apr. 2021. [Online]. Available: https://arxiv.org/abs/2104.11375. [Accessed: Dec. 8, 2024].</a:t>
+            </a:r>
+          </a:p>
+          <a:p>
+            <a:pPr marL="0" indent="0">
+              <a:buNone/>
+            </a:pPr>
+            <a:r>
+              <a:rPr lang="en-US" sz="1800" dirty="0"/>
+              <a:t>[4] X. Zhang, Y. Li, and Z. Liu, "Application of federated learning in manufacturing," ResearchGate, 2022. [Online]. Available: https://www.researchgate.net/publication/362591286_Application_of_federated_learning_in_manufacturing/figures?lo=1. [Accessed: Dec. 8, 2024].</a:t>
+            </a:r>
+          </a:p>
+          <a:p>
+            <a:pPr marL="0" indent="0">
+              <a:buNone/>
+            </a:pPr>
+            <a:r>
+              <a:rPr lang="en-US" sz="1800" dirty="0"/>
+              <a:t>[5] S. K. S. Gupta, M. Meena, and P. Agarwal, "Federated Learning and Its Applications in Intelligent Systems," Electronics, vol. 12, no. 12, p. 5806, Dec. 2023. [Online]. Available: https://www.mdpi.com/2076-3417/12/12/5806. [Accessed: Dec. 8, 2024].</a:t>
+            </a:r>
+          </a:p>
+          <a:p>
+            <a:pPr marL="0" indent="0">
+              <a:buNone/>
+            </a:pPr>
+            <a:endParaRPr lang="en-US" sz="1800" dirty="0"/>
+          </a:p>
+        </p:txBody>
+      </p:sp>
+      <p:sp>
+        <p:nvSpPr>
+          <p:cNvPr id="4" name="Slide Number Placeholder 3">
+            <a:extLst>
+              <a:ext uri="{FF2B5EF4-FFF2-40B4-BE49-F238E27FC236}">
+                <a16:creationId xmlns:a16="http://schemas.microsoft.com/office/drawing/2014/main" id="{3C4565E8-1A3F-4FD1-4AD3-94A007A7392D}"/>
+              </a:ext>
+            </a:extLst>
+          </p:cNvPr>
+          <p:cNvSpPr>
+            <a:spLocks noGrp="1"/>
+          </p:cNvSpPr>
+          <p:nvPr>
+            <p:ph type="sldNum" sz="quarter" idx="12"/>
+          </p:nvPr>
+        </p:nvSpPr>
+        <p:spPr/>
+        <p:txBody>
+          <a:bodyPr/>
+          <a:lstStyle/>
+          <a:p>
+            <a:fld id="{B487F271-60DF-4592-BB7F-B45BB4441AA9}" type="slidenum">
+              <a:rPr lang="en-US" smtClean="0"/>
+              <a:pPr/>
+              <a:t>15</a:t>
+            </a:fld>
+            <a:endParaRPr lang="en-US" dirty="0"/>
+          </a:p>
+        </p:txBody>
+      </p:sp>
+    </p:spTree>
+    <p:extLst>
+      <p:ext uri="{BB962C8B-B14F-4D97-AF65-F5344CB8AC3E}">
+        <p14:creationId xmlns:p14="http://schemas.microsoft.com/office/powerpoint/2010/main" val="3574490646"/>
+      </p:ext>
+    </p:extLst>
+  </p:cSld>
+  <p:clrMapOvr>
+    <a:masterClrMapping/>
+  </p:clrMapOvr>
+</p:sld>
+</file>
+
+<file path=ppt/slides/slide16.xml><?xml version="1.0" encoding="utf-8"?>
 <p:sld xmlns:a="http://schemas.openxmlformats.org/drawingml/2006/main" xmlns:r="http://schemas.openxmlformats.org/officeDocument/2006/relationships" xmlns:p="http://schemas.openxmlformats.org/presentationml/2006/main">
   <p:cSld>
     <p:spTree>
@@ -9547,1283 +10654,1314 @@
           </a:bodyPr>
           <a:lstStyle/>
           <a:p>
-            <a:r>
-              <a:rPr lang="en-US" sz="1800" dirty="0">
+            <a:pPr marL="0" indent="0">
+              <a:buNone/>
+            </a:pPr>
+            <a:r>
+              <a:rPr lang="en-US" sz="1800" b="1" dirty="0">
                 <a:effectLst/>
                 <a:latin typeface="Arial" panose="020B0604020202020204" pitchFamily="34" charset="0"/>
                 <a:ea typeface="Times New Roman" panose="02020603050405020304" pitchFamily="18" charset="0"/>
                 <a:cs typeface="Times New Roman" panose="02020603050405020304" pitchFamily="18" charset="0"/>
               </a:rPr>
-              <a:t>Federated Learning (FL), hay </a:t>
-            </a:r>
-            <a:r>
-              <a:rPr lang="en-US" sz="1800" dirty="0" err="1">
+              <a:t>Federated Learning (FL), </a:t>
+            </a:r>
+            <a:r>
+              <a:rPr lang="en-US" sz="1800" dirty="0">
                 <a:effectLst/>
                 <a:latin typeface="Arial" panose="020B0604020202020204" pitchFamily="34" charset="0"/>
                 <a:ea typeface="Times New Roman" panose="02020603050405020304" pitchFamily="18" charset="0"/>
                 <a:cs typeface="Times New Roman" panose="02020603050405020304" pitchFamily="18" charset="0"/>
               </a:rPr>
-              <a:t>còn</a:t>
-            </a:r>
-            <a:r>
-              <a:rPr lang="en-US" sz="1800" dirty="0">
+              <a:t>hay </a:t>
+            </a:r>
+            <a:r>
+              <a:rPr lang="en-US" sz="1800" dirty="0" err="1">
                 <a:effectLst/>
                 <a:latin typeface="Arial" panose="020B0604020202020204" pitchFamily="34" charset="0"/>
                 <a:ea typeface="Times New Roman" panose="02020603050405020304" pitchFamily="18" charset="0"/>
                 <a:cs typeface="Times New Roman" panose="02020603050405020304" pitchFamily="18" charset="0"/>
               </a:rPr>
-              <a:t> </a:t>
-            </a:r>
-            <a:r>
-              <a:rPr lang="en-US" sz="1800" dirty="0" err="1">
+              <a:t>còn</a:t>
+            </a:r>
+            <a:r>
+              <a:rPr lang="en-US" sz="1800" dirty="0">
                 <a:effectLst/>
                 <a:latin typeface="Arial" panose="020B0604020202020204" pitchFamily="34" charset="0"/>
                 <a:ea typeface="Times New Roman" panose="02020603050405020304" pitchFamily="18" charset="0"/>
                 <a:cs typeface="Times New Roman" panose="02020603050405020304" pitchFamily="18" charset="0"/>
               </a:rPr>
-              <a:t>gọi</a:t>
-            </a:r>
-            <a:r>
-              <a:rPr lang="en-US" sz="1800" dirty="0">
+              <a:t> </a:t>
+            </a:r>
+            <a:r>
+              <a:rPr lang="en-US" sz="1800" dirty="0" err="1">
                 <a:effectLst/>
                 <a:latin typeface="Arial" panose="020B0604020202020204" pitchFamily="34" charset="0"/>
                 <a:ea typeface="Times New Roman" panose="02020603050405020304" pitchFamily="18" charset="0"/>
                 <a:cs typeface="Times New Roman" panose="02020603050405020304" pitchFamily="18" charset="0"/>
               </a:rPr>
-              <a:t> </a:t>
-            </a:r>
-            <a:r>
-              <a:rPr lang="en-US" sz="1800" dirty="0" err="1">
+              <a:t>gọi</a:t>
+            </a:r>
+            <a:r>
+              <a:rPr lang="en-US" sz="1800" dirty="0">
                 <a:effectLst/>
                 <a:latin typeface="Arial" panose="020B0604020202020204" pitchFamily="34" charset="0"/>
                 <a:ea typeface="Times New Roman" panose="02020603050405020304" pitchFamily="18" charset="0"/>
                 <a:cs typeface="Times New Roman" panose="02020603050405020304" pitchFamily="18" charset="0"/>
               </a:rPr>
-              <a:t>là</a:t>
-            </a:r>
-            <a:r>
-              <a:rPr lang="en-US" sz="1800" dirty="0">
+              <a:t> </a:t>
+            </a:r>
+            <a:r>
+              <a:rPr lang="en-US" sz="1800" dirty="0" err="1">
                 <a:effectLst/>
                 <a:latin typeface="Arial" panose="020B0604020202020204" pitchFamily="34" charset="0"/>
                 <a:ea typeface="Times New Roman" panose="02020603050405020304" pitchFamily="18" charset="0"/>
                 <a:cs typeface="Times New Roman" panose="02020603050405020304" pitchFamily="18" charset="0"/>
               </a:rPr>
-              <a:t> </a:t>
-            </a:r>
-            <a:r>
-              <a:rPr lang="en-US" sz="1800" dirty="0" err="1">
+              <a:t>là</a:t>
+            </a:r>
+            <a:r>
+              <a:rPr lang="en-US" sz="1800" dirty="0">
                 <a:effectLst/>
                 <a:latin typeface="Arial" panose="020B0604020202020204" pitchFamily="34" charset="0"/>
                 <a:ea typeface="Times New Roman" panose="02020603050405020304" pitchFamily="18" charset="0"/>
                 <a:cs typeface="Times New Roman" panose="02020603050405020304" pitchFamily="18" charset="0"/>
               </a:rPr>
-              <a:t>học</a:t>
-            </a:r>
-            <a:r>
-              <a:rPr lang="en-US" sz="1800" dirty="0">
+              <a:t> </a:t>
+            </a:r>
+            <a:r>
+              <a:rPr lang="en-US" sz="1800" dirty="0" err="1">
                 <a:effectLst/>
                 <a:latin typeface="Arial" panose="020B0604020202020204" pitchFamily="34" charset="0"/>
                 <a:ea typeface="Times New Roman" panose="02020603050405020304" pitchFamily="18" charset="0"/>
                 <a:cs typeface="Times New Roman" panose="02020603050405020304" pitchFamily="18" charset="0"/>
               </a:rPr>
-              <a:t> </a:t>
-            </a:r>
-            <a:r>
-              <a:rPr lang="en-US" sz="1800" dirty="0" err="1">
+              <a:t>học</a:t>
+            </a:r>
+            <a:r>
+              <a:rPr lang="en-US" sz="1800" dirty="0">
                 <a:effectLst/>
                 <a:latin typeface="Arial" panose="020B0604020202020204" pitchFamily="34" charset="0"/>
                 <a:ea typeface="Times New Roman" panose="02020603050405020304" pitchFamily="18" charset="0"/>
                 <a:cs typeface="Times New Roman" panose="02020603050405020304" pitchFamily="18" charset="0"/>
               </a:rPr>
-              <a:t>liên</a:t>
-            </a:r>
-            <a:r>
-              <a:rPr lang="en-US" sz="1800" dirty="0">
+              <a:t> </a:t>
+            </a:r>
+            <a:r>
+              <a:rPr lang="en-US" sz="1800" dirty="0" err="1">
                 <a:effectLst/>
                 <a:latin typeface="Arial" panose="020B0604020202020204" pitchFamily="34" charset="0"/>
                 <a:ea typeface="Times New Roman" panose="02020603050405020304" pitchFamily="18" charset="0"/>
                 <a:cs typeface="Times New Roman" panose="02020603050405020304" pitchFamily="18" charset="0"/>
               </a:rPr>
-              <a:t> </a:t>
-            </a:r>
-            <a:r>
-              <a:rPr lang="en-US" sz="1800" dirty="0" err="1">
+              <a:t>liên</a:t>
+            </a:r>
+            <a:r>
+              <a:rPr lang="en-US" sz="1800" dirty="0">
                 <a:effectLst/>
                 <a:latin typeface="Arial" panose="020B0604020202020204" pitchFamily="34" charset="0"/>
                 <a:ea typeface="Times New Roman" panose="02020603050405020304" pitchFamily="18" charset="0"/>
                 <a:cs typeface="Times New Roman" panose="02020603050405020304" pitchFamily="18" charset="0"/>
               </a:rPr>
-              <a:t>kết</a:t>
-            </a:r>
-            <a:r>
-              <a:rPr lang="en-US" sz="1800" dirty="0">
+              <a:t> </a:t>
+            </a:r>
+            <a:r>
+              <a:rPr lang="en-US" sz="1800" dirty="0" err="1">
                 <a:effectLst/>
                 <a:latin typeface="Arial" panose="020B0604020202020204" pitchFamily="34" charset="0"/>
                 <a:ea typeface="Times New Roman" panose="02020603050405020304" pitchFamily="18" charset="0"/>
                 <a:cs typeface="Times New Roman" panose="02020603050405020304" pitchFamily="18" charset="0"/>
               </a:rPr>
-              <a:t>, </a:t>
-            </a:r>
-            <a:r>
-              <a:rPr lang="en-US" sz="1800" dirty="0" err="1">
+              <a:t>kết</a:t>
+            </a:r>
+            <a:r>
+              <a:rPr lang="en-US" sz="1800" dirty="0">
                 <a:effectLst/>
                 <a:latin typeface="Arial" panose="020B0604020202020204" pitchFamily="34" charset="0"/>
                 <a:ea typeface="Times New Roman" panose="02020603050405020304" pitchFamily="18" charset="0"/>
                 <a:cs typeface="Times New Roman" panose="02020603050405020304" pitchFamily="18" charset="0"/>
               </a:rPr>
-              <a:t>là</a:t>
-            </a:r>
-            <a:r>
-              <a:rPr lang="en-US" sz="1800" dirty="0">
+              <a:t>, </a:t>
+            </a:r>
+            <a:r>
+              <a:rPr lang="en-US" sz="1800" dirty="0" err="1">
                 <a:effectLst/>
                 <a:latin typeface="Arial" panose="020B0604020202020204" pitchFamily="34" charset="0"/>
                 <a:ea typeface="Times New Roman" panose="02020603050405020304" pitchFamily="18" charset="0"/>
                 <a:cs typeface="Times New Roman" panose="02020603050405020304" pitchFamily="18" charset="0"/>
               </a:rPr>
-              <a:t> </a:t>
-            </a:r>
-            <a:r>
-              <a:rPr lang="en-US" sz="1800" dirty="0" err="1">
+              <a:t>là</a:t>
+            </a:r>
+            <a:r>
+              <a:rPr lang="en-US" sz="1800" dirty="0">
                 <a:effectLst/>
                 <a:latin typeface="Arial" panose="020B0604020202020204" pitchFamily="34" charset="0"/>
                 <a:ea typeface="Times New Roman" panose="02020603050405020304" pitchFamily="18" charset="0"/>
                 <a:cs typeface="Times New Roman" panose="02020603050405020304" pitchFamily="18" charset="0"/>
               </a:rPr>
-              <a:t>một</a:t>
-            </a:r>
-            <a:r>
-              <a:rPr lang="en-US" sz="1800" dirty="0">
+              <a:t> </a:t>
+            </a:r>
+            <a:r>
+              <a:rPr lang="en-US" sz="1800" dirty="0" err="1">
                 <a:effectLst/>
                 <a:latin typeface="Arial" panose="020B0604020202020204" pitchFamily="34" charset="0"/>
                 <a:ea typeface="Times New Roman" panose="02020603050405020304" pitchFamily="18" charset="0"/>
                 <a:cs typeface="Times New Roman" panose="02020603050405020304" pitchFamily="18" charset="0"/>
               </a:rPr>
-              <a:t> </a:t>
-            </a:r>
-            <a:r>
-              <a:rPr lang="en-US" sz="1800" dirty="0" err="1">
+              <a:t>một</a:t>
+            </a:r>
+            <a:r>
+              <a:rPr lang="en-US" sz="1800" dirty="0">
                 <a:effectLst/>
                 <a:latin typeface="Arial" panose="020B0604020202020204" pitchFamily="34" charset="0"/>
                 <a:ea typeface="Times New Roman" panose="02020603050405020304" pitchFamily="18" charset="0"/>
                 <a:cs typeface="Times New Roman" panose="02020603050405020304" pitchFamily="18" charset="0"/>
               </a:rPr>
-              <a:t>phương</a:t>
-            </a:r>
-            <a:r>
-              <a:rPr lang="en-US" sz="1800" dirty="0">
+              <a:t> </a:t>
+            </a:r>
+            <a:r>
+              <a:rPr lang="en-US" sz="1800" dirty="0" err="1">
                 <a:effectLst/>
                 <a:latin typeface="Arial" panose="020B0604020202020204" pitchFamily="34" charset="0"/>
                 <a:ea typeface="Times New Roman" panose="02020603050405020304" pitchFamily="18" charset="0"/>
                 <a:cs typeface="Times New Roman" panose="02020603050405020304" pitchFamily="18" charset="0"/>
               </a:rPr>
-              <a:t> </a:t>
-            </a:r>
-            <a:r>
-              <a:rPr lang="en-US" sz="1800" dirty="0" err="1">
+              <a:t>phương</a:t>
+            </a:r>
+            <a:r>
+              <a:rPr lang="en-US" sz="1800" dirty="0">
                 <a:effectLst/>
                 <a:latin typeface="Arial" panose="020B0604020202020204" pitchFamily="34" charset="0"/>
                 <a:ea typeface="Times New Roman" panose="02020603050405020304" pitchFamily="18" charset="0"/>
                 <a:cs typeface="Times New Roman" panose="02020603050405020304" pitchFamily="18" charset="0"/>
               </a:rPr>
-              <a:t>pháp</a:t>
-            </a:r>
-            <a:r>
-              <a:rPr lang="en-US" sz="1800" dirty="0">
+              <a:t> </a:t>
+            </a:r>
+            <a:r>
+              <a:rPr lang="en-US" sz="1800" dirty="0" err="1">
                 <a:effectLst/>
                 <a:latin typeface="Arial" panose="020B0604020202020204" pitchFamily="34" charset="0"/>
                 <a:ea typeface="Times New Roman" panose="02020603050405020304" pitchFamily="18" charset="0"/>
                 <a:cs typeface="Times New Roman" panose="02020603050405020304" pitchFamily="18" charset="0"/>
               </a:rPr>
-              <a:t> </a:t>
-            </a:r>
-            <a:r>
-              <a:rPr lang="en-US" sz="1800" dirty="0" err="1">
+              <a:t>pháp</a:t>
+            </a:r>
+            <a:r>
+              <a:rPr lang="en-US" sz="1800" dirty="0">
                 <a:effectLst/>
                 <a:latin typeface="Arial" panose="020B0604020202020204" pitchFamily="34" charset="0"/>
                 <a:ea typeface="Times New Roman" panose="02020603050405020304" pitchFamily="18" charset="0"/>
                 <a:cs typeface="Times New Roman" panose="02020603050405020304" pitchFamily="18" charset="0"/>
               </a:rPr>
-              <a:t>học</a:t>
-            </a:r>
-            <a:r>
-              <a:rPr lang="en-US" sz="1800" dirty="0">
+              <a:t> </a:t>
+            </a:r>
+            <a:r>
+              <a:rPr lang="en-US" sz="1800" dirty="0" err="1">
                 <a:effectLst/>
                 <a:latin typeface="Arial" panose="020B0604020202020204" pitchFamily="34" charset="0"/>
                 <a:ea typeface="Times New Roman" panose="02020603050405020304" pitchFamily="18" charset="0"/>
                 <a:cs typeface="Times New Roman" panose="02020603050405020304" pitchFamily="18" charset="0"/>
               </a:rPr>
-              <a:t> </a:t>
-            </a:r>
-            <a:r>
-              <a:rPr lang="en-US" sz="1800" dirty="0" err="1">
+              <a:t>học</a:t>
+            </a:r>
+            <a:r>
+              <a:rPr lang="en-US" sz="1800" dirty="0">
                 <a:effectLst/>
                 <a:latin typeface="Arial" panose="020B0604020202020204" pitchFamily="34" charset="0"/>
                 <a:ea typeface="Times New Roman" panose="02020603050405020304" pitchFamily="18" charset="0"/>
                 <a:cs typeface="Times New Roman" panose="02020603050405020304" pitchFamily="18" charset="0"/>
               </a:rPr>
-              <a:t>máy</a:t>
-            </a:r>
-            <a:r>
-              <a:rPr lang="en-US" sz="1800" dirty="0">
+              <a:t> </a:t>
+            </a:r>
+            <a:r>
+              <a:rPr lang="en-US" sz="1800" dirty="0" err="1">
                 <a:effectLst/>
                 <a:latin typeface="Arial" panose="020B0604020202020204" pitchFamily="34" charset="0"/>
                 <a:ea typeface="Times New Roman" panose="02020603050405020304" pitchFamily="18" charset="0"/>
                 <a:cs typeface="Times New Roman" panose="02020603050405020304" pitchFamily="18" charset="0"/>
               </a:rPr>
-              <a:t> </a:t>
-            </a:r>
-            <a:r>
-              <a:rPr lang="en-US" sz="1800" dirty="0" err="1">
+              <a:t>máy</a:t>
+            </a:r>
+            <a:r>
+              <a:rPr lang="en-US" sz="1800" dirty="0">
                 <a:effectLst/>
                 <a:latin typeface="Arial" panose="020B0604020202020204" pitchFamily="34" charset="0"/>
                 <a:ea typeface="Times New Roman" panose="02020603050405020304" pitchFamily="18" charset="0"/>
                 <a:cs typeface="Times New Roman" panose="02020603050405020304" pitchFamily="18" charset="0"/>
               </a:rPr>
-              <a:t>phân</a:t>
-            </a:r>
-            <a:r>
-              <a:rPr lang="en-US" sz="1800" dirty="0">
+              <a:t> </a:t>
+            </a:r>
+            <a:r>
+              <a:rPr lang="en-US" sz="1800" dirty="0" err="1">
                 <a:effectLst/>
                 <a:latin typeface="Arial" panose="020B0604020202020204" pitchFamily="34" charset="0"/>
                 <a:ea typeface="Times New Roman" panose="02020603050405020304" pitchFamily="18" charset="0"/>
                 <a:cs typeface="Times New Roman" panose="02020603050405020304" pitchFamily="18" charset="0"/>
               </a:rPr>
-              <a:t> </a:t>
-            </a:r>
-            <a:r>
-              <a:rPr lang="en-US" sz="1800" dirty="0" err="1">
+              <a:t>phân</a:t>
+            </a:r>
+            <a:r>
+              <a:rPr lang="en-US" sz="1800" dirty="0">
                 <a:effectLst/>
                 <a:latin typeface="Arial" panose="020B0604020202020204" pitchFamily="34" charset="0"/>
                 <a:ea typeface="Times New Roman" panose="02020603050405020304" pitchFamily="18" charset="0"/>
                 <a:cs typeface="Times New Roman" panose="02020603050405020304" pitchFamily="18" charset="0"/>
               </a:rPr>
-              <a:t>tán</a:t>
-            </a:r>
-            <a:r>
-              <a:rPr lang="en-US" sz="1800" dirty="0">
+              <a:t> </a:t>
+            </a:r>
+            <a:r>
+              <a:rPr lang="en-US" sz="1800" dirty="0" err="1">
                 <a:effectLst/>
                 <a:latin typeface="Arial" panose="020B0604020202020204" pitchFamily="34" charset="0"/>
                 <a:ea typeface="Times New Roman" panose="02020603050405020304" pitchFamily="18" charset="0"/>
                 <a:cs typeface="Times New Roman" panose="02020603050405020304" pitchFamily="18" charset="0"/>
               </a:rPr>
-              <a:t>, </a:t>
-            </a:r>
-            <a:r>
-              <a:rPr lang="en-US" sz="1800" dirty="0" err="1">
+              <a:t>tán</a:t>
+            </a:r>
+            <a:r>
+              <a:rPr lang="en-US" sz="1800" dirty="0">
                 <a:effectLst/>
                 <a:latin typeface="Arial" panose="020B0604020202020204" pitchFamily="34" charset="0"/>
                 <a:ea typeface="Times New Roman" panose="02020603050405020304" pitchFamily="18" charset="0"/>
                 <a:cs typeface="Times New Roman" panose="02020603050405020304" pitchFamily="18" charset="0"/>
               </a:rPr>
-              <a:t>trong</a:t>
-            </a:r>
-            <a:r>
-              <a:rPr lang="en-US" sz="1800" dirty="0">
+              <a:t>, </a:t>
+            </a:r>
+            <a:r>
+              <a:rPr lang="en-US" sz="1800" dirty="0" err="1">
                 <a:effectLst/>
                 <a:latin typeface="Arial" panose="020B0604020202020204" pitchFamily="34" charset="0"/>
                 <a:ea typeface="Times New Roman" panose="02020603050405020304" pitchFamily="18" charset="0"/>
                 <a:cs typeface="Times New Roman" panose="02020603050405020304" pitchFamily="18" charset="0"/>
               </a:rPr>
-              <a:t> </a:t>
-            </a:r>
-            <a:r>
-              <a:rPr lang="en-US" sz="1800" dirty="0" err="1">
+              <a:t>trong</a:t>
+            </a:r>
+            <a:r>
+              <a:rPr lang="en-US" sz="1800" dirty="0">
                 <a:effectLst/>
                 <a:latin typeface="Arial" panose="020B0604020202020204" pitchFamily="34" charset="0"/>
                 <a:ea typeface="Times New Roman" panose="02020603050405020304" pitchFamily="18" charset="0"/>
                 <a:cs typeface="Times New Roman" panose="02020603050405020304" pitchFamily="18" charset="0"/>
               </a:rPr>
-              <a:t>đó</a:t>
-            </a:r>
-            <a:r>
-              <a:rPr lang="en-US" sz="1800" dirty="0">
+              <a:t> </a:t>
+            </a:r>
+            <a:r>
+              <a:rPr lang="en-US" sz="1800" dirty="0" err="1">
                 <a:effectLst/>
                 <a:latin typeface="Arial" panose="020B0604020202020204" pitchFamily="34" charset="0"/>
                 <a:ea typeface="Times New Roman" panose="02020603050405020304" pitchFamily="18" charset="0"/>
                 <a:cs typeface="Times New Roman" panose="02020603050405020304" pitchFamily="18" charset="0"/>
               </a:rPr>
-              <a:t> </a:t>
-            </a:r>
-            <a:r>
-              <a:rPr lang="en-US" sz="1800" dirty="0" err="1">
+              <a:t>đó</a:t>
+            </a:r>
+            <a:r>
+              <a:rPr lang="en-US" sz="1800" dirty="0">
                 <a:effectLst/>
                 <a:latin typeface="Arial" panose="020B0604020202020204" pitchFamily="34" charset="0"/>
                 <a:ea typeface="Times New Roman" panose="02020603050405020304" pitchFamily="18" charset="0"/>
                 <a:cs typeface="Times New Roman" panose="02020603050405020304" pitchFamily="18" charset="0"/>
               </a:rPr>
-              <a:t>các</a:t>
-            </a:r>
-            <a:r>
-              <a:rPr lang="en-US" sz="1800" dirty="0">
+              <a:t> </a:t>
+            </a:r>
+            <a:r>
+              <a:rPr lang="en-US" sz="1800" dirty="0" err="1">
                 <a:effectLst/>
                 <a:latin typeface="Arial" panose="020B0604020202020204" pitchFamily="34" charset="0"/>
                 <a:ea typeface="Times New Roman" panose="02020603050405020304" pitchFamily="18" charset="0"/>
                 <a:cs typeface="Times New Roman" panose="02020603050405020304" pitchFamily="18" charset="0"/>
               </a:rPr>
-              <a:t> </a:t>
-            </a:r>
-            <a:r>
-              <a:rPr lang="en-US" sz="1800" dirty="0" err="1">
+              <a:t>các</a:t>
+            </a:r>
+            <a:r>
+              <a:rPr lang="en-US" sz="1800" dirty="0">
                 <a:effectLst/>
                 <a:latin typeface="Arial" panose="020B0604020202020204" pitchFamily="34" charset="0"/>
                 <a:ea typeface="Times New Roman" panose="02020603050405020304" pitchFamily="18" charset="0"/>
                 <a:cs typeface="Times New Roman" panose="02020603050405020304" pitchFamily="18" charset="0"/>
               </a:rPr>
-              <a:t>mô</a:t>
-            </a:r>
-            <a:r>
-              <a:rPr lang="en-US" sz="1800" dirty="0">
+              <a:t> </a:t>
+            </a:r>
+            <a:r>
+              <a:rPr lang="en-US" sz="1800" dirty="0" err="1">
                 <a:effectLst/>
                 <a:latin typeface="Arial" panose="020B0604020202020204" pitchFamily="34" charset="0"/>
                 <a:ea typeface="Times New Roman" panose="02020603050405020304" pitchFamily="18" charset="0"/>
                 <a:cs typeface="Times New Roman" panose="02020603050405020304" pitchFamily="18" charset="0"/>
               </a:rPr>
-              <a:t> </a:t>
-            </a:r>
-            <a:r>
-              <a:rPr lang="en-US" sz="1800" dirty="0" err="1">
+              <a:t>mô</a:t>
+            </a:r>
+            <a:r>
+              <a:rPr lang="en-US" sz="1800" dirty="0">
                 <a:effectLst/>
                 <a:latin typeface="Arial" panose="020B0604020202020204" pitchFamily="34" charset="0"/>
                 <a:ea typeface="Times New Roman" panose="02020603050405020304" pitchFamily="18" charset="0"/>
                 <a:cs typeface="Times New Roman" panose="02020603050405020304" pitchFamily="18" charset="0"/>
               </a:rPr>
-              <a:t>hình</a:t>
-            </a:r>
-            <a:r>
-              <a:rPr lang="en-US" sz="1800" dirty="0">
+              <a:t> </a:t>
+            </a:r>
+            <a:r>
+              <a:rPr lang="en-US" sz="1800" dirty="0" err="1">
                 <a:effectLst/>
                 <a:latin typeface="Arial" panose="020B0604020202020204" pitchFamily="34" charset="0"/>
                 <a:ea typeface="Times New Roman" panose="02020603050405020304" pitchFamily="18" charset="0"/>
                 <a:cs typeface="Times New Roman" panose="02020603050405020304" pitchFamily="18" charset="0"/>
               </a:rPr>
-              <a:t> </a:t>
-            </a:r>
-            <a:r>
-              <a:rPr lang="en-US" sz="1800" dirty="0" err="1">
+              <a:t>hình</a:t>
+            </a:r>
+            <a:r>
+              <a:rPr lang="en-US" sz="1800" dirty="0">
                 <a:effectLst/>
                 <a:latin typeface="Arial" panose="020B0604020202020204" pitchFamily="34" charset="0"/>
                 <a:ea typeface="Times New Roman" panose="02020603050405020304" pitchFamily="18" charset="0"/>
                 <a:cs typeface="Times New Roman" panose="02020603050405020304" pitchFamily="18" charset="0"/>
               </a:rPr>
-              <a:t>được</a:t>
-            </a:r>
-            <a:r>
-              <a:rPr lang="en-US" sz="1800" dirty="0">
+              <a:t> </a:t>
+            </a:r>
+            <a:r>
+              <a:rPr lang="en-US" sz="1800" dirty="0" err="1">
                 <a:effectLst/>
                 <a:latin typeface="Arial" panose="020B0604020202020204" pitchFamily="34" charset="0"/>
                 <a:ea typeface="Times New Roman" panose="02020603050405020304" pitchFamily="18" charset="0"/>
                 <a:cs typeface="Times New Roman" panose="02020603050405020304" pitchFamily="18" charset="0"/>
               </a:rPr>
-              <a:t> </a:t>
-            </a:r>
-            <a:r>
-              <a:rPr lang="en-US" sz="1800" dirty="0" err="1">
+              <a:t>được</a:t>
+            </a:r>
+            <a:r>
+              <a:rPr lang="en-US" sz="1800" dirty="0">
                 <a:effectLst/>
                 <a:latin typeface="Arial" panose="020B0604020202020204" pitchFamily="34" charset="0"/>
                 <a:ea typeface="Times New Roman" panose="02020603050405020304" pitchFamily="18" charset="0"/>
                 <a:cs typeface="Times New Roman" panose="02020603050405020304" pitchFamily="18" charset="0"/>
               </a:rPr>
-              <a:t>huấn</a:t>
-            </a:r>
-            <a:r>
-              <a:rPr lang="en-US" sz="1800" dirty="0">
+              <a:t> </a:t>
+            </a:r>
+            <a:r>
+              <a:rPr lang="en-US" sz="1800" dirty="0" err="1">
                 <a:effectLst/>
                 <a:latin typeface="Arial" panose="020B0604020202020204" pitchFamily="34" charset="0"/>
                 <a:ea typeface="Times New Roman" panose="02020603050405020304" pitchFamily="18" charset="0"/>
                 <a:cs typeface="Times New Roman" panose="02020603050405020304" pitchFamily="18" charset="0"/>
               </a:rPr>
-              <a:t> </a:t>
-            </a:r>
-            <a:r>
-              <a:rPr lang="en-US" sz="1800" dirty="0" err="1">
+              <a:t>huấn</a:t>
+            </a:r>
+            <a:r>
+              <a:rPr lang="en-US" sz="1800" dirty="0">
                 <a:effectLst/>
                 <a:latin typeface="Arial" panose="020B0604020202020204" pitchFamily="34" charset="0"/>
                 <a:ea typeface="Times New Roman" panose="02020603050405020304" pitchFamily="18" charset="0"/>
                 <a:cs typeface="Times New Roman" panose="02020603050405020304" pitchFamily="18" charset="0"/>
               </a:rPr>
-              <a:t>luyện</a:t>
-            </a:r>
-            <a:r>
-              <a:rPr lang="en-US" sz="1800" dirty="0">
+              <a:t> </a:t>
+            </a:r>
+            <a:r>
+              <a:rPr lang="en-US" sz="1800" dirty="0" err="1">
                 <a:effectLst/>
                 <a:latin typeface="Arial" panose="020B0604020202020204" pitchFamily="34" charset="0"/>
                 <a:ea typeface="Times New Roman" panose="02020603050405020304" pitchFamily="18" charset="0"/>
                 <a:cs typeface="Times New Roman" panose="02020603050405020304" pitchFamily="18" charset="0"/>
               </a:rPr>
-              <a:t> </a:t>
-            </a:r>
-            <a:r>
-              <a:rPr lang="en-US" sz="1800" dirty="0" err="1">
+              <a:t>luyện</a:t>
+            </a:r>
+            <a:r>
+              <a:rPr lang="en-US" sz="1800" dirty="0">
                 <a:effectLst/>
                 <a:latin typeface="Arial" panose="020B0604020202020204" pitchFamily="34" charset="0"/>
                 <a:ea typeface="Times New Roman" panose="02020603050405020304" pitchFamily="18" charset="0"/>
                 <a:cs typeface="Times New Roman" panose="02020603050405020304" pitchFamily="18" charset="0"/>
               </a:rPr>
-              <a:t>trên</a:t>
-            </a:r>
-            <a:r>
-              <a:rPr lang="en-US" sz="1800" dirty="0">
+              <a:t> </a:t>
+            </a:r>
+            <a:r>
+              <a:rPr lang="en-US" sz="1800" dirty="0" err="1">
                 <a:effectLst/>
                 <a:latin typeface="Arial" panose="020B0604020202020204" pitchFamily="34" charset="0"/>
                 <a:ea typeface="Times New Roman" panose="02020603050405020304" pitchFamily="18" charset="0"/>
                 <a:cs typeface="Times New Roman" panose="02020603050405020304" pitchFamily="18" charset="0"/>
               </a:rPr>
-              <a:t> </a:t>
-            </a:r>
-            <a:r>
-              <a:rPr lang="en-US" sz="1800" dirty="0" err="1">
+              <a:t>trên</a:t>
+            </a:r>
+            <a:r>
+              <a:rPr lang="en-US" sz="1800" dirty="0">
                 <a:effectLst/>
                 <a:latin typeface="Arial" panose="020B0604020202020204" pitchFamily="34" charset="0"/>
                 <a:ea typeface="Times New Roman" panose="02020603050405020304" pitchFamily="18" charset="0"/>
                 <a:cs typeface="Times New Roman" panose="02020603050405020304" pitchFamily="18" charset="0"/>
               </a:rPr>
-              <a:t>nhiều</a:t>
-            </a:r>
-            <a:r>
-              <a:rPr lang="en-US" sz="1800" dirty="0">
+              <a:t> </a:t>
+            </a:r>
+            <a:r>
+              <a:rPr lang="en-US" sz="1800" dirty="0" err="1">
                 <a:effectLst/>
                 <a:latin typeface="Arial" panose="020B0604020202020204" pitchFamily="34" charset="0"/>
                 <a:ea typeface="Times New Roman" panose="02020603050405020304" pitchFamily="18" charset="0"/>
                 <a:cs typeface="Times New Roman" panose="02020603050405020304" pitchFamily="18" charset="0"/>
               </a:rPr>
-              <a:t> </a:t>
-            </a:r>
-            <a:r>
-              <a:rPr lang="en-US" sz="1800" dirty="0" err="1">
+              <a:t>nhiều</a:t>
+            </a:r>
+            <a:r>
+              <a:rPr lang="en-US" sz="1800" dirty="0">
                 <a:effectLst/>
                 <a:latin typeface="Arial" panose="020B0604020202020204" pitchFamily="34" charset="0"/>
                 <a:ea typeface="Times New Roman" panose="02020603050405020304" pitchFamily="18" charset="0"/>
                 <a:cs typeface="Times New Roman" panose="02020603050405020304" pitchFamily="18" charset="0"/>
               </a:rPr>
-              <a:t>thiết</a:t>
-            </a:r>
-            <a:r>
-              <a:rPr lang="en-US" sz="1800" dirty="0">
+              <a:t> </a:t>
+            </a:r>
+            <a:r>
+              <a:rPr lang="en-US" sz="1800" dirty="0" err="1">
                 <a:effectLst/>
                 <a:latin typeface="Arial" panose="020B0604020202020204" pitchFamily="34" charset="0"/>
                 <a:ea typeface="Times New Roman" panose="02020603050405020304" pitchFamily="18" charset="0"/>
                 <a:cs typeface="Times New Roman" panose="02020603050405020304" pitchFamily="18" charset="0"/>
               </a:rPr>
-              <a:t> </a:t>
-            </a:r>
-            <a:r>
-              <a:rPr lang="en-US" sz="1800" dirty="0" err="1">
+              <a:t>thiết</a:t>
+            </a:r>
+            <a:r>
+              <a:rPr lang="en-US" sz="1800" dirty="0">
                 <a:effectLst/>
                 <a:latin typeface="Arial" panose="020B0604020202020204" pitchFamily="34" charset="0"/>
                 <a:ea typeface="Times New Roman" panose="02020603050405020304" pitchFamily="18" charset="0"/>
                 <a:cs typeface="Times New Roman" panose="02020603050405020304" pitchFamily="18" charset="0"/>
               </a:rPr>
-              <a:t>bị</a:t>
-            </a:r>
-            <a:r>
-              <a:rPr lang="en-US" sz="1800" dirty="0">
+              <a:t> </a:t>
+            </a:r>
+            <a:r>
+              <a:rPr lang="en-US" sz="1800" dirty="0" err="1">
                 <a:effectLst/>
                 <a:latin typeface="Arial" panose="020B0604020202020204" pitchFamily="34" charset="0"/>
                 <a:ea typeface="Times New Roman" panose="02020603050405020304" pitchFamily="18" charset="0"/>
                 <a:cs typeface="Times New Roman" panose="02020603050405020304" pitchFamily="18" charset="0"/>
               </a:rPr>
-              <a:t> </a:t>
-            </a:r>
-            <a:r>
-              <a:rPr lang="en-US" sz="1800" dirty="0" err="1">
+              <a:t>bị</a:t>
+            </a:r>
+            <a:r>
+              <a:rPr lang="en-US" sz="1800" dirty="0">
                 <a:effectLst/>
                 <a:latin typeface="Arial" panose="020B0604020202020204" pitchFamily="34" charset="0"/>
                 <a:ea typeface="Times New Roman" panose="02020603050405020304" pitchFamily="18" charset="0"/>
                 <a:cs typeface="Times New Roman" panose="02020603050405020304" pitchFamily="18" charset="0"/>
               </a:rPr>
-              <a:t>hoặc</a:t>
-            </a:r>
-            <a:r>
-              <a:rPr lang="en-US" sz="1800" dirty="0">
+              <a:t> </a:t>
+            </a:r>
+            <a:r>
+              <a:rPr lang="en-US" sz="1800" dirty="0" err="1">
                 <a:effectLst/>
                 <a:latin typeface="Arial" panose="020B0604020202020204" pitchFamily="34" charset="0"/>
                 <a:ea typeface="Times New Roman" panose="02020603050405020304" pitchFamily="18" charset="0"/>
                 <a:cs typeface="Times New Roman" panose="02020603050405020304" pitchFamily="18" charset="0"/>
               </a:rPr>
-              <a:t> </a:t>
-            </a:r>
-            <a:r>
-              <a:rPr lang="en-US" sz="1800" dirty="0" err="1">
+              <a:t>hoặc</a:t>
+            </a:r>
+            <a:r>
+              <a:rPr lang="en-US" sz="1800" dirty="0">
                 <a:effectLst/>
                 <a:latin typeface="Arial" panose="020B0604020202020204" pitchFamily="34" charset="0"/>
                 <a:ea typeface="Times New Roman" panose="02020603050405020304" pitchFamily="18" charset="0"/>
                 <a:cs typeface="Times New Roman" panose="02020603050405020304" pitchFamily="18" charset="0"/>
               </a:rPr>
-              <a:t>máy</a:t>
-            </a:r>
-            <a:r>
-              <a:rPr lang="en-US" sz="1800" dirty="0">
+              <a:t> </a:t>
+            </a:r>
+            <a:r>
+              <a:rPr lang="en-US" sz="1800" dirty="0" err="1">
                 <a:effectLst/>
                 <a:latin typeface="Arial" panose="020B0604020202020204" pitchFamily="34" charset="0"/>
                 <a:ea typeface="Times New Roman" panose="02020603050405020304" pitchFamily="18" charset="0"/>
                 <a:cs typeface="Times New Roman" panose="02020603050405020304" pitchFamily="18" charset="0"/>
               </a:rPr>
-              <a:t> </a:t>
-            </a:r>
-            <a:r>
-              <a:rPr lang="en-US" sz="1800" dirty="0" err="1">
+              <a:t>máy</a:t>
+            </a:r>
+            <a:r>
+              <a:rPr lang="en-US" sz="1800" dirty="0">
                 <a:effectLst/>
                 <a:latin typeface="Arial" panose="020B0604020202020204" pitchFamily="34" charset="0"/>
                 <a:ea typeface="Times New Roman" panose="02020603050405020304" pitchFamily="18" charset="0"/>
                 <a:cs typeface="Times New Roman" panose="02020603050405020304" pitchFamily="18" charset="0"/>
               </a:rPr>
-              <a:t>chủ</a:t>
-            </a:r>
-            <a:r>
-              <a:rPr lang="en-US" sz="1800" dirty="0">
+              <a:t> </a:t>
+            </a:r>
+            <a:r>
+              <a:rPr lang="en-US" sz="1800" dirty="0" err="1">
                 <a:effectLst/>
                 <a:latin typeface="Arial" panose="020B0604020202020204" pitchFamily="34" charset="0"/>
                 <a:ea typeface="Times New Roman" panose="02020603050405020304" pitchFamily="18" charset="0"/>
                 <a:cs typeface="Times New Roman" panose="02020603050405020304" pitchFamily="18" charset="0"/>
               </a:rPr>
-              <a:t> </a:t>
-            </a:r>
-            <a:r>
-              <a:rPr lang="en-US" sz="1800" dirty="0" err="1">
+              <a:t>chủ</a:t>
+            </a:r>
+            <a:r>
+              <a:rPr lang="en-US" sz="1800" dirty="0">
                 <a:effectLst/>
                 <a:latin typeface="Arial" panose="020B0604020202020204" pitchFamily="34" charset="0"/>
                 <a:ea typeface="Times New Roman" panose="02020603050405020304" pitchFamily="18" charset="0"/>
                 <a:cs typeface="Times New Roman" panose="02020603050405020304" pitchFamily="18" charset="0"/>
               </a:rPr>
-              <a:t>mà</a:t>
-            </a:r>
-            <a:r>
-              <a:rPr lang="en-US" sz="1800" dirty="0">
+              <a:t> </a:t>
+            </a:r>
+            <a:r>
+              <a:rPr lang="en-US" sz="1800" dirty="0" err="1">
                 <a:effectLst/>
                 <a:latin typeface="Arial" panose="020B0604020202020204" pitchFamily="34" charset="0"/>
                 <a:ea typeface="Times New Roman" panose="02020603050405020304" pitchFamily="18" charset="0"/>
                 <a:cs typeface="Times New Roman" panose="02020603050405020304" pitchFamily="18" charset="0"/>
               </a:rPr>
-              <a:t> </a:t>
-            </a:r>
-            <a:r>
-              <a:rPr lang="en-US" sz="1800" dirty="0" err="1">
+              <a:t>mà</a:t>
+            </a:r>
+            <a:r>
+              <a:rPr lang="en-US" sz="1800" dirty="0">
                 <a:effectLst/>
                 <a:latin typeface="Arial" panose="020B0604020202020204" pitchFamily="34" charset="0"/>
                 <a:ea typeface="Times New Roman" panose="02020603050405020304" pitchFamily="18" charset="0"/>
                 <a:cs typeface="Times New Roman" panose="02020603050405020304" pitchFamily="18" charset="0"/>
               </a:rPr>
-              <a:t>không</a:t>
-            </a:r>
-            <a:r>
-              <a:rPr lang="en-US" sz="1800" dirty="0">
+              <a:t> </a:t>
+            </a:r>
+            <a:r>
+              <a:rPr lang="en-US" sz="1800" dirty="0" err="1">
                 <a:effectLst/>
                 <a:latin typeface="Arial" panose="020B0604020202020204" pitchFamily="34" charset="0"/>
                 <a:ea typeface="Times New Roman" panose="02020603050405020304" pitchFamily="18" charset="0"/>
                 <a:cs typeface="Times New Roman" panose="02020603050405020304" pitchFamily="18" charset="0"/>
               </a:rPr>
-              <a:t> </a:t>
-            </a:r>
-            <a:r>
-              <a:rPr lang="en-US" sz="1800" dirty="0" err="1">
+              <a:t>không</a:t>
+            </a:r>
+            <a:r>
+              <a:rPr lang="en-US" sz="1800" dirty="0">
                 <a:effectLst/>
                 <a:latin typeface="Arial" panose="020B0604020202020204" pitchFamily="34" charset="0"/>
                 <a:ea typeface="Times New Roman" panose="02020603050405020304" pitchFamily="18" charset="0"/>
                 <a:cs typeface="Times New Roman" panose="02020603050405020304" pitchFamily="18" charset="0"/>
               </a:rPr>
-              <a:t>cần</a:t>
-            </a:r>
-            <a:r>
-              <a:rPr lang="en-US" sz="1800" dirty="0">
+              <a:t> </a:t>
+            </a:r>
+            <a:r>
+              <a:rPr lang="en-US" sz="1800" dirty="0" err="1">
                 <a:effectLst/>
                 <a:latin typeface="Arial" panose="020B0604020202020204" pitchFamily="34" charset="0"/>
                 <a:ea typeface="Times New Roman" panose="02020603050405020304" pitchFamily="18" charset="0"/>
                 <a:cs typeface="Times New Roman" panose="02020603050405020304" pitchFamily="18" charset="0"/>
               </a:rPr>
-              <a:t> </a:t>
-            </a:r>
-            <a:r>
-              <a:rPr lang="en-US" sz="1800" dirty="0" err="1">
+              <a:t>cần</a:t>
+            </a:r>
+            <a:r>
+              <a:rPr lang="en-US" sz="1800" dirty="0">
                 <a:effectLst/>
                 <a:latin typeface="Arial" panose="020B0604020202020204" pitchFamily="34" charset="0"/>
                 <a:ea typeface="Times New Roman" panose="02020603050405020304" pitchFamily="18" charset="0"/>
                 <a:cs typeface="Times New Roman" panose="02020603050405020304" pitchFamily="18" charset="0"/>
               </a:rPr>
-              <a:t>tập</a:t>
-            </a:r>
-            <a:r>
-              <a:rPr lang="en-US" sz="1800" dirty="0">
+              <a:t> </a:t>
+            </a:r>
+            <a:r>
+              <a:rPr lang="en-US" sz="1800" dirty="0" err="1">
                 <a:effectLst/>
                 <a:latin typeface="Arial" panose="020B0604020202020204" pitchFamily="34" charset="0"/>
                 <a:ea typeface="Times New Roman" panose="02020603050405020304" pitchFamily="18" charset="0"/>
                 <a:cs typeface="Times New Roman" panose="02020603050405020304" pitchFamily="18" charset="0"/>
               </a:rPr>
-              <a:t> </a:t>
-            </a:r>
-            <a:r>
-              <a:rPr lang="en-US" sz="1800" dirty="0" err="1">
+              <a:t>tập</a:t>
+            </a:r>
+            <a:r>
+              <a:rPr lang="en-US" sz="1800" dirty="0">
                 <a:effectLst/>
                 <a:latin typeface="Arial" panose="020B0604020202020204" pitchFamily="34" charset="0"/>
                 <a:ea typeface="Times New Roman" panose="02020603050405020304" pitchFamily="18" charset="0"/>
                 <a:cs typeface="Times New Roman" panose="02020603050405020304" pitchFamily="18" charset="0"/>
               </a:rPr>
-              <a:t>trung</a:t>
-            </a:r>
-            <a:r>
-              <a:rPr lang="en-US" sz="1800" dirty="0">
+              <a:t> </a:t>
+            </a:r>
+            <a:r>
+              <a:rPr lang="en-US" sz="1800" dirty="0" err="1">
                 <a:effectLst/>
                 <a:latin typeface="Arial" panose="020B0604020202020204" pitchFamily="34" charset="0"/>
                 <a:ea typeface="Times New Roman" panose="02020603050405020304" pitchFamily="18" charset="0"/>
                 <a:cs typeface="Times New Roman" panose="02020603050405020304" pitchFamily="18" charset="0"/>
               </a:rPr>
-              <a:t> </a:t>
-            </a:r>
-            <a:r>
-              <a:rPr lang="en-US" sz="1800" dirty="0" err="1">
+              <a:t>trung</a:t>
+            </a:r>
+            <a:r>
+              <a:rPr lang="en-US" sz="1800" dirty="0">
                 <a:effectLst/>
                 <a:latin typeface="Arial" panose="020B0604020202020204" pitchFamily="34" charset="0"/>
                 <a:ea typeface="Times New Roman" panose="02020603050405020304" pitchFamily="18" charset="0"/>
                 <a:cs typeface="Times New Roman" panose="02020603050405020304" pitchFamily="18" charset="0"/>
               </a:rPr>
-              <a:t>dữ</a:t>
-            </a:r>
-            <a:r>
-              <a:rPr lang="en-US" sz="1800" dirty="0">
+              <a:t> </a:t>
+            </a:r>
+            <a:r>
+              <a:rPr lang="en-US" sz="1800" dirty="0" err="1">
                 <a:effectLst/>
                 <a:latin typeface="Arial" panose="020B0604020202020204" pitchFamily="34" charset="0"/>
                 <a:ea typeface="Times New Roman" panose="02020603050405020304" pitchFamily="18" charset="0"/>
                 <a:cs typeface="Times New Roman" panose="02020603050405020304" pitchFamily="18" charset="0"/>
               </a:rPr>
-              <a:t> </a:t>
-            </a:r>
-            <a:r>
-              <a:rPr lang="en-US" sz="1800" dirty="0" err="1">
+              <a:t>dữ</a:t>
+            </a:r>
+            <a:r>
+              <a:rPr lang="en-US" sz="1800" dirty="0">
                 <a:effectLst/>
                 <a:latin typeface="Arial" panose="020B0604020202020204" pitchFamily="34" charset="0"/>
                 <a:ea typeface="Times New Roman" panose="02020603050405020304" pitchFamily="18" charset="0"/>
                 <a:cs typeface="Times New Roman" panose="02020603050405020304" pitchFamily="18" charset="0"/>
               </a:rPr>
-              <a:t>liệu</a:t>
-            </a:r>
-            <a:r>
-              <a:rPr lang="en-US" sz="1800" dirty="0">
+              <a:t> </a:t>
+            </a:r>
+            <a:r>
+              <a:rPr lang="en-US" sz="1800" dirty="0" err="1">
                 <a:effectLst/>
                 <a:latin typeface="Arial" panose="020B0604020202020204" pitchFamily="34" charset="0"/>
                 <a:ea typeface="Times New Roman" panose="02020603050405020304" pitchFamily="18" charset="0"/>
                 <a:cs typeface="Times New Roman" panose="02020603050405020304" pitchFamily="18" charset="0"/>
               </a:rPr>
-              <a:t> </a:t>
-            </a:r>
-            <a:r>
-              <a:rPr lang="en-US" sz="1800" dirty="0" err="1">
+              <a:t>liệu</a:t>
+            </a:r>
+            <a:r>
+              <a:rPr lang="en-US" sz="1800" dirty="0">
                 <a:effectLst/>
                 <a:latin typeface="Arial" panose="020B0604020202020204" pitchFamily="34" charset="0"/>
                 <a:ea typeface="Times New Roman" panose="02020603050405020304" pitchFamily="18" charset="0"/>
                 <a:cs typeface="Times New Roman" panose="02020603050405020304" pitchFamily="18" charset="0"/>
               </a:rPr>
-              <a:t>tại</a:t>
-            </a:r>
-            <a:r>
-              <a:rPr lang="en-US" sz="1800" dirty="0">
+              <a:t> </a:t>
+            </a:r>
+            <a:r>
+              <a:rPr lang="en-US" sz="1800" dirty="0" err="1">
                 <a:effectLst/>
                 <a:latin typeface="Arial" panose="020B0604020202020204" pitchFamily="34" charset="0"/>
                 <a:ea typeface="Times New Roman" panose="02020603050405020304" pitchFamily="18" charset="0"/>
                 <a:cs typeface="Times New Roman" panose="02020603050405020304" pitchFamily="18" charset="0"/>
               </a:rPr>
-              <a:t> </a:t>
-            </a:r>
-            <a:r>
-              <a:rPr lang="en-US" sz="1800" dirty="0" err="1">
+              <a:t>tại</a:t>
+            </a:r>
+            <a:r>
+              <a:rPr lang="en-US" sz="1800" dirty="0">
                 <a:effectLst/>
                 <a:latin typeface="Arial" panose="020B0604020202020204" pitchFamily="34" charset="0"/>
                 <a:ea typeface="Times New Roman" panose="02020603050405020304" pitchFamily="18" charset="0"/>
                 <a:cs typeface="Times New Roman" panose="02020603050405020304" pitchFamily="18" charset="0"/>
               </a:rPr>
-              <a:t>một</a:t>
-            </a:r>
-            <a:r>
-              <a:rPr lang="en-US" sz="1800" dirty="0">
+              <a:t> </a:t>
+            </a:r>
+            <a:r>
+              <a:rPr lang="en-US" sz="1800" dirty="0" err="1">
                 <a:effectLst/>
                 <a:latin typeface="Arial" panose="020B0604020202020204" pitchFamily="34" charset="0"/>
                 <a:ea typeface="Times New Roman" panose="02020603050405020304" pitchFamily="18" charset="0"/>
                 <a:cs typeface="Times New Roman" panose="02020603050405020304" pitchFamily="18" charset="0"/>
               </a:rPr>
-              <a:t> </a:t>
-            </a:r>
-            <a:r>
-              <a:rPr lang="en-US" sz="1800" dirty="0" err="1">
+              <a:t>một</a:t>
+            </a:r>
+            <a:r>
+              <a:rPr lang="en-US" sz="1800" dirty="0">
                 <a:effectLst/>
                 <a:latin typeface="Arial" panose="020B0604020202020204" pitchFamily="34" charset="0"/>
                 <a:ea typeface="Times New Roman" panose="02020603050405020304" pitchFamily="18" charset="0"/>
                 <a:cs typeface="Times New Roman" panose="02020603050405020304" pitchFamily="18" charset="0"/>
               </a:rPr>
-              <a:t>nơi</a:t>
-            </a:r>
-            <a:r>
-              <a:rPr lang="en-US" sz="1800" dirty="0">
+              <a:t> </a:t>
+            </a:r>
+            <a:r>
+              <a:rPr lang="en-US" sz="1800" dirty="0" err="1">
                 <a:effectLst/>
                 <a:latin typeface="Arial" panose="020B0604020202020204" pitchFamily="34" charset="0"/>
                 <a:ea typeface="Times New Roman" panose="02020603050405020304" pitchFamily="18" charset="0"/>
                 <a:cs typeface="Times New Roman" panose="02020603050405020304" pitchFamily="18" charset="0"/>
               </a:rPr>
-              <a:t>. </a:t>
-            </a:r>
-            <a:r>
-              <a:rPr lang="en-US" sz="1800" dirty="0" err="1">
+              <a:t>nơi</a:t>
+            </a:r>
+            <a:r>
+              <a:rPr lang="en-US" sz="1800" dirty="0">
                 <a:effectLst/>
                 <a:latin typeface="Arial" panose="020B0604020202020204" pitchFamily="34" charset="0"/>
                 <a:ea typeface="Times New Roman" panose="02020603050405020304" pitchFamily="18" charset="0"/>
                 <a:cs typeface="Times New Roman" panose="02020603050405020304" pitchFamily="18" charset="0"/>
               </a:rPr>
-              <a:t>Thay</a:t>
-            </a:r>
-            <a:r>
-              <a:rPr lang="en-US" sz="1800" dirty="0">
+              <a:t>. </a:t>
+            </a:r>
+            <a:r>
+              <a:rPr lang="en-US" sz="1800" dirty="0" err="1">
                 <a:effectLst/>
                 <a:latin typeface="Arial" panose="020B0604020202020204" pitchFamily="34" charset="0"/>
                 <a:ea typeface="Times New Roman" panose="02020603050405020304" pitchFamily="18" charset="0"/>
                 <a:cs typeface="Times New Roman" panose="02020603050405020304" pitchFamily="18" charset="0"/>
               </a:rPr>
-              <a:t> </a:t>
-            </a:r>
-            <a:r>
-              <a:rPr lang="en-US" sz="1800" dirty="0" err="1">
+              <a:t>Thay</a:t>
+            </a:r>
+            <a:r>
+              <a:rPr lang="en-US" sz="1800" dirty="0">
                 <a:effectLst/>
                 <a:latin typeface="Arial" panose="020B0604020202020204" pitchFamily="34" charset="0"/>
                 <a:ea typeface="Times New Roman" panose="02020603050405020304" pitchFamily="18" charset="0"/>
                 <a:cs typeface="Times New Roman" panose="02020603050405020304" pitchFamily="18" charset="0"/>
               </a:rPr>
-              <a:t>vì</a:t>
-            </a:r>
-            <a:r>
-              <a:rPr lang="en-US" sz="1800" dirty="0">
+              <a:t> </a:t>
+            </a:r>
+            <a:r>
+              <a:rPr lang="en-US" sz="1800" dirty="0" err="1">
                 <a:effectLst/>
                 <a:latin typeface="Arial" panose="020B0604020202020204" pitchFamily="34" charset="0"/>
                 <a:ea typeface="Times New Roman" panose="02020603050405020304" pitchFamily="18" charset="0"/>
                 <a:cs typeface="Times New Roman" panose="02020603050405020304" pitchFamily="18" charset="0"/>
               </a:rPr>
-              <a:t> chia </a:t>
-            </a:r>
-            <a:r>
-              <a:rPr lang="en-US" sz="1800" dirty="0" err="1">
+              <a:t>vì</a:t>
+            </a:r>
+            <a:r>
+              <a:rPr lang="en-US" sz="1800" dirty="0">
                 <a:effectLst/>
                 <a:latin typeface="Arial" panose="020B0604020202020204" pitchFamily="34" charset="0"/>
                 <a:ea typeface="Times New Roman" panose="02020603050405020304" pitchFamily="18" charset="0"/>
                 <a:cs typeface="Times New Roman" panose="02020603050405020304" pitchFamily="18" charset="0"/>
               </a:rPr>
-              <a:t>sẻ</a:t>
-            </a:r>
-            <a:r>
-              <a:rPr lang="en-US" sz="1800" dirty="0">
+              <a:t> chia </a:t>
+            </a:r>
+            <a:r>
+              <a:rPr lang="en-US" sz="1800" dirty="0" err="1">
                 <a:effectLst/>
                 <a:latin typeface="Arial" panose="020B0604020202020204" pitchFamily="34" charset="0"/>
                 <a:ea typeface="Times New Roman" panose="02020603050405020304" pitchFamily="18" charset="0"/>
                 <a:cs typeface="Times New Roman" panose="02020603050405020304" pitchFamily="18" charset="0"/>
               </a:rPr>
-              <a:t> </a:t>
-            </a:r>
-            <a:r>
-              <a:rPr lang="en-US" sz="1800" dirty="0" err="1">
+              <a:t>sẻ</a:t>
+            </a:r>
+            <a:r>
+              <a:rPr lang="en-US" sz="1800" dirty="0">
                 <a:effectLst/>
                 <a:latin typeface="Arial" panose="020B0604020202020204" pitchFamily="34" charset="0"/>
                 <a:ea typeface="Times New Roman" panose="02020603050405020304" pitchFamily="18" charset="0"/>
                 <a:cs typeface="Times New Roman" panose="02020603050405020304" pitchFamily="18" charset="0"/>
               </a:rPr>
-              <a:t>dữ</a:t>
-            </a:r>
-            <a:r>
-              <a:rPr lang="en-US" sz="1800" dirty="0">
+              <a:t> </a:t>
+            </a:r>
+            <a:r>
+              <a:rPr lang="en-US" sz="1800" dirty="0" err="1">
                 <a:effectLst/>
                 <a:latin typeface="Arial" panose="020B0604020202020204" pitchFamily="34" charset="0"/>
                 <a:ea typeface="Times New Roman" panose="02020603050405020304" pitchFamily="18" charset="0"/>
                 <a:cs typeface="Times New Roman" panose="02020603050405020304" pitchFamily="18" charset="0"/>
               </a:rPr>
-              <a:t> </a:t>
-            </a:r>
-            <a:r>
-              <a:rPr lang="en-US" sz="1800" dirty="0" err="1">
+              <a:t>dữ</a:t>
+            </a:r>
+            <a:r>
+              <a:rPr lang="en-US" sz="1800" dirty="0">
                 <a:effectLst/>
                 <a:latin typeface="Arial" panose="020B0604020202020204" pitchFamily="34" charset="0"/>
                 <a:ea typeface="Times New Roman" panose="02020603050405020304" pitchFamily="18" charset="0"/>
                 <a:cs typeface="Times New Roman" panose="02020603050405020304" pitchFamily="18" charset="0"/>
               </a:rPr>
-              <a:t>liệu</a:t>
-            </a:r>
-            <a:r>
-              <a:rPr lang="en-US" sz="1800" dirty="0">
+              <a:t> </a:t>
+            </a:r>
+            <a:r>
+              <a:rPr lang="en-US" sz="1800" dirty="0" err="1">
                 <a:effectLst/>
                 <a:latin typeface="Arial" panose="020B0604020202020204" pitchFamily="34" charset="0"/>
                 <a:ea typeface="Times New Roman" panose="02020603050405020304" pitchFamily="18" charset="0"/>
                 <a:cs typeface="Times New Roman" panose="02020603050405020304" pitchFamily="18" charset="0"/>
               </a:rPr>
-              <a:t> </a:t>
-            </a:r>
-            <a:r>
-              <a:rPr lang="en-US" sz="1800" dirty="0" err="1">
+              <a:t>liệu</a:t>
+            </a:r>
+            <a:r>
+              <a:rPr lang="en-US" sz="1800" dirty="0">
                 <a:effectLst/>
                 <a:latin typeface="Arial" panose="020B0604020202020204" pitchFamily="34" charset="0"/>
                 <a:ea typeface="Times New Roman" panose="02020603050405020304" pitchFamily="18" charset="0"/>
                 <a:cs typeface="Times New Roman" panose="02020603050405020304" pitchFamily="18" charset="0"/>
               </a:rPr>
-              <a:t>thô</a:t>
-            </a:r>
-            <a:r>
-              <a:rPr lang="en-US" sz="1800" dirty="0">
+              <a:t> </a:t>
+            </a:r>
+            <a:r>
+              <a:rPr lang="en-US" sz="1800" dirty="0" err="1">
                 <a:effectLst/>
                 <a:latin typeface="Arial" panose="020B0604020202020204" pitchFamily="34" charset="0"/>
                 <a:ea typeface="Times New Roman" panose="02020603050405020304" pitchFamily="18" charset="0"/>
                 <a:cs typeface="Times New Roman" panose="02020603050405020304" pitchFamily="18" charset="0"/>
               </a:rPr>
-              <a:t>, </a:t>
-            </a:r>
-            <a:r>
-              <a:rPr lang="en-US" sz="1800" dirty="0" err="1">
+              <a:t>thô</a:t>
+            </a:r>
+            <a:r>
+              <a:rPr lang="en-US" sz="1800" dirty="0">
                 <a:effectLst/>
                 <a:latin typeface="Arial" panose="020B0604020202020204" pitchFamily="34" charset="0"/>
                 <a:ea typeface="Times New Roman" panose="02020603050405020304" pitchFamily="18" charset="0"/>
                 <a:cs typeface="Times New Roman" panose="02020603050405020304" pitchFamily="18" charset="0"/>
               </a:rPr>
-              <a:t>các</a:t>
-            </a:r>
-            <a:r>
-              <a:rPr lang="en-US" sz="1800" dirty="0">
+              <a:t>, </a:t>
+            </a:r>
+            <a:r>
+              <a:rPr lang="en-US" sz="1800" dirty="0" err="1">
                 <a:effectLst/>
                 <a:latin typeface="Arial" panose="020B0604020202020204" pitchFamily="34" charset="0"/>
                 <a:ea typeface="Times New Roman" panose="02020603050405020304" pitchFamily="18" charset="0"/>
                 <a:cs typeface="Times New Roman" panose="02020603050405020304" pitchFamily="18" charset="0"/>
               </a:rPr>
-              <a:t> </a:t>
-            </a:r>
-            <a:r>
-              <a:rPr lang="en-US" sz="1800" dirty="0" err="1">
+              <a:t>các</a:t>
+            </a:r>
+            <a:r>
+              <a:rPr lang="en-US" sz="1800" dirty="0">
                 <a:effectLst/>
                 <a:latin typeface="Arial" panose="020B0604020202020204" pitchFamily="34" charset="0"/>
                 <a:ea typeface="Times New Roman" panose="02020603050405020304" pitchFamily="18" charset="0"/>
                 <a:cs typeface="Times New Roman" panose="02020603050405020304" pitchFamily="18" charset="0"/>
               </a:rPr>
-              <a:t>thiết</a:t>
-            </a:r>
-            <a:r>
-              <a:rPr lang="en-US" sz="1800" dirty="0">
+              <a:t> </a:t>
+            </a:r>
+            <a:r>
+              <a:rPr lang="en-US" sz="1800" dirty="0" err="1">
                 <a:effectLst/>
                 <a:latin typeface="Arial" panose="020B0604020202020204" pitchFamily="34" charset="0"/>
                 <a:ea typeface="Times New Roman" panose="02020603050405020304" pitchFamily="18" charset="0"/>
                 <a:cs typeface="Times New Roman" panose="02020603050405020304" pitchFamily="18" charset="0"/>
               </a:rPr>
-              <a:t> </a:t>
-            </a:r>
-            <a:r>
-              <a:rPr lang="en-US" sz="1800" dirty="0" err="1">
+              <a:t>thiết</a:t>
+            </a:r>
+            <a:r>
+              <a:rPr lang="en-US" sz="1800" dirty="0">
                 <a:effectLst/>
                 <a:latin typeface="Arial" panose="020B0604020202020204" pitchFamily="34" charset="0"/>
                 <a:ea typeface="Times New Roman" panose="02020603050405020304" pitchFamily="18" charset="0"/>
                 <a:cs typeface="Times New Roman" panose="02020603050405020304" pitchFamily="18" charset="0"/>
               </a:rPr>
-              <a:t>bị</a:t>
-            </a:r>
-            <a:r>
-              <a:rPr lang="en-US" sz="1800" dirty="0">
+              <a:t> </a:t>
+            </a:r>
+            <a:r>
+              <a:rPr lang="en-US" sz="1800" dirty="0" err="1">
                 <a:effectLst/>
                 <a:latin typeface="Arial" panose="020B0604020202020204" pitchFamily="34" charset="0"/>
                 <a:ea typeface="Times New Roman" panose="02020603050405020304" pitchFamily="18" charset="0"/>
                 <a:cs typeface="Times New Roman" panose="02020603050405020304" pitchFamily="18" charset="0"/>
               </a:rPr>
-              <a:t> </a:t>
-            </a:r>
-            <a:r>
-              <a:rPr lang="en-US" sz="1800" dirty="0" err="1">
+              <a:t>bị</a:t>
+            </a:r>
+            <a:r>
+              <a:rPr lang="en-US" sz="1800" dirty="0">
                 <a:effectLst/>
                 <a:latin typeface="Arial" panose="020B0604020202020204" pitchFamily="34" charset="0"/>
                 <a:ea typeface="Times New Roman" panose="02020603050405020304" pitchFamily="18" charset="0"/>
                 <a:cs typeface="Times New Roman" panose="02020603050405020304" pitchFamily="18" charset="0"/>
               </a:rPr>
-              <a:t>gửi</a:t>
-            </a:r>
-            <a:r>
-              <a:rPr lang="en-US" sz="1800" dirty="0">
+              <a:t> </a:t>
+            </a:r>
+            <a:r>
+              <a:rPr lang="en-US" sz="1800" dirty="0" err="1">
                 <a:effectLst/>
                 <a:latin typeface="Arial" panose="020B0604020202020204" pitchFamily="34" charset="0"/>
                 <a:ea typeface="Times New Roman" panose="02020603050405020304" pitchFamily="18" charset="0"/>
                 <a:cs typeface="Times New Roman" panose="02020603050405020304" pitchFamily="18" charset="0"/>
               </a:rPr>
-              <a:t> </a:t>
-            </a:r>
-            <a:r>
-              <a:rPr lang="en-US" sz="1800" dirty="0" err="1">
+              <a:t>gửi</a:t>
+            </a:r>
+            <a:r>
+              <a:rPr lang="en-US" sz="1800" dirty="0">
                 <a:effectLst/>
                 <a:latin typeface="Arial" panose="020B0604020202020204" pitchFamily="34" charset="0"/>
                 <a:ea typeface="Times New Roman" panose="02020603050405020304" pitchFamily="18" charset="0"/>
                 <a:cs typeface="Times New Roman" panose="02020603050405020304" pitchFamily="18" charset="0"/>
               </a:rPr>
-              <a:t>các</a:t>
-            </a:r>
-            <a:r>
-              <a:rPr lang="en-US" sz="1800" dirty="0">
+              <a:t> </a:t>
+            </a:r>
+            <a:r>
+              <a:rPr lang="en-US" sz="1800" dirty="0" err="1">
                 <a:effectLst/>
                 <a:latin typeface="Arial" panose="020B0604020202020204" pitchFamily="34" charset="0"/>
                 <a:ea typeface="Times New Roman" panose="02020603050405020304" pitchFamily="18" charset="0"/>
                 <a:cs typeface="Times New Roman" panose="02020603050405020304" pitchFamily="18" charset="0"/>
               </a:rPr>
-              <a:t> </a:t>
-            </a:r>
-            <a:r>
-              <a:rPr lang="en-US" sz="1800" dirty="0" err="1">
+              <a:t>các</a:t>
+            </a:r>
+            <a:r>
+              <a:rPr lang="en-US" sz="1800" dirty="0">
                 <a:effectLst/>
                 <a:latin typeface="Arial" panose="020B0604020202020204" pitchFamily="34" charset="0"/>
                 <a:ea typeface="Times New Roman" panose="02020603050405020304" pitchFamily="18" charset="0"/>
                 <a:cs typeface="Times New Roman" panose="02020603050405020304" pitchFamily="18" charset="0"/>
               </a:rPr>
-              <a:t>bản</a:t>
-            </a:r>
-            <a:r>
-              <a:rPr lang="en-US" sz="1800" dirty="0">
+              <a:t> </a:t>
+            </a:r>
+            <a:r>
+              <a:rPr lang="en-US" sz="1800" dirty="0" err="1">
                 <a:effectLst/>
                 <a:latin typeface="Arial" panose="020B0604020202020204" pitchFamily="34" charset="0"/>
                 <a:ea typeface="Times New Roman" panose="02020603050405020304" pitchFamily="18" charset="0"/>
                 <a:cs typeface="Times New Roman" panose="02020603050405020304" pitchFamily="18" charset="0"/>
               </a:rPr>
-              <a:t> </a:t>
-            </a:r>
-            <a:r>
-              <a:rPr lang="en-US" sz="1800" dirty="0" err="1">
+              <a:t>bản</a:t>
+            </a:r>
+            <a:r>
+              <a:rPr lang="en-US" sz="1800" dirty="0">
                 <a:effectLst/>
                 <a:latin typeface="Arial" panose="020B0604020202020204" pitchFamily="34" charset="0"/>
                 <a:ea typeface="Times New Roman" panose="02020603050405020304" pitchFamily="18" charset="0"/>
                 <a:cs typeface="Times New Roman" panose="02020603050405020304" pitchFamily="18" charset="0"/>
               </a:rPr>
-              <a:t>cập</a:t>
-            </a:r>
-            <a:r>
-              <a:rPr lang="en-US" sz="1800" dirty="0">
+              <a:t> </a:t>
+            </a:r>
+            <a:r>
+              <a:rPr lang="en-US" sz="1800" dirty="0" err="1">
                 <a:effectLst/>
                 <a:latin typeface="Arial" panose="020B0604020202020204" pitchFamily="34" charset="0"/>
                 <a:ea typeface="Times New Roman" panose="02020603050405020304" pitchFamily="18" charset="0"/>
                 <a:cs typeface="Times New Roman" panose="02020603050405020304" pitchFamily="18" charset="0"/>
               </a:rPr>
-              <a:t> </a:t>
-            </a:r>
-            <a:r>
-              <a:rPr lang="en-US" sz="1800" dirty="0" err="1">
+              <a:t>cập</a:t>
+            </a:r>
+            <a:r>
+              <a:rPr lang="en-US" sz="1800" dirty="0">
                 <a:effectLst/>
                 <a:latin typeface="Arial" panose="020B0604020202020204" pitchFamily="34" charset="0"/>
                 <a:ea typeface="Times New Roman" panose="02020603050405020304" pitchFamily="18" charset="0"/>
                 <a:cs typeface="Times New Roman" panose="02020603050405020304" pitchFamily="18" charset="0"/>
               </a:rPr>
-              <a:t>nhật</a:t>
-            </a:r>
-            <a:r>
-              <a:rPr lang="en-US" sz="1800" dirty="0">
+              <a:t> </a:t>
+            </a:r>
+            <a:r>
+              <a:rPr lang="en-US" sz="1800" dirty="0" err="1">
                 <a:effectLst/>
                 <a:latin typeface="Arial" panose="020B0604020202020204" pitchFamily="34" charset="0"/>
                 <a:ea typeface="Times New Roman" panose="02020603050405020304" pitchFamily="18" charset="0"/>
                 <a:cs typeface="Times New Roman" panose="02020603050405020304" pitchFamily="18" charset="0"/>
               </a:rPr>
-              <a:t> </a:t>
-            </a:r>
-            <a:r>
-              <a:rPr lang="en-US" sz="1800" dirty="0" err="1">
+              <a:t>nhật</a:t>
+            </a:r>
+            <a:r>
+              <a:rPr lang="en-US" sz="1800" dirty="0">
                 <a:effectLst/>
                 <a:latin typeface="Arial" panose="020B0604020202020204" pitchFamily="34" charset="0"/>
                 <a:ea typeface="Times New Roman" panose="02020603050405020304" pitchFamily="18" charset="0"/>
                 <a:cs typeface="Times New Roman" panose="02020603050405020304" pitchFamily="18" charset="0"/>
               </a:rPr>
-              <a:t>mô</a:t>
-            </a:r>
-            <a:r>
-              <a:rPr lang="en-US" sz="1800" dirty="0">
+              <a:t> </a:t>
+            </a:r>
+            <a:r>
+              <a:rPr lang="en-US" sz="1800" dirty="0" err="1">
                 <a:effectLst/>
                 <a:latin typeface="Arial" panose="020B0604020202020204" pitchFamily="34" charset="0"/>
                 <a:ea typeface="Times New Roman" panose="02020603050405020304" pitchFamily="18" charset="0"/>
                 <a:cs typeface="Times New Roman" panose="02020603050405020304" pitchFamily="18" charset="0"/>
               </a:rPr>
-              <a:t> </a:t>
-            </a:r>
-            <a:r>
-              <a:rPr lang="en-US" sz="1800" dirty="0" err="1">
+              <a:t>mô</a:t>
+            </a:r>
+            <a:r>
+              <a:rPr lang="en-US" sz="1800" dirty="0">
                 <a:effectLst/>
                 <a:latin typeface="Arial" panose="020B0604020202020204" pitchFamily="34" charset="0"/>
                 <a:ea typeface="Times New Roman" panose="02020603050405020304" pitchFamily="18" charset="0"/>
                 <a:cs typeface="Times New Roman" panose="02020603050405020304" pitchFamily="18" charset="0"/>
               </a:rPr>
-              <a:t>hình</a:t>
-            </a:r>
-            <a:r>
-              <a:rPr lang="en-US" sz="1800" dirty="0">
+              <a:t> </a:t>
+            </a:r>
+            <a:r>
+              <a:rPr lang="en-US" sz="1800" dirty="0" err="1">
                 <a:effectLst/>
                 <a:latin typeface="Arial" panose="020B0604020202020204" pitchFamily="34" charset="0"/>
                 <a:ea typeface="Times New Roman" panose="02020603050405020304" pitchFamily="18" charset="0"/>
                 <a:cs typeface="Times New Roman" panose="02020603050405020304" pitchFamily="18" charset="0"/>
               </a:rPr>
-              <a:t> (model updates) </a:t>
-            </a:r>
-            <a:r>
-              <a:rPr lang="en-US" sz="1800" dirty="0" err="1">
+              <a:t>hình</a:t>
+            </a:r>
+            <a:r>
+              <a:rPr lang="en-US" sz="1800" dirty="0">
                 <a:effectLst/>
                 <a:latin typeface="Arial" panose="020B0604020202020204" pitchFamily="34" charset="0"/>
                 <a:ea typeface="Times New Roman" panose="02020603050405020304" pitchFamily="18" charset="0"/>
                 <a:cs typeface="Times New Roman" panose="02020603050405020304" pitchFamily="18" charset="0"/>
               </a:rPr>
-              <a:t>sau</a:t>
-            </a:r>
-            <a:r>
-              <a:rPr lang="en-US" sz="1800" dirty="0">
+              <a:t> (model updates) </a:t>
+            </a:r>
+            <a:r>
+              <a:rPr lang="en-US" sz="1800" dirty="0" err="1">
                 <a:effectLst/>
                 <a:latin typeface="Arial" panose="020B0604020202020204" pitchFamily="34" charset="0"/>
                 <a:ea typeface="Times New Roman" panose="02020603050405020304" pitchFamily="18" charset="0"/>
                 <a:cs typeface="Times New Roman" panose="02020603050405020304" pitchFamily="18" charset="0"/>
               </a:rPr>
-              <a:t> </a:t>
-            </a:r>
-            <a:r>
-              <a:rPr lang="en-US" sz="1800" dirty="0" err="1">
+              <a:t>sau</a:t>
+            </a:r>
+            <a:r>
+              <a:rPr lang="en-US" sz="1800" dirty="0">
                 <a:effectLst/>
                 <a:latin typeface="Arial" panose="020B0604020202020204" pitchFamily="34" charset="0"/>
                 <a:ea typeface="Times New Roman" panose="02020603050405020304" pitchFamily="18" charset="0"/>
                 <a:cs typeface="Times New Roman" panose="02020603050405020304" pitchFamily="18" charset="0"/>
               </a:rPr>
-              <a:t>quá</a:t>
-            </a:r>
-            <a:r>
-              <a:rPr lang="en-US" sz="1800" dirty="0">
+              <a:t> </a:t>
+            </a:r>
+            <a:r>
+              <a:rPr lang="en-US" sz="1800" dirty="0" err="1">
                 <a:effectLst/>
                 <a:latin typeface="Arial" panose="020B0604020202020204" pitchFamily="34" charset="0"/>
                 <a:ea typeface="Times New Roman" panose="02020603050405020304" pitchFamily="18" charset="0"/>
                 <a:cs typeface="Times New Roman" panose="02020603050405020304" pitchFamily="18" charset="0"/>
               </a:rPr>
-              <a:t> </a:t>
-            </a:r>
-            <a:r>
-              <a:rPr lang="en-US" sz="1800" dirty="0" err="1">
+              <a:t>quá</a:t>
+            </a:r>
+            <a:r>
+              <a:rPr lang="en-US" sz="1800" dirty="0">
                 <a:effectLst/>
                 <a:latin typeface="Arial" panose="020B0604020202020204" pitchFamily="34" charset="0"/>
                 <a:ea typeface="Times New Roman" panose="02020603050405020304" pitchFamily="18" charset="0"/>
                 <a:cs typeface="Times New Roman" panose="02020603050405020304" pitchFamily="18" charset="0"/>
               </a:rPr>
-              <a:t>trình</a:t>
-            </a:r>
-            <a:r>
-              <a:rPr lang="en-US" sz="1800" dirty="0">
+              <a:t> </a:t>
+            </a:r>
+            <a:r>
+              <a:rPr lang="en-US" sz="1800" dirty="0" err="1">
                 <a:effectLst/>
                 <a:latin typeface="Arial" panose="020B0604020202020204" pitchFamily="34" charset="0"/>
                 <a:ea typeface="Times New Roman" panose="02020603050405020304" pitchFamily="18" charset="0"/>
                 <a:cs typeface="Times New Roman" panose="02020603050405020304" pitchFamily="18" charset="0"/>
               </a:rPr>
-              <a:t> </a:t>
-            </a:r>
-            <a:r>
-              <a:rPr lang="en-US" sz="1800" dirty="0" err="1">
+              <a:t>trình</a:t>
+            </a:r>
+            <a:r>
+              <a:rPr lang="en-US" sz="1800" dirty="0">
                 <a:effectLst/>
                 <a:latin typeface="Arial" panose="020B0604020202020204" pitchFamily="34" charset="0"/>
                 <a:ea typeface="Times New Roman" panose="02020603050405020304" pitchFamily="18" charset="0"/>
                 <a:cs typeface="Times New Roman" panose="02020603050405020304" pitchFamily="18" charset="0"/>
               </a:rPr>
-              <a:t>huấn</a:t>
-            </a:r>
-            <a:r>
-              <a:rPr lang="en-US" sz="1800" dirty="0">
+              <a:t> </a:t>
+            </a:r>
+            <a:r>
+              <a:rPr lang="en-US" sz="1800" dirty="0" err="1">
                 <a:effectLst/>
                 <a:latin typeface="Arial" panose="020B0604020202020204" pitchFamily="34" charset="0"/>
                 <a:ea typeface="Times New Roman" panose="02020603050405020304" pitchFamily="18" charset="0"/>
                 <a:cs typeface="Times New Roman" panose="02020603050405020304" pitchFamily="18" charset="0"/>
               </a:rPr>
-              <a:t> </a:t>
-            </a:r>
-            <a:r>
-              <a:rPr lang="en-US" sz="1800" dirty="0" err="1">
+              <a:t>huấn</a:t>
+            </a:r>
+            <a:r>
+              <a:rPr lang="en-US" sz="1800" dirty="0">
                 <a:effectLst/>
                 <a:latin typeface="Arial" panose="020B0604020202020204" pitchFamily="34" charset="0"/>
                 <a:ea typeface="Times New Roman" panose="02020603050405020304" pitchFamily="18" charset="0"/>
                 <a:cs typeface="Times New Roman" panose="02020603050405020304" pitchFamily="18" charset="0"/>
               </a:rPr>
-              <a:t>luyện</a:t>
-            </a:r>
-            <a:r>
-              <a:rPr lang="en-US" sz="1800" dirty="0">
+              <a:t> </a:t>
+            </a:r>
+            <a:r>
+              <a:rPr lang="en-US" sz="1800" dirty="0" err="1">
                 <a:effectLst/>
                 <a:latin typeface="Arial" panose="020B0604020202020204" pitchFamily="34" charset="0"/>
                 <a:ea typeface="Times New Roman" panose="02020603050405020304" pitchFamily="18" charset="0"/>
                 <a:cs typeface="Times New Roman" panose="02020603050405020304" pitchFamily="18" charset="0"/>
               </a:rPr>
-              <a:t> </a:t>
-            </a:r>
-            <a:r>
-              <a:rPr lang="en-US" sz="1800" dirty="0" err="1">
+              <a:t>luyện</a:t>
+            </a:r>
+            <a:r>
+              <a:rPr lang="en-US" sz="1800" dirty="0">
                 <a:effectLst/>
                 <a:latin typeface="Arial" panose="020B0604020202020204" pitchFamily="34" charset="0"/>
                 <a:ea typeface="Times New Roman" panose="02020603050405020304" pitchFamily="18" charset="0"/>
                 <a:cs typeface="Times New Roman" panose="02020603050405020304" pitchFamily="18" charset="0"/>
               </a:rPr>
-              <a:t>cục</a:t>
-            </a:r>
-            <a:r>
-              <a:rPr lang="en-US" sz="1800" dirty="0">
+              <a:t> </a:t>
+            </a:r>
+            <a:r>
+              <a:rPr lang="en-US" sz="1800" dirty="0" err="1">
                 <a:effectLst/>
                 <a:latin typeface="Arial" panose="020B0604020202020204" pitchFamily="34" charset="0"/>
                 <a:ea typeface="Times New Roman" panose="02020603050405020304" pitchFamily="18" charset="0"/>
                 <a:cs typeface="Times New Roman" panose="02020603050405020304" pitchFamily="18" charset="0"/>
               </a:rPr>
-              <a:t> </a:t>
-            </a:r>
-            <a:r>
-              <a:rPr lang="en-US" sz="1800" dirty="0" err="1">
+              <a:t>cục</a:t>
+            </a:r>
+            <a:r>
+              <a:rPr lang="en-US" sz="1800" dirty="0">
                 <a:effectLst/>
                 <a:latin typeface="Arial" panose="020B0604020202020204" pitchFamily="34" charset="0"/>
                 <a:ea typeface="Times New Roman" panose="02020603050405020304" pitchFamily="18" charset="0"/>
                 <a:cs typeface="Times New Roman" panose="02020603050405020304" pitchFamily="18" charset="0"/>
               </a:rPr>
-              <a:t>bộ</a:t>
-            </a:r>
-            <a:r>
-              <a:rPr lang="en-US" sz="1800" dirty="0">
+              <a:t> </a:t>
+            </a:r>
+            <a:r>
+              <a:rPr lang="en-US" sz="1800" dirty="0" err="1">
                 <a:effectLst/>
                 <a:latin typeface="Arial" panose="020B0604020202020204" pitchFamily="34" charset="0"/>
                 <a:ea typeface="Times New Roman" panose="02020603050405020304" pitchFamily="18" charset="0"/>
                 <a:cs typeface="Times New Roman" panose="02020603050405020304" pitchFamily="18" charset="0"/>
               </a:rPr>
-              <a:t>, </a:t>
-            </a:r>
-            <a:r>
-              <a:rPr lang="en-US" sz="1800" dirty="0" err="1">
+              <a:t>bộ</a:t>
+            </a:r>
+            <a:r>
+              <a:rPr lang="en-US" sz="1800" dirty="0">
                 <a:effectLst/>
                 <a:latin typeface="Arial" panose="020B0604020202020204" pitchFamily="34" charset="0"/>
                 <a:ea typeface="Times New Roman" panose="02020603050405020304" pitchFamily="18" charset="0"/>
                 <a:cs typeface="Times New Roman" panose="02020603050405020304" pitchFamily="18" charset="0"/>
               </a:rPr>
-              <a:t>giúp</a:t>
-            </a:r>
-            <a:r>
-              <a:rPr lang="en-US" sz="1800" dirty="0">
+              <a:t>, </a:t>
+            </a:r>
+            <a:r>
+              <a:rPr lang="en-US" sz="1800" dirty="0" err="1">
                 <a:effectLst/>
                 <a:latin typeface="Arial" panose="020B0604020202020204" pitchFamily="34" charset="0"/>
                 <a:ea typeface="Times New Roman" panose="02020603050405020304" pitchFamily="18" charset="0"/>
                 <a:cs typeface="Times New Roman" panose="02020603050405020304" pitchFamily="18" charset="0"/>
               </a:rPr>
-              <a:t> </a:t>
-            </a:r>
-            <a:r>
-              <a:rPr lang="en-US" sz="1800" dirty="0" err="1">
+              <a:t>giúp</a:t>
+            </a:r>
+            <a:r>
+              <a:rPr lang="en-US" sz="1800" dirty="0">
                 <a:effectLst/>
                 <a:latin typeface="Arial" panose="020B0604020202020204" pitchFamily="34" charset="0"/>
                 <a:ea typeface="Times New Roman" panose="02020603050405020304" pitchFamily="18" charset="0"/>
                 <a:cs typeface="Times New Roman" panose="02020603050405020304" pitchFamily="18" charset="0"/>
               </a:rPr>
-              <a:t>bảo</a:t>
-            </a:r>
-            <a:r>
-              <a:rPr lang="en-US" sz="1800" dirty="0">
+              <a:t> </a:t>
+            </a:r>
+            <a:r>
+              <a:rPr lang="en-US" sz="1800" dirty="0" err="1">
                 <a:effectLst/>
                 <a:latin typeface="Arial" panose="020B0604020202020204" pitchFamily="34" charset="0"/>
                 <a:ea typeface="Times New Roman" panose="02020603050405020304" pitchFamily="18" charset="0"/>
                 <a:cs typeface="Times New Roman" panose="02020603050405020304" pitchFamily="18" charset="0"/>
               </a:rPr>
-              <a:t> </a:t>
-            </a:r>
-            <a:r>
-              <a:rPr lang="en-US" sz="1800" dirty="0" err="1">
+              <a:t>bảo</a:t>
+            </a:r>
+            <a:r>
+              <a:rPr lang="en-US" sz="1800" dirty="0">
                 <a:effectLst/>
                 <a:latin typeface="Arial" panose="020B0604020202020204" pitchFamily="34" charset="0"/>
                 <a:ea typeface="Times New Roman" panose="02020603050405020304" pitchFamily="18" charset="0"/>
                 <a:cs typeface="Times New Roman" panose="02020603050405020304" pitchFamily="18" charset="0"/>
               </a:rPr>
-              <a:t>vệ</a:t>
-            </a:r>
-            <a:r>
-              <a:rPr lang="en-US" sz="1800" dirty="0">
+              <a:t> </a:t>
+            </a:r>
+            <a:r>
+              <a:rPr lang="en-US" sz="1800" dirty="0" err="1">
                 <a:effectLst/>
                 <a:latin typeface="Arial" panose="020B0604020202020204" pitchFamily="34" charset="0"/>
                 <a:ea typeface="Times New Roman" panose="02020603050405020304" pitchFamily="18" charset="0"/>
                 <a:cs typeface="Times New Roman" panose="02020603050405020304" pitchFamily="18" charset="0"/>
               </a:rPr>
-              <a:t> </a:t>
-            </a:r>
-            <a:r>
-              <a:rPr lang="en-US" sz="1800" dirty="0" err="1">
+              <a:t>vệ</a:t>
+            </a:r>
+            <a:r>
+              <a:rPr lang="en-US" sz="1800" dirty="0">
                 <a:effectLst/>
                 <a:latin typeface="Arial" panose="020B0604020202020204" pitchFamily="34" charset="0"/>
                 <a:ea typeface="Times New Roman" panose="02020603050405020304" pitchFamily="18" charset="0"/>
                 <a:cs typeface="Times New Roman" panose="02020603050405020304" pitchFamily="18" charset="0"/>
               </a:rPr>
-              <a:t>tính</a:t>
-            </a:r>
-            <a:r>
-              <a:rPr lang="en-US" sz="1800" dirty="0">
+              <a:t> </a:t>
+            </a:r>
+            <a:r>
+              <a:rPr lang="en-US" sz="1800" dirty="0" err="1">
                 <a:effectLst/>
                 <a:latin typeface="Arial" panose="020B0604020202020204" pitchFamily="34" charset="0"/>
                 <a:ea typeface="Times New Roman" panose="02020603050405020304" pitchFamily="18" charset="0"/>
                 <a:cs typeface="Times New Roman" panose="02020603050405020304" pitchFamily="18" charset="0"/>
               </a:rPr>
-              <a:t> </a:t>
-            </a:r>
-            <a:r>
-              <a:rPr lang="en-US" sz="1800" dirty="0" err="1">
+              <a:t>tính</a:t>
+            </a:r>
+            <a:r>
+              <a:rPr lang="en-US" sz="1800" dirty="0">
                 <a:effectLst/>
                 <a:latin typeface="Arial" panose="020B0604020202020204" pitchFamily="34" charset="0"/>
                 <a:ea typeface="Times New Roman" panose="02020603050405020304" pitchFamily="18" charset="0"/>
                 <a:cs typeface="Times New Roman" panose="02020603050405020304" pitchFamily="18" charset="0"/>
               </a:rPr>
-              <a:t>riêng</a:t>
-            </a:r>
-            <a:r>
-              <a:rPr lang="en-US" sz="1800" dirty="0">
+              <a:t> </a:t>
+            </a:r>
+            <a:r>
+              <a:rPr lang="en-US" sz="1800" dirty="0" err="1">
                 <a:effectLst/>
                 <a:latin typeface="Arial" panose="020B0604020202020204" pitchFamily="34" charset="0"/>
                 <a:ea typeface="Times New Roman" panose="02020603050405020304" pitchFamily="18" charset="0"/>
                 <a:cs typeface="Times New Roman" panose="02020603050405020304" pitchFamily="18" charset="0"/>
               </a:rPr>
-              <a:t> </a:t>
-            </a:r>
-            <a:r>
-              <a:rPr lang="en-US" sz="1800" dirty="0" err="1">
+              <a:t>riêng</a:t>
+            </a:r>
+            <a:r>
+              <a:rPr lang="en-US" sz="1800" dirty="0">
                 <a:effectLst/>
                 <a:latin typeface="Arial" panose="020B0604020202020204" pitchFamily="34" charset="0"/>
                 <a:ea typeface="Times New Roman" panose="02020603050405020304" pitchFamily="18" charset="0"/>
                 <a:cs typeface="Times New Roman" panose="02020603050405020304" pitchFamily="18" charset="0"/>
               </a:rPr>
-              <a:t>tư</a:t>
-            </a:r>
-            <a:r>
-              <a:rPr lang="en-US" sz="1800" dirty="0">
+              <a:t> </a:t>
+            </a:r>
+            <a:r>
+              <a:rPr lang="en-US" sz="1800" dirty="0" err="1">
                 <a:effectLst/>
                 <a:latin typeface="Arial" panose="020B0604020202020204" pitchFamily="34" charset="0"/>
                 <a:ea typeface="Times New Roman" panose="02020603050405020304" pitchFamily="18" charset="0"/>
                 <a:cs typeface="Times New Roman" panose="02020603050405020304" pitchFamily="18" charset="0"/>
               </a:rPr>
-              <a:t> </a:t>
-            </a:r>
-            <a:r>
-              <a:rPr lang="en-US" sz="1800" dirty="0" err="1">
+              <a:t>tư</a:t>
+            </a:r>
+            <a:r>
+              <a:rPr lang="en-US" sz="1800" dirty="0">
                 <a:effectLst/>
                 <a:latin typeface="Arial" panose="020B0604020202020204" pitchFamily="34" charset="0"/>
                 <a:ea typeface="Times New Roman" panose="02020603050405020304" pitchFamily="18" charset="0"/>
                 <a:cs typeface="Times New Roman" panose="02020603050405020304" pitchFamily="18" charset="0"/>
               </a:rPr>
-              <a:t>của</a:t>
-            </a:r>
-            <a:r>
-              <a:rPr lang="en-US" sz="1800" dirty="0">
+              <a:t> </a:t>
+            </a:r>
+            <a:r>
+              <a:rPr lang="en-US" sz="1800" dirty="0" err="1">
                 <a:effectLst/>
                 <a:latin typeface="Arial" panose="020B0604020202020204" pitchFamily="34" charset="0"/>
                 <a:ea typeface="Times New Roman" panose="02020603050405020304" pitchFamily="18" charset="0"/>
                 <a:cs typeface="Times New Roman" panose="02020603050405020304" pitchFamily="18" charset="0"/>
               </a:rPr>
-              <a:t> </a:t>
-            </a:r>
-            <a:r>
-              <a:rPr lang="en-US" sz="1800" dirty="0" err="1">
+              <a:t>của</a:t>
+            </a:r>
+            <a:r>
+              <a:rPr lang="en-US" sz="1800" dirty="0">
                 <a:effectLst/>
                 <a:latin typeface="Arial" panose="020B0604020202020204" pitchFamily="34" charset="0"/>
                 <a:ea typeface="Times New Roman" panose="02020603050405020304" pitchFamily="18" charset="0"/>
                 <a:cs typeface="Times New Roman" panose="02020603050405020304" pitchFamily="18" charset="0"/>
               </a:rPr>
-              <a:t>dữ</a:t>
-            </a:r>
-            <a:r>
-              <a:rPr lang="en-US" sz="1800" dirty="0">
+              <a:t> </a:t>
+            </a:r>
+            <a:r>
+              <a:rPr lang="en-US" sz="1800" dirty="0" err="1">
                 <a:effectLst/>
                 <a:latin typeface="Arial" panose="020B0604020202020204" pitchFamily="34" charset="0"/>
                 <a:ea typeface="Times New Roman" panose="02020603050405020304" pitchFamily="18" charset="0"/>
                 <a:cs typeface="Times New Roman" panose="02020603050405020304" pitchFamily="18" charset="0"/>
               </a:rPr>
-              <a:t> </a:t>
-            </a:r>
-            <a:r>
-              <a:rPr lang="en-US" sz="1800" dirty="0" err="1">
+              <a:t>dữ</a:t>
+            </a:r>
+            <a:r>
+              <a:rPr lang="en-US" sz="1800" dirty="0">
                 <a:effectLst/>
                 <a:latin typeface="Arial" panose="020B0604020202020204" pitchFamily="34" charset="0"/>
                 <a:ea typeface="Times New Roman" panose="02020603050405020304" pitchFamily="18" charset="0"/>
                 <a:cs typeface="Times New Roman" panose="02020603050405020304" pitchFamily="18" charset="0"/>
               </a:rPr>
+              <a:t> </a:t>
+            </a:r>
+            <a:r>
+              <a:rPr lang="en-US" sz="1800" dirty="0" err="1">
+                <a:effectLst/>
+                <a:latin typeface="Arial" panose="020B0604020202020204" pitchFamily="34" charset="0"/>
+                <a:ea typeface="Times New Roman" panose="02020603050405020304" pitchFamily="18" charset="0"/>
+                <a:cs typeface="Times New Roman" panose="02020603050405020304" pitchFamily="18" charset="0"/>
+              </a:rPr>
               <a:t>liệu</a:t>
+            </a:r>
+            <a:r>
+              <a:rPr lang="en-US" sz="1800" dirty="0">
+                <a:effectLst/>
+                <a:latin typeface="Arial" panose="020B0604020202020204" pitchFamily="34" charset="0"/>
+                <a:ea typeface="Times New Roman" panose="02020603050405020304" pitchFamily="18" charset="0"/>
+                <a:cs typeface="Times New Roman" panose="02020603050405020304" pitchFamily="18" charset="0"/>
+              </a:rPr>
+              <a:t> </a:t>
+            </a:r>
+            <a:r>
+              <a:rPr lang="en-US" sz="1800" baseline="30000" dirty="0">
+                <a:effectLst/>
+                <a:latin typeface="Arial" panose="020B0604020202020204" pitchFamily="34" charset="0"/>
+                <a:ea typeface="Times New Roman" panose="02020603050405020304" pitchFamily="18" charset="0"/>
+                <a:cs typeface="Times New Roman" panose="02020603050405020304" pitchFamily="18" charset="0"/>
+                <a:hlinkClick r:id="rId3" action="ppaction://hlinksldjump"/>
+              </a:rPr>
+              <a:t>[1]</a:t>
             </a:r>
             <a:r>
               <a:rPr lang="en-US" sz="1800" dirty="0">
@@ -10890,7 +12028,7 @@
           <p:nvPr/>
         </p:nvPicPr>
         <p:blipFill>
-          <a:blip r:embed="rId3"/>
+          <a:blip r:embed="rId4"/>
           <a:stretch>
             <a:fillRect/>
           </a:stretch>
@@ -11013,8 +12151,8 @@
         </p:nvSpPr>
         <p:spPr>
           <a:xfrm>
-            <a:off x="2312894" y="920504"/>
-            <a:ext cx="4572000" cy="510111"/>
+            <a:off x="2168956" y="920504"/>
+            <a:ext cx="5186883" cy="510111"/>
           </a:xfrm>
         </p:spPr>
         <p:txBody>
@@ -11105,9 +12243,46 @@
                 <a:ea typeface="Times New Roman" panose="02020603050405020304" pitchFamily="18" charset="0"/>
                 <a:cs typeface="Times New Roman" panose="02020603050405020304" pitchFamily="18" charset="0"/>
               </a:rPr>
-              <a:t> Federated Learning</a:t>
-            </a:r>
-            <a:endParaRPr lang="en-VN" sz="2200" dirty="0">
+              <a:t> Federated </a:t>
+            </a:r>
+            <a:r>
+              <a:rPr lang="en-US" sz="2400" b="1" dirty="0">
+                <a:solidFill>
+                  <a:srgbClr val="002060"/>
+                </a:solidFill>
+                <a:effectLst/>
+                <a:latin typeface="Arial" panose="020B0604020202020204" pitchFamily="34" charset="0"/>
+                <a:ea typeface="Times New Roman" panose="02020603050405020304" pitchFamily="18" charset="0"/>
+                <a:cs typeface="Times New Roman" panose="02020603050405020304" pitchFamily="18" charset="0"/>
+              </a:rPr>
+              <a:t>Learning</a:t>
+            </a:r>
+            <a:r>
+              <a:rPr lang="en-US" sz="2200" b="1" dirty="0">
+                <a:solidFill>
+                  <a:srgbClr val="002060"/>
+                </a:solidFill>
+                <a:effectLst/>
+                <a:latin typeface="Arial" panose="020B0604020202020204" pitchFamily="34" charset="0"/>
+                <a:ea typeface="Times New Roman" panose="02020603050405020304" pitchFamily="18" charset="0"/>
+                <a:cs typeface="Times New Roman" panose="02020603050405020304" pitchFamily="18" charset="0"/>
+              </a:rPr>
+              <a:t> </a:t>
+            </a:r>
+            <a:r>
+              <a:rPr lang="en-US" sz="2200" baseline="30000" dirty="0">
+                <a:solidFill>
+                  <a:srgbClr val="002060"/>
+                </a:solidFill>
+                <a:effectLst/>
+                <a:latin typeface="Arial" panose="020B0604020202020204" pitchFamily="34" charset="0"/>
+                <a:ea typeface="Times New Roman" panose="02020603050405020304" pitchFamily="18" charset="0"/>
+                <a:cs typeface="Times New Roman" panose="02020603050405020304" pitchFamily="18" charset="0"/>
+                <a:hlinkClick r:id="rId2" action="ppaction://hlinksldjump"/>
+              </a:rPr>
+              <a:t>[1]</a:t>
+            </a:r>
+            <a:endParaRPr lang="en-VN" sz="2200" baseline="30000" dirty="0">
               <a:solidFill>
                 <a:srgbClr val="002060"/>
               </a:solidFill>
@@ -11964,7 +13139,7 @@
         </p:nvSpPr>
         <p:spPr>
           <a:xfrm>
-            <a:off x="3051922" y="4815648"/>
+            <a:off x="3135962" y="3680712"/>
             <a:ext cx="2872073" cy="365126"/>
           </a:xfrm>
         </p:spPr>
@@ -11978,7 +13153,7 @@
               <a:buNone/>
             </a:pPr>
             <a:r>
-              <a:rPr lang="en-US" sz="2200" b="1" dirty="0" err="1">
+              <a:rPr lang="en-US" sz="2400" b="1" dirty="0" err="1">
                 <a:solidFill>
                   <a:srgbClr val="002060"/>
                 </a:solidFill>
@@ -11986,7 +13161,7 @@
               <a:t>Xây</a:t>
             </a:r>
             <a:r>
-              <a:rPr lang="en-US" sz="2200" b="1" dirty="0">
+              <a:rPr lang="en-US" sz="2400" b="1" dirty="0">
                 <a:solidFill>
                   <a:srgbClr val="002060"/>
                 </a:solidFill>
@@ -11994,7 +13169,7 @@
               <a:t> </a:t>
             </a:r>
             <a:r>
-              <a:rPr lang="en-US" sz="2200" b="1" dirty="0" err="1">
+              <a:rPr lang="en-US" sz="2400" b="1" dirty="0" err="1">
                 <a:solidFill>
                   <a:srgbClr val="002060"/>
                 </a:solidFill>
@@ -12002,7 +13177,7 @@
               <a:t>dựng</a:t>
             </a:r>
             <a:r>
-              <a:rPr lang="en-US" sz="2200" b="1" dirty="0">
+              <a:rPr lang="en-US" sz="2400" b="1" dirty="0">
                 <a:solidFill>
                   <a:srgbClr val="002060"/>
                 </a:solidFill>
@@ -12010,7 +13185,7 @@
               <a:t> </a:t>
             </a:r>
             <a:r>
-              <a:rPr lang="en-US" sz="2200" b="1" dirty="0" err="1">
+              <a:rPr lang="en-US" sz="2400" b="1" dirty="0" err="1">
                 <a:solidFill>
                   <a:srgbClr val="002060"/>
                 </a:solidFill>
@@ -12018,7 +13193,7 @@
               <a:t>mô</a:t>
             </a:r>
             <a:r>
-              <a:rPr lang="en-US" sz="2200" b="1" dirty="0">
+              <a:rPr lang="en-US" sz="2400" b="1" dirty="0">
                 <a:solidFill>
                   <a:srgbClr val="002060"/>
                 </a:solidFill>
@@ -12026,14 +13201,14 @@
               <a:t> </a:t>
             </a:r>
             <a:r>
-              <a:rPr lang="en-US" sz="2200" b="1" dirty="0" err="1">
+              <a:rPr lang="en-US" sz="2400" b="1" dirty="0" err="1">
                 <a:solidFill>
                   <a:srgbClr val="002060"/>
                 </a:solidFill>
               </a:rPr>
               <a:t>hình</a:t>
             </a:r>
-            <a:endParaRPr lang="en-US" sz="2200" b="1" dirty="0">
+            <a:endParaRPr lang="en-US" sz="2400" b="1" dirty="0">
               <a:solidFill>
                 <a:srgbClr val="002060"/>
               </a:solidFill>
@@ -12100,7 +13275,7 @@
         </p:blipFill>
         <p:spPr bwMode="auto">
           <a:xfrm>
-            <a:off x="529145" y="4360612"/>
+            <a:off x="3726663" y="4287036"/>
             <a:ext cx="1690673" cy="1690673"/>
           </a:xfrm>
           <a:prstGeom prst="rect">
@@ -12140,7 +13315,7 @@
         </p:blipFill>
         <p:spPr>
           <a:xfrm>
-            <a:off x="574315" y="1729998"/>
+            <a:off x="647705" y="1729997"/>
             <a:ext cx="1600331" cy="1690673"/>
           </a:xfrm>
           <a:prstGeom prst="rect">
@@ -12240,96 +13415,6 @@
           </a:extLst>
         </p:spPr>
       </p:pic>
-      <p:sp>
-        <p:nvSpPr>
-          <p:cNvPr id="9" name="AutoShape 10" descr="Demo icon — Stock Photo © alexwhite #8742811">
-            <a:extLst>
-              <a:ext uri="{FF2B5EF4-FFF2-40B4-BE49-F238E27FC236}">
-                <a16:creationId xmlns:a16="http://schemas.microsoft.com/office/drawing/2014/main" id="{C5794FFF-AAF4-1416-82B2-0914B4682F31}"/>
-              </a:ext>
-            </a:extLst>
-          </p:cNvPr>
-          <p:cNvSpPr>
-            <a:spLocks noChangeAspect="1" noChangeArrowheads="1"/>
-          </p:cNvSpPr>
-          <p:nvPr/>
-        </p:nvSpPr>
-        <p:spPr bwMode="auto">
-          <a:xfrm>
-            <a:off x="5158208" y="3905504"/>
-            <a:ext cx="2185416" cy="2185416"/>
-          </a:xfrm>
-          <a:prstGeom prst="rect">
-            <a:avLst/>
-          </a:prstGeom>
-          <a:noFill/>
-          <a:extLst>
-            <a:ext uri="{909E8E84-426E-40DD-AFC4-6F175D3DCCD1}">
-              <a14:hiddenFill xmlns:a14="http://schemas.microsoft.com/office/drawing/2010/main">
-                <a:solidFill>
-                  <a:srgbClr val="FFFFFF"/>
-                </a:solidFill>
-              </a14:hiddenFill>
-            </a:ext>
-          </a:extLst>
-        </p:spPr>
-        <p:txBody>
-          <a:bodyPr vert="horz" wrap="square" lIns="91440" tIns="45720" rIns="91440" bIns="45720" numCol="1" anchor="t" anchorCtr="0" compatLnSpc="1">
-            <a:prstTxWarp prst="textNoShape">
-              <a:avLst/>
-            </a:prstTxWarp>
-          </a:bodyPr>
-          <a:lstStyle/>
-          <a:p>
-            <a:endParaRPr lang="en-US"/>
-          </a:p>
-        </p:txBody>
-      </p:sp>
-      <p:sp>
-        <p:nvSpPr>
-          <p:cNvPr id="10" name="AutoShape 12" descr="Demo icon — Stock Photo © alexwhite #8742811">
-            <a:extLst>
-              <a:ext uri="{FF2B5EF4-FFF2-40B4-BE49-F238E27FC236}">
-                <a16:creationId xmlns:a16="http://schemas.microsoft.com/office/drawing/2014/main" id="{205BAED8-A067-463A-A538-AE4561A8097B}"/>
-              </a:ext>
-            </a:extLst>
-          </p:cNvPr>
-          <p:cNvSpPr>
-            <a:spLocks noChangeAspect="1" noChangeArrowheads="1"/>
-          </p:cNvSpPr>
-          <p:nvPr/>
-        </p:nvSpPr>
-        <p:spPr bwMode="auto">
-          <a:xfrm>
-            <a:off x="4326104" y="3073400"/>
-            <a:ext cx="2014238" cy="2014238"/>
-          </a:xfrm>
-          <a:prstGeom prst="rect">
-            <a:avLst/>
-          </a:prstGeom>
-          <a:noFill/>
-          <a:extLst>
-            <a:ext uri="{909E8E84-426E-40DD-AFC4-6F175D3DCCD1}">
-              <a14:hiddenFill xmlns:a14="http://schemas.microsoft.com/office/drawing/2010/main">
-                <a:solidFill>
-                  <a:srgbClr val="FFFFFF"/>
-                </a:solidFill>
-              </a14:hiddenFill>
-            </a:ext>
-          </a:extLst>
-        </p:spPr>
-        <p:txBody>
-          <a:bodyPr vert="horz" wrap="square" lIns="91440" tIns="45720" rIns="91440" bIns="45720" numCol="1" anchor="t" anchorCtr="0" compatLnSpc="1">
-            <a:prstTxWarp prst="textNoShape">
-              <a:avLst/>
-            </a:prstTxWarp>
-          </a:bodyPr>
-          <a:lstStyle/>
-          <a:p>
-            <a:endParaRPr lang="en-US"/>
-          </a:p>
-        </p:txBody>
-      </p:sp>
       <p:pic>
         <p:nvPicPr>
           <p:cNvPr id="12" name="Picture 11">
@@ -12352,7 +13437,7 @@
         </p:blipFill>
         <p:spPr>
           <a:xfrm>
-            <a:off x="6706765" y="4508794"/>
+            <a:off x="6759527" y="4363956"/>
             <a:ext cx="1546419" cy="1532462"/>
           </a:xfrm>
           <a:prstGeom prst="rect">
@@ -12360,49 +13445,6 @@
           </a:prstGeom>
         </p:spPr>
       </p:pic>
-      <p:cxnSp>
-        <p:nvCxnSpPr>
-          <p:cNvPr id="14" name="Straight Arrow Connector 13">
-            <a:extLst>
-              <a:ext uri="{FF2B5EF4-FFF2-40B4-BE49-F238E27FC236}">
-                <a16:creationId xmlns:a16="http://schemas.microsoft.com/office/drawing/2014/main" id="{1FB38ADF-9723-5C02-8DD1-F6F4C596E0B5}"/>
-              </a:ext>
-            </a:extLst>
-          </p:cNvPr>
-          <p:cNvCxnSpPr>
-            <a:stCxn id="5" idx="0"/>
-            <a:endCxn id="7" idx="2"/>
-          </p:cNvCxnSpPr>
-          <p:nvPr/>
-        </p:nvCxnSpPr>
-        <p:spPr>
-          <a:xfrm flipH="1" flipV="1">
-            <a:off x="1374481" y="3420671"/>
-            <a:ext cx="1" cy="939941"/>
-          </a:xfrm>
-          <a:prstGeom prst="straightConnector1">
-            <a:avLst/>
-          </a:prstGeom>
-          <a:ln>
-            <a:headEnd type="none" w="med" len="med"/>
-            <a:tailEnd type="arrow" w="med" len="med"/>
-          </a:ln>
-        </p:spPr>
-        <p:style>
-          <a:lnRef idx="3">
-            <a:schemeClr val="accent1"/>
-          </a:lnRef>
-          <a:fillRef idx="0">
-            <a:schemeClr val="accent1"/>
-          </a:fillRef>
-          <a:effectRef idx="2">
-            <a:schemeClr val="accent1"/>
-          </a:effectRef>
-          <a:fontRef idx="minor">
-            <a:schemeClr val="tx1"/>
-          </a:fontRef>
-        </p:style>
-      </p:cxnSp>
       <p:cxnSp>
         <p:nvCxnSpPr>
           <p:cNvPr id="19" name="Straight Arrow Connector 18">
@@ -12419,9 +13461,9 @@
           <p:nvPr/>
         </p:nvCxnSpPr>
         <p:spPr>
-          <a:xfrm flipV="1">
-            <a:off x="2174646" y="2575334"/>
-            <a:ext cx="1281096" cy="1"/>
+          <a:xfrm>
+            <a:off x="2248036" y="2575334"/>
+            <a:ext cx="1207706" cy="0"/>
           </a:xfrm>
           <a:prstGeom prst="straightConnector1">
             <a:avLst/>
@@ -12503,9 +13545,9 @@
           <p:nvPr/>
         </p:nvCxnSpPr>
         <p:spPr>
-          <a:xfrm flipH="1">
-            <a:off x="7479975" y="3791916"/>
-            <a:ext cx="27001" cy="716878"/>
+          <a:xfrm>
+            <a:off x="7506976" y="3791916"/>
+            <a:ext cx="25761" cy="572040"/>
           </a:xfrm>
           <a:prstGeom prst="straightConnector1">
             <a:avLst/>
@@ -12543,7 +13585,7 @@
         </p:nvSpPr>
         <p:spPr>
           <a:xfrm>
-            <a:off x="378535" y="1330268"/>
+            <a:off x="451925" y="1330267"/>
             <a:ext cx="2407920" cy="369332"/>
           </a:xfrm>
           <a:prstGeom prst="rect">
@@ -12584,8 +13626,8 @@
         </p:nvSpPr>
         <p:spPr>
           <a:xfrm>
-            <a:off x="1413453" y="3643894"/>
-            <a:ext cx="2185868" cy="523220"/>
+            <a:off x="343048" y="5989996"/>
+            <a:ext cx="2266230" cy="369332"/>
           </a:xfrm>
           <a:prstGeom prst="rect">
             <a:avLst/>
@@ -12599,11 +13641,11 @@
           <a:lstStyle/>
           <a:p>
             <a:r>
-              <a:rPr lang="en-US" sz="1400" dirty="0">
+              <a:rPr lang="en-US" b="1" dirty="0">
                 <a:latin typeface="Arial" panose="020B0604020202020204" pitchFamily="34" charset="0"/>
                 <a:cs typeface="Arial" panose="020B0604020202020204" pitchFamily="34" charset="0"/>
               </a:rPr>
-              <a:t>Using CICFLOWMETER to extract 80 features </a:t>
+              <a:t>Extract 80 features </a:t>
             </a:r>
           </a:p>
         </p:txBody>
@@ -12622,8 +13664,8 @@
         </p:nvSpPr>
         <p:spPr>
           <a:xfrm>
-            <a:off x="2946601" y="1202720"/>
-            <a:ext cx="3499478" cy="369332"/>
+            <a:off x="3455740" y="1038862"/>
+            <a:ext cx="2232516" cy="646331"/>
           </a:xfrm>
           <a:prstGeom prst="rect">
             <a:avLst/>
@@ -12636,8 +13678,9 @@
           </a:bodyPr>
           <a:lstStyle/>
           <a:p>
-            <a:r>
-              <a:rPr lang="en-US" dirty="0">
+            <a:pPr algn="ctr"/>
+            <a:r>
+              <a:rPr lang="en-US" b="1" dirty="0">
                 <a:latin typeface="Arial" panose="020B0604020202020204" pitchFamily="34" charset="0"/>
                 <a:cs typeface="Arial" panose="020B0604020202020204" pitchFamily="34" charset="0"/>
               </a:rPr>
@@ -12660,7 +13703,7 @@
         </p:nvSpPr>
         <p:spPr>
           <a:xfrm>
-            <a:off x="6862846" y="3953241"/>
+            <a:off x="7532737" y="3974889"/>
             <a:ext cx="548954" cy="307777"/>
           </a:xfrm>
           <a:prstGeom prst="rect">
@@ -12684,6 +13727,120 @@
           </a:p>
         </p:txBody>
       </p:sp>
+      <p:pic>
+        <p:nvPicPr>
+          <p:cNvPr id="8" name="Picture 7">
+            <a:extLst>
+              <a:ext uri="{FF2B5EF4-FFF2-40B4-BE49-F238E27FC236}">
+                <a16:creationId xmlns:a16="http://schemas.microsoft.com/office/drawing/2014/main" id="{9CEB2771-7AAB-57AC-E2DA-2DA72A984D84}"/>
+              </a:ext>
+            </a:extLst>
+          </p:cNvPr>
+          <p:cNvPicPr>
+            <a:picLocks noChangeAspect="1"/>
+          </p:cNvPicPr>
+          <p:nvPr/>
+        </p:nvPicPr>
+        <p:blipFill>
+          <a:blip r:embed="rId7"/>
+          <a:stretch>
+            <a:fillRect/>
+          </a:stretch>
+        </p:blipFill>
+        <p:spPr>
+          <a:xfrm>
+            <a:off x="435940" y="4282665"/>
+            <a:ext cx="2023862" cy="1695043"/>
+          </a:xfrm>
+          <a:prstGeom prst="rect">
+            <a:avLst/>
+          </a:prstGeom>
+        </p:spPr>
+      </p:pic>
+      <p:cxnSp>
+        <p:nvCxnSpPr>
+          <p:cNvPr id="13" name="Straight Arrow Connector 12">
+            <a:extLst>
+              <a:ext uri="{FF2B5EF4-FFF2-40B4-BE49-F238E27FC236}">
+                <a16:creationId xmlns:a16="http://schemas.microsoft.com/office/drawing/2014/main" id="{F6DB864E-0047-98BD-CF35-6337A5738CB7}"/>
+              </a:ext>
+            </a:extLst>
+          </p:cNvPr>
+          <p:cNvCxnSpPr>
+            <a:stCxn id="5" idx="1"/>
+            <a:endCxn id="8" idx="3"/>
+          </p:cNvCxnSpPr>
+          <p:nvPr/>
+        </p:nvCxnSpPr>
+        <p:spPr>
+          <a:xfrm flipH="1" flipV="1">
+            <a:off x="2459802" y="5130187"/>
+            <a:ext cx="1266861" cy="2186"/>
+          </a:xfrm>
+          <a:prstGeom prst="straightConnector1">
+            <a:avLst/>
+          </a:prstGeom>
+          <a:ln>
+            <a:tailEnd type="triangle"/>
+          </a:ln>
+        </p:spPr>
+        <p:style>
+          <a:lnRef idx="3">
+            <a:schemeClr val="accent1"/>
+          </a:lnRef>
+          <a:fillRef idx="0">
+            <a:schemeClr val="accent1"/>
+          </a:fillRef>
+          <a:effectRef idx="2">
+            <a:schemeClr val="accent1"/>
+          </a:effectRef>
+          <a:fontRef idx="minor">
+            <a:schemeClr val="tx1"/>
+          </a:fontRef>
+        </p:style>
+      </p:cxnSp>
+      <p:cxnSp>
+        <p:nvCxnSpPr>
+          <p:cNvPr id="16" name="Straight Arrow Connector 15">
+            <a:extLst>
+              <a:ext uri="{FF2B5EF4-FFF2-40B4-BE49-F238E27FC236}">
+                <a16:creationId xmlns:a16="http://schemas.microsoft.com/office/drawing/2014/main" id="{0403D7C6-680A-E364-9E42-DE098D1A0F47}"/>
+              </a:ext>
+            </a:extLst>
+          </p:cNvPr>
+          <p:cNvCxnSpPr>
+            <a:stCxn id="8" idx="0"/>
+            <a:endCxn id="7" idx="2"/>
+          </p:cNvCxnSpPr>
+          <p:nvPr/>
+        </p:nvCxnSpPr>
+        <p:spPr>
+          <a:xfrm flipV="1">
+            <a:off x="1447871" y="3420670"/>
+            <a:ext cx="0" cy="861995"/>
+          </a:xfrm>
+          <a:prstGeom prst="straightConnector1">
+            <a:avLst/>
+          </a:prstGeom>
+          <a:ln>
+            <a:tailEnd type="triangle"/>
+          </a:ln>
+        </p:spPr>
+        <p:style>
+          <a:lnRef idx="3">
+            <a:schemeClr val="accent1"/>
+          </a:lnRef>
+          <a:fillRef idx="0">
+            <a:schemeClr val="accent1"/>
+          </a:fillRef>
+          <a:effectRef idx="2">
+            <a:schemeClr val="accent1"/>
+          </a:effectRef>
+          <a:fontRef idx="minor">
+            <a:schemeClr val="tx1"/>
+          </a:fontRef>
+        </p:style>
+      </p:cxnSp>
     </p:spTree>
     <p:extLst>
       <p:ext uri="{BB962C8B-B14F-4D97-AF65-F5344CB8AC3E}">
@@ -12739,7 +13896,17 @@
               <a:rPr lang="en-US" dirty="0" err="1"/>
               <a:t>DataSet</a:t>
             </a:r>
-            <a:endParaRPr lang="en-US" dirty="0"/>
+            <a:r>
+              <a:rPr lang="en-US" dirty="0"/>
+              <a:t> </a:t>
+            </a:r>
+            <a:r>
+              <a:rPr lang="en-US" baseline="30000" dirty="0">
+                <a:hlinkClick r:id="rId2" action="ppaction://hlinksldjump"/>
+              </a:rPr>
+              <a:t>[2]</a:t>
+            </a:r>
+            <a:endParaRPr lang="en-US" baseline="30000" dirty="0"/>
           </a:p>
         </p:txBody>
       </p:sp>
@@ -12929,7 +14096,6 @@
                   <a:srgbClr val="2D2D2D"/>
                 </a:solidFill>
                 <a:effectLst/>
-                <a:latin typeface="ProximaNovaA-Regular"/>
               </a:rPr>
               <a:t>Để tạo CIC-UNSW-NB15, sử dụng </a:t>
             </a:r>
@@ -12939,8 +14105,7 @@
                   <a:srgbClr val="007FA3"/>
                 </a:solidFill>
                 <a:effectLst/>
-                <a:latin typeface="ProximaNovaA-Regular"/>
-                <a:hlinkClick r:id="rId2"/>
+                <a:hlinkClick r:id="rId3"/>
               </a:rPr>
               <a:t>CICFlowMeter</a:t>
             </a:r>
@@ -12950,7 +14115,6 @@
                   <a:srgbClr val="2D2D2D"/>
                 </a:solidFill>
                 <a:effectLst/>
-                <a:latin typeface="ProximaNovaA-Regular"/>
               </a:rPr>
               <a:t> để trích xuất bộ tính năng mới từ dữ liệu lưu lượng mạng được UNSW-NB15 thu thập.</a:t>
             </a:r>
@@ -12960,6 +14124,10 @@
               <a:rPr lang="vi-VN" dirty="0"/>
               <a:t>Bao gồm khoảng 2.5 triệu records với 49 features</a:t>
             </a:r>
+            <a:endParaRPr lang="en-US" dirty="0"/>
+          </a:p>
+          <a:p>
+            <a:endParaRPr lang="vi-VN" dirty="0"/>
           </a:p>
         </p:txBody>
       </p:sp>
@@ -13349,7 +14517,7 @@
           <p:nvPr>
             <p:extLst>
               <p:ext uri="{D42A27DB-BD31-4B8C-83A1-F6EECF244321}">
-                <p14:modId xmlns:p14="http://schemas.microsoft.com/office/powerpoint/2010/main" val="748830047"/>
+                <p14:modId xmlns:p14="http://schemas.microsoft.com/office/powerpoint/2010/main" val="2232343210"/>
               </p:ext>
             </p:extLst>
           </p:nvPr>
@@ -13455,7 +14623,29 @@
                           <a:latin typeface="Arial" panose="020B0604020202020204" pitchFamily="34" charset="0"/>
                           <a:cs typeface="Arial" panose="020B0604020202020204" pitchFamily="34" charset="0"/>
                         </a:rPr>
-                        <a:t>, phương pháp này thực hiện tính trung bình có trọng số của các bản cập nhật dựa trên kích thước của các tập dữ liệu riêng lẻ của từng khách hàng.</a:t>
+                        <a:t>, phương pháp này thực hiện tính trung bình có trọng số của các bản cập nhật dựa trên kích thước của các tập dữ liệu riêng lẻ của từng khách hang</a:t>
+                      </a:r>
+                      <a:r>
+                        <a:rPr lang="en-US" sz="1800" b="0" dirty="0">
+                          <a:latin typeface="Arial" panose="020B0604020202020204" pitchFamily="34" charset="0"/>
+                          <a:cs typeface="Arial" panose="020B0604020202020204" pitchFamily="34" charset="0"/>
+                        </a:rPr>
+                        <a:t> </a:t>
+                      </a:r>
+                      <a:r>
+                        <a:rPr lang="en-US" sz="1800" b="0" baseline="30000" dirty="0">
+                          <a:latin typeface="Arial" panose="020B0604020202020204" pitchFamily="34" charset="0"/>
+                          <a:cs typeface="Arial" panose="020B0604020202020204" pitchFamily="34" charset="0"/>
+                          <a:hlinkClick r:id="rId2" action="ppaction://hlinksldjump"/>
+                        </a:rPr>
+                        <a:t>[3]</a:t>
+                      </a:r>
+                      <a:r>
+                        <a:rPr lang="vi-VN" sz="1800" b="0" dirty="0">
+                          <a:latin typeface="Arial" panose="020B0604020202020204" pitchFamily="34" charset="0"/>
+                          <a:cs typeface="Arial" panose="020B0604020202020204" pitchFamily="34" charset="0"/>
+                        </a:rPr>
+                        <a:t>.</a:t>
                       </a:r>
                       <a:endParaRPr lang="en-US" sz="1800" b="0" dirty="0">
                         <a:latin typeface="Arial" panose="020B0604020202020204" pitchFamily="34" charset="0"/>
@@ -13504,21 +14694,91 @@
           <p:nvPr/>
         </p:nvPicPr>
         <p:blipFill>
-          <a:blip r:embed="rId2"/>
-          <a:stretch>
-            <a:fillRect/>
-          </a:stretch>
+          <a:blip r:embed="rId3"/>
+          <a:srcRect l="1649" t="2330" r="2040" b="2967"/>
+          <a:stretch/>
         </p:blipFill>
         <p:spPr>
           <a:xfrm>
-            <a:off x="3004170" y="1229360"/>
-            <a:ext cx="5738742" cy="4795520"/>
+            <a:off x="3088640" y="1605280"/>
+            <a:ext cx="5527040" cy="4541520"/>
           </a:xfrm>
           <a:prstGeom prst="rect">
             <a:avLst/>
           </a:prstGeom>
         </p:spPr>
       </p:pic>
+      <p:sp>
+        <p:nvSpPr>
+          <p:cNvPr id="3" name="TextBox 2">
+            <a:extLst>
+              <a:ext uri="{FF2B5EF4-FFF2-40B4-BE49-F238E27FC236}">
+                <a16:creationId xmlns:a16="http://schemas.microsoft.com/office/drawing/2014/main" id="{3FDF9125-FC6B-E22C-9394-D0174ED39431}"/>
+              </a:ext>
+            </a:extLst>
+          </p:cNvPr>
+          <p:cNvSpPr txBox="1"/>
+          <p:nvPr/>
+        </p:nvSpPr>
+        <p:spPr>
+          <a:xfrm>
+            <a:off x="4084320" y="1137920"/>
+            <a:ext cx="3606800" cy="338554"/>
+          </a:xfrm>
+          <a:prstGeom prst="rect">
+            <a:avLst/>
+          </a:prstGeom>
+          <a:noFill/>
+        </p:spPr>
+        <p:txBody>
+          <a:bodyPr wrap="square" rtlCol="0">
+            <a:spAutoFit/>
+          </a:bodyPr>
+          <a:lstStyle/>
+          <a:p>
+            <a:r>
+              <a:rPr lang="en-US" sz="1600" dirty="0" err="1">
+                <a:latin typeface="Arial" panose="020B0604020202020204" pitchFamily="34" charset="0"/>
+                <a:cs typeface="Arial" panose="020B0604020202020204" pitchFamily="34" charset="0"/>
+              </a:rPr>
+              <a:t>Mô</a:t>
+            </a:r>
+            <a:r>
+              <a:rPr lang="en-US" sz="1600" dirty="0">
+                <a:latin typeface="Arial" panose="020B0604020202020204" pitchFamily="34" charset="0"/>
+                <a:cs typeface="Arial" panose="020B0604020202020204" pitchFamily="34" charset="0"/>
+              </a:rPr>
+              <a:t> </a:t>
+            </a:r>
+            <a:r>
+              <a:rPr lang="en-US" sz="1600" dirty="0" err="1">
+                <a:latin typeface="Arial" panose="020B0604020202020204" pitchFamily="34" charset="0"/>
+                <a:cs typeface="Arial" panose="020B0604020202020204" pitchFamily="34" charset="0"/>
+              </a:rPr>
+              <a:t>hình</a:t>
+            </a:r>
+            <a:r>
+              <a:rPr lang="en-US" sz="1600" dirty="0">
+                <a:latin typeface="Arial" panose="020B0604020202020204" pitchFamily="34" charset="0"/>
+                <a:cs typeface="Arial" panose="020B0604020202020204" pitchFamily="34" charset="0"/>
+              </a:rPr>
+              <a:t> Federated Averaging </a:t>
+            </a:r>
+            <a:r>
+              <a:rPr lang="en-US" sz="1600" baseline="30000" dirty="0">
+                <a:latin typeface="Arial" panose="020B0604020202020204" pitchFamily="34" charset="0"/>
+                <a:cs typeface="Arial" panose="020B0604020202020204" pitchFamily="34" charset="0"/>
+                <a:hlinkClick r:id="rId2" action="ppaction://hlinksldjump"/>
+              </a:rPr>
+              <a:t>[4]</a:t>
+            </a:r>
+            <a:endParaRPr lang="en-US" sz="1600" baseline="30000" dirty="0">
+              <a:latin typeface="Arial" panose="020B0604020202020204" pitchFamily="34" charset="0"/>
+              <a:cs typeface="Arial" panose="020B0604020202020204" pitchFamily="34" charset="0"/>
+            </a:endParaRPr>
+          </a:p>
+        </p:txBody>
+      </p:sp>
     </p:spTree>
     <p:extLst>
       <p:ext uri="{BB962C8B-B14F-4D97-AF65-F5344CB8AC3E}">
@@ -13653,7 +14913,7 @@
           <p:nvPr>
             <p:extLst>
               <p:ext uri="{D42A27DB-BD31-4B8C-83A1-F6EECF244321}">
-                <p14:modId xmlns:p14="http://schemas.microsoft.com/office/powerpoint/2010/main" val="3176604442"/>
+                <p14:modId xmlns:p14="http://schemas.microsoft.com/office/powerpoint/2010/main" val="963143719"/>
               </p:ext>
             </p:extLst>
           </p:nvPr>
@@ -13724,7 +14984,29 @@
                           <a:latin typeface="+mn-lt"/>
                           <a:cs typeface="Arial" panose="020B0604020202020204" pitchFamily="34" charset="0"/>
                         </a:rPr>
-                        <a:t>, sử dụng trọng số dựa trên kích thước dữ liệu của từng client để cập nhật mô hình toàn cục.</a:t>
+                        <a:t>, sử dụng trọng số dựa trên kích thước dữ liệu của từng client để cập nhật mô hình toàn cục</a:t>
+                      </a:r>
+                      <a:r>
+                        <a:rPr lang="en-US" sz="1800" b="0" dirty="0">
+                          <a:latin typeface="+mn-lt"/>
+                          <a:cs typeface="Arial" panose="020B0604020202020204" pitchFamily="34" charset="0"/>
+                        </a:rPr>
+                        <a:t> </a:t>
+                      </a:r>
+                      <a:r>
+                        <a:rPr lang="en-US" sz="1800" b="0" baseline="30000" dirty="0">
+                          <a:latin typeface="+mn-lt"/>
+                          <a:cs typeface="Arial" panose="020B0604020202020204" pitchFamily="34" charset="0"/>
+                          <a:hlinkClick r:id="rId2" action="ppaction://hlinksldjump"/>
+                        </a:rPr>
+                        <a:t>[5]</a:t>
+                      </a:r>
+                      <a:r>
+                        <a:rPr lang="vi-VN" sz="1800" b="0" dirty="0">
+                          <a:latin typeface="+mn-lt"/>
+                          <a:cs typeface="Arial" panose="020B0604020202020204" pitchFamily="34" charset="0"/>
+                        </a:rPr>
+                        <a:t>.</a:t>
                       </a:r>
                     </a:p>
                     <a:p>
@@ -13776,20 +15058,84 @@
           <p:nvPr/>
         </p:nvPicPr>
         <p:blipFill>
-          <a:blip r:embed="rId2"/>
-          <a:srcRect r="3961"/>
+          <a:blip r:embed="rId3"/>
+          <a:srcRect l="1524" t="6500" r="3961" b="1691"/>
           <a:stretch/>
         </p:blipFill>
         <p:spPr>
           <a:xfrm>
-            <a:off x="2985770" y="1198132"/>
-            <a:ext cx="5619750" cy="4959576"/>
+            <a:off x="3007360" y="1419517"/>
+            <a:ext cx="5760721" cy="4742789"/>
           </a:xfrm>
           <a:prstGeom prst="rect">
             <a:avLst/>
           </a:prstGeom>
         </p:spPr>
       </p:pic>
+      <p:sp>
+        <p:nvSpPr>
+          <p:cNvPr id="3" name="TextBox 2">
+            <a:extLst>
+              <a:ext uri="{FF2B5EF4-FFF2-40B4-BE49-F238E27FC236}">
+                <a16:creationId xmlns:a16="http://schemas.microsoft.com/office/drawing/2014/main" id="{E349DA6F-0B92-39F4-0E7C-7B15932207B4}"/>
+              </a:ext>
+            </a:extLst>
+          </p:cNvPr>
+          <p:cNvSpPr txBox="1"/>
+          <p:nvPr/>
+        </p:nvSpPr>
+        <p:spPr>
+          <a:xfrm>
+            <a:off x="4084320" y="1137920"/>
+            <a:ext cx="3606800" cy="338554"/>
+          </a:xfrm>
+          <a:prstGeom prst="rect">
+            <a:avLst/>
+          </a:prstGeom>
+          <a:noFill/>
+        </p:spPr>
+        <p:txBody>
+          <a:bodyPr wrap="square" rtlCol="0">
+            <a:spAutoFit/>
+          </a:bodyPr>
+          <a:lstStyle/>
+          <a:p>
+            <a:r>
+              <a:rPr lang="en-US" sz="1600" dirty="0">
+                <a:latin typeface="Arial" panose="020B0604020202020204" pitchFamily="34" charset="0"/>
+                <a:cs typeface="Arial" panose="020B0604020202020204" pitchFamily="34" charset="0"/>
+              </a:rPr>
+              <a:t>W-</a:t>
+            </a:r>
+            <a:r>
+              <a:rPr lang="en-US" sz="1600" dirty="0" err="1">
+                <a:latin typeface="Arial" panose="020B0604020202020204" pitchFamily="34" charset="0"/>
+                <a:cs typeface="Arial" panose="020B0604020202020204" pitchFamily="34" charset="0"/>
+              </a:rPr>
+              <a:t>FedAvg</a:t>
+            </a:r>
+            <a:r>
+              <a:rPr lang="en-US" sz="1600" dirty="0">
+                <a:latin typeface="Arial" panose="020B0604020202020204" pitchFamily="34" charset="0"/>
+                <a:cs typeface="Arial" panose="020B0604020202020204" pitchFamily="34" charset="0"/>
+              </a:rPr>
+              <a:t> by example forgetting </a:t>
+            </a:r>
+            <a:r>
+              <a:rPr lang="en-US" sz="1600" baseline="30000" dirty="0">
+                <a:latin typeface="Arial" panose="020B0604020202020204" pitchFamily="34" charset="0"/>
+                <a:cs typeface="Arial" panose="020B0604020202020204" pitchFamily="34" charset="0"/>
+                <a:hlinkClick r:id="rId2" action="ppaction://hlinksldjump"/>
+              </a:rPr>
+              <a:t>[5]</a:t>
+            </a:r>
+            <a:endParaRPr lang="en-US" sz="1600" baseline="30000" dirty="0">
+              <a:latin typeface="Arial" panose="020B0604020202020204" pitchFamily="34" charset="0"/>
+              <a:cs typeface="Arial" panose="020B0604020202020204" pitchFamily="34" charset="0"/>
+            </a:endParaRPr>
+          </a:p>
+        </p:txBody>
+      </p:sp>
     </p:spTree>
     <p:extLst>
       <p:ext uri="{BB962C8B-B14F-4D97-AF65-F5344CB8AC3E}">
@@ -14357,4 +15703,319 @@
     </a:ext>
   </a:extLst>
 </a:theme>
+</file>
+
+<file path=ppt/theme/theme3.xml><?xml version="1.0" encoding="utf-8"?>
+<a:theme xmlns:a="http://schemas.openxmlformats.org/drawingml/2006/main" name="Office Theme">
+  <a:themeElements>
+    <a:clrScheme name="Office">
+      <a:dk1>
+        <a:sysClr val="windowText" lastClr="000000"/>
+      </a:dk1>
+      <a:lt1>
+        <a:sysClr val="window" lastClr="FFFFFF"/>
+      </a:lt1>
+      <a:dk2>
+        <a:srgbClr val="0E2841"/>
+      </a:dk2>
+      <a:lt2>
+        <a:srgbClr val="E8E8E8"/>
+      </a:lt2>
+      <a:accent1>
+        <a:srgbClr val="156082"/>
+      </a:accent1>
+      <a:accent2>
+        <a:srgbClr val="E97132"/>
+      </a:accent2>
+      <a:accent3>
+        <a:srgbClr val="196B24"/>
+      </a:accent3>
+      <a:accent4>
+        <a:srgbClr val="0F9ED5"/>
+      </a:accent4>
+      <a:accent5>
+        <a:srgbClr val="A02B93"/>
+      </a:accent5>
+      <a:accent6>
+        <a:srgbClr val="4EA72E"/>
+      </a:accent6>
+      <a:hlink>
+        <a:srgbClr val="467886"/>
+      </a:hlink>
+      <a:folHlink>
+        <a:srgbClr val="96607D"/>
+      </a:folHlink>
+    </a:clrScheme>
+    <a:fontScheme name="Office">
+      <a:majorFont>
+        <a:latin typeface="Aptos Display" panose="02110004020202020204"/>
+        <a:ea typeface=""/>
+        <a:cs typeface=""/>
+        <a:font script="Jpan" typeface="游ゴシック Light"/>
+        <a:font script="Hang" typeface="맑은 고딕"/>
+        <a:font script="Hans" typeface="等线 Light"/>
+        <a:font script="Hant" typeface="新細明體"/>
+        <a:font script="Arab" typeface="Times New Roman"/>
+        <a:font script="Hebr" typeface="Times New Roman"/>
+        <a:font script="Thai" typeface="Angsana New"/>
+        <a:font script="Ethi" typeface="Nyala"/>
+        <a:font script="Beng" typeface="Vrinda"/>
+        <a:font script="Gujr" typeface="Shruti"/>
+        <a:font script="Khmr" typeface="MoolBoran"/>
+        <a:font script="Knda" typeface="Tunga"/>
+        <a:font script="Guru" typeface="Raavi"/>
+        <a:font script="Cans" typeface="Euphemia"/>
+        <a:font script="Cher" typeface="Plantagenet Cherokee"/>
+        <a:font script="Yiii" typeface="Microsoft Yi Baiti"/>
+        <a:font script="Tibt" typeface="Microsoft Himalaya"/>
+        <a:font script="Thaa" typeface="MV Boli"/>
+        <a:font script="Deva" typeface="Mangal"/>
+        <a:font script="Telu" typeface="Gautami"/>
+        <a:font script="Taml" typeface="Latha"/>
+        <a:font script="Syrc" typeface="Estrangelo Edessa"/>
+        <a:font script="Orya" typeface="Kalinga"/>
+        <a:font script="Mlym" typeface="Kartika"/>
+        <a:font script="Laoo" typeface="DokChampa"/>
+        <a:font script="Sinh" typeface="Iskoola Pota"/>
+        <a:font script="Mong" typeface="Mongolian Baiti"/>
+        <a:font script="Viet" typeface="Times New Roman"/>
+        <a:font script="Uigh" typeface="Microsoft Uighur"/>
+        <a:font script="Geor" typeface="Sylfaen"/>
+        <a:font script="Armn" typeface="Arial"/>
+        <a:font script="Bugi" typeface="Leelawadee UI"/>
+        <a:font script="Bopo" typeface="Microsoft JhengHei"/>
+        <a:font script="Java" typeface="Javanese Text"/>
+        <a:font script="Lisu" typeface="Segoe UI"/>
+        <a:font script="Mymr" typeface="Myanmar Text"/>
+        <a:font script="Nkoo" typeface="Ebrima"/>
+        <a:font script="Olck" typeface="Nirmala UI"/>
+        <a:font script="Osma" typeface="Ebrima"/>
+        <a:font script="Phag" typeface="Phagspa"/>
+        <a:font script="Syrn" typeface="Estrangelo Edessa"/>
+        <a:font script="Syrj" typeface="Estrangelo Edessa"/>
+        <a:font script="Syre" typeface="Estrangelo Edessa"/>
+        <a:font script="Sora" typeface="Nirmala UI"/>
+        <a:font script="Tale" typeface="Microsoft Tai Le"/>
+        <a:font script="Talu" typeface="Microsoft New Tai Lue"/>
+        <a:font script="Tfng" typeface="Ebrima"/>
+      </a:majorFont>
+      <a:minorFont>
+        <a:latin typeface="Aptos" panose="02110004020202020204"/>
+        <a:ea typeface=""/>
+        <a:cs typeface=""/>
+        <a:font script="Jpan" typeface="游ゴシック"/>
+        <a:font script="Hang" typeface="맑은 고딕"/>
+        <a:font script="Hans" typeface="等线"/>
+        <a:font script="Hant" typeface="新細明體"/>
+        <a:font script="Arab" typeface="Arial"/>
+        <a:font script="Hebr" typeface="Arial"/>
+        <a:font script="Thai" typeface="Cordia New"/>
+        <a:font script="Ethi" typeface="Nyala"/>
+        <a:font script="Beng" typeface="Vrinda"/>
+        <a:font script="Gujr" typeface="Shruti"/>
+        <a:font script="Khmr" typeface="DaunPenh"/>
+        <a:font script="Knda" typeface="Tunga"/>
+        <a:font script="Guru" typeface="Raavi"/>
+        <a:font script="Cans" typeface="Euphemia"/>
+        <a:font script="Cher" typeface="Plantagenet Cherokee"/>
+        <a:font script="Yiii" typeface="Microsoft Yi Baiti"/>
+        <a:font script="Tibt" typeface="Microsoft Himalaya"/>
+        <a:font script="Thaa" typeface="MV Boli"/>
+        <a:font script="Deva" typeface="Mangal"/>
+        <a:font script="Telu" typeface="Gautami"/>
+        <a:font script="Taml" typeface="Latha"/>
+        <a:font script="Syrc" typeface="Estrangelo Edessa"/>
+        <a:font script="Orya" typeface="Kalinga"/>
+        <a:font script="Mlym" typeface="Kartika"/>
+        <a:font script="Laoo" typeface="DokChampa"/>
+        <a:font script="Sinh" typeface="Iskoola Pota"/>
+        <a:font script="Mong" typeface="Mongolian Baiti"/>
+        <a:font script="Viet" typeface="Arial"/>
+        <a:font script="Uigh" typeface="Microsoft Uighur"/>
+        <a:font script="Geor" typeface="Sylfaen"/>
+        <a:font script="Armn" typeface="Arial"/>
+        <a:font script="Bugi" typeface="Leelawadee UI"/>
+        <a:font script="Bopo" typeface="Microsoft JhengHei"/>
+        <a:font script="Java" typeface="Javanese Text"/>
+        <a:font script="Lisu" typeface="Segoe UI"/>
+        <a:font script="Mymr" typeface="Myanmar Text"/>
+        <a:font script="Nkoo" typeface="Ebrima"/>
+        <a:font script="Olck" typeface="Nirmala UI"/>
+        <a:font script="Osma" typeface="Ebrima"/>
+        <a:font script="Phag" typeface="Phagspa"/>
+        <a:font script="Syrn" typeface="Estrangelo Edessa"/>
+        <a:font script="Syrj" typeface="Estrangelo Edessa"/>
+        <a:font script="Syre" typeface="Estrangelo Edessa"/>
+        <a:font script="Sora" typeface="Nirmala UI"/>
+        <a:font script="Tale" typeface="Microsoft Tai Le"/>
+        <a:font script="Talu" typeface="Microsoft New Tai Lue"/>
+        <a:font script="Tfng" typeface="Ebrima"/>
+      </a:minorFont>
+    </a:fontScheme>
+    <a:fmtScheme name="Office">
+      <a:fillStyleLst>
+        <a:solidFill>
+          <a:schemeClr val="phClr"/>
+        </a:solidFill>
+        <a:gradFill rotWithShape="1">
+          <a:gsLst>
+            <a:gs pos="0">
+              <a:schemeClr val="phClr">
+                <a:lumMod val="110000"/>
+                <a:satMod val="105000"/>
+                <a:tint val="67000"/>
+              </a:schemeClr>
+            </a:gs>
+            <a:gs pos="50000">
+              <a:schemeClr val="phClr">
+                <a:lumMod val="105000"/>
+                <a:satMod val="103000"/>
+                <a:tint val="73000"/>
+              </a:schemeClr>
+            </a:gs>
+            <a:gs pos="100000">
+              <a:schemeClr val="phClr">
+                <a:lumMod val="105000"/>
+                <a:satMod val="109000"/>
+                <a:tint val="81000"/>
+              </a:schemeClr>
+            </a:gs>
+          </a:gsLst>
+          <a:lin ang="5400000" scaled="0"/>
+        </a:gradFill>
+        <a:gradFill rotWithShape="1">
+          <a:gsLst>
+            <a:gs pos="0">
+              <a:schemeClr val="phClr">
+                <a:satMod val="103000"/>
+                <a:lumMod val="102000"/>
+                <a:tint val="94000"/>
+              </a:schemeClr>
+            </a:gs>
+            <a:gs pos="50000">
+              <a:schemeClr val="phClr">
+                <a:satMod val="110000"/>
+                <a:lumMod val="100000"/>
+                <a:shade val="100000"/>
+              </a:schemeClr>
+            </a:gs>
+            <a:gs pos="100000">
+              <a:schemeClr val="phClr">
+                <a:lumMod val="99000"/>
+                <a:satMod val="120000"/>
+                <a:shade val="78000"/>
+              </a:schemeClr>
+            </a:gs>
+          </a:gsLst>
+          <a:lin ang="5400000" scaled="0"/>
+        </a:gradFill>
+      </a:fillStyleLst>
+      <a:lnStyleLst>
+        <a:ln w="12700" cap="flat" cmpd="sng" algn="ctr">
+          <a:solidFill>
+            <a:schemeClr val="phClr"/>
+          </a:solidFill>
+          <a:prstDash val="solid"/>
+          <a:miter lim="800000"/>
+        </a:ln>
+        <a:ln w="19050" cap="flat" cmpd="sng" algn="ctr">
+          <a:solidFill>
+            <a:schemeClr val="phClr"/>
+          </a:solidFill>
+          <a:prstDash val="solid"/>
+          <a:miter lim="800000"/>
+        </a:ln>
+        <a:ln w="25400" cap="flat" cmpd="sng" algn="ctr">
+          <a:solidFill>
+            <a:schemeClr val="phClr"/>
+          </a:solidFill>
+          <a:prstDash val="solid"/>
+          <a:miter lim="800000"/>
+        </a:ln>
+      </a:lnStyleLst>
+      <a:effectStyleLst>
+        <a:effectStyle>
+          <a:effectLst/>
+        </a:effectStyle>
+        <a:effectStyle>
+          <a:effectLst/>
+        </a:effectStyle>
+        <a:effectStyle>
+          <a:effectLst>
+            <a:outerShdw blurRad="57150" dist="19050" dir="5400000" algn="ctr" rotWithShape="0">
+              <a:srgbClr val="000000">
+                <a:alpha val="63000"/>
+              </a:srgbClr>
+            </a:outerShdw>
+          </a:effectLst>
+        </a:effectStyle>
+      </a:effectStyleLst>
+      <a:bgFillStyleLst>
+        <a:solidFill>
+          <a:schemeClr val="phClr"/>
+        </a:solidFill>
+        <a:solidFill>
+          <a:schemeClr val="phClr">
+            <a:tint val="95000"/>
+            <a:satMod val="170000"/>
+          </a:schemeClr>
+        </a:solidFill>
+        <a:gradFill rotWithShape="1">
+          <a:gsLst>
+            <a:gs pos="0">
+              <a:schemeClr val="phClr">
+                <a:tint val="93000"/>
+                <a:satMod val="150000"/>
+                <a:shade val="98000"/>
+                <a:lumMod val="102000"/>
+              </a:schemeClr>
+            </a:gs>
+            <a:gs pos="50000">
+              <a:schemeClr val="phClr">
+                <a:tint val="98000"/>
+                <a:satMod val="130000"/>
+                <a:shade val="90000"/>
+                <a:lumMod val="103000"/>
+              </a:schemeClr>
+            </a:gs>
+            <a:gs pos="100000">
+              <a:schemeClr val="phClr">
+                <a:shade val="63000"/>
+                <a:satMod val="120000"/>
+              </a:schemeClr>
+            </a:gs>
+          </a:gsLst>
+          <a:lin ang="5400000" scaled="0"/>
+        </a:gradFill>
+      </a:bgFillStyleLst>
+    </a:fmtScheme>
+  </a:themeElements>
+  <a:objectDefaults>
+    <a:lnDef>
+      <a:spPr/>
+      <a:bodyPr/>
+      <a:lstStyle/>
+      <a:style>
+        <a:lnRef idx="2">
+          <a:schemeClr val="accent1"/>
+        </a:lnRef>
+        <a:fillRef idx="0">
+          <a:schemeClr val="accent1"/>
+        </a:fillRef>
+        <a:effectRef idx="1">
+          <a:schemeClr val="accent1"/>
+        </a:effectRef>
+        <a:fontRef idx="minor">
+          <a:schemeClr val="tx1"/>
+        </a:fontRef>
+      </a:style>
+    </a:lnDef>
+  </a:objectDefaults>
+  <a:extraClrSchemeLst/>
+  <a:extLst>
+    <a:ext uri="{05A4C25C-085E-4340-85A3-A5531E510DB2}">
+      <thm15:themeFamily xmlns:thm15="http://schemas.microsoft.com/office/thememl/2012/main" name="Office Theme" id="{2E142A2C-CD16-42D6-873A-C26D2A0506FA}" vid="{1BDDFF52-6CD6-40A5-AB3C-68EB2F1E4D0A}"/>
+    </a:ext>
+  </a:extLst>
+</a:theme>
 </file>
</xml_diff>

<commit_message>
[update ppt][lebatruc] - Update pptx
</commit_message>
<xml_diff>
--- a/FederatedLearning.pptx
+++ b/FederatedLearning.pptx
@@ -7643,59 +7643,6 @@
       </p:grpSpPr>
       <p:sp>
         <p:nvSpPr>
-          <p:cNvPr id="2" name="Title 1">
-            <a:extLst>
-              <a:ext uri="{FF2B5EF4-FFF2-40B4-BE49-F238E27FC236}">
-                <a16:creationId xmlns:a16="http://schemas.microsoft.com/office/drawing/2014/main" id="{05FD73B4-E2D3-087B-8BFA-49BA8B9D88D9}"/>
-              </a:ext>
-            </a:extLst>
-          </p:cNvPr>
-          <p:cNvSpPr>
-            <a:spLocks noGrp="1"/>
-          </p:cNvSpPr>
-          <p:nvPr>
-            <p:ph type="title"/>
-          </p:nvPr>
-        </p:nvSpPr>
-        <p:spPr/>
-        <p:txBody>
-          <a:bodyPr/>
-          <a:lstStyle/>
-          <a:p>
-            <a:r>
-              <a:rPr lang="en-US" dirty="0" err="1"/>
-              <a:t>Xây</a:t>
-            </a:r>
-            <a:r>
-              <a:rPr lang="en-US" dirty="0"/>
-              <a:t> </a:t>
-            </a:r>
-            <a:r>
-              <a:rPr lang="en-US" dirty="0" err="1"/>
-              <a:t>dựng</a:t>
-            </a:r>
-            <a:r>
-              <a:rPr lang="en-US" dirty="0"/>
-              <a:t> </a:t>
-            </a:r>
-            <a:r>
-              <a:rPr lang="en-US" dirty="0" err="1"/>
-              <a:t>mô</a:t>
-            </a:r>
-            <a:r>
-              <a:rPr lang="en-US" dirty="0"/>
-              <a:t> </a:t>
-            </a:r>
-            <a:r>
-              <a:rPr lang="en-US" dirty="0" err="1"/>
-              <a:t>hình</a:t>
-            </a:r>
-            <a:endParaRPr lang="en-US" dirty="0"/>
-          </a:p>
-        </p:txBody>
-      </p:sp>
-      <p:sp>
-        <p:nvSpPr>
           <p:cNvPr id="4" name="Slide Number Placeholder 3">
             <a:extLst>
               <a:ext uri="{FF2B5EF4-FFF2-40B4-BE49-F238E27FC236}">
@@ -7855,6 +7802,119 @@
           </a:graphicData>
         </a:graphic>
       </p:graphicFrame>
+      <p:sp>
+        <p:nvSpPr>
+          <p:cNvPr id="6" name="Title 1">
+            <a:extLst>
+              <a:ext uri="{FF2B5EF4-FFF2-40B4-BE49-F238E27FC236}">
+                <a16:creationId xmlns:a16="http://schemas.microsoft.com/office/drawing/2014/main" id="{6FCF35D0-1FB1-FBB9-CE83-4FBBF8216E94}"/>
+              </a:ext>
+            </a:extLst>
+          </p:cNvPr>
+          <p:cNvSpPr txBox="1">
+            <a:spLocks/>
+          </p:cNvSpPr>
+          <p:nvPr/>
+        </p:nvSpPr>
+        <p:spPr>
+          <a:xfrm>
+            <a:off x="84221" y="129969"/>
+            <a:ext cx="8214072" cy="510111"/>
+          </a:xfrm>
+          <a:prstGeom prst="rect">
+            <a:avLst/>
+          </a:prstGeom>
+        </p:spPr>
+        <p:txBody>
+          <a:bodyPr vert="horz" lIns="91440" tIns="45720" rIns="91440" bIns="45720" rtlCol="0" anchor="ctr">
+            <a:normAutofit/>
+          </a:bodyPr>
+          <a:lstStyle>
+            <a:lvl1pPr algn="l" defTabSz="914400" rtl="0" eaLnBrk="1" latinLnBrk="0" hangingPunct="1">
+              <a:lnSpc>
+                <a:spcPct val="90000"/>
+              </a:lnSpc>
+              <a:spcBef>
+                <a:spcPct val="0"/>
+              </a:spcBef>
+              <a:buNone/>
+              <a:defRPr sz="3000" b="1" kern="1200">
+                <a:solidFill>
+                  <a:schemeClr val="accent5">
+                    <a:lumMod val="75000"/>
+                  </a:schemeClr>
+                </a:solidFill>
+                <a:latin typeface="Arial" panose="020B0604020202020204" pitchFamily="34" charset="0"/>
+                <a:ea typeface="+mj-ea"/>
+                <a:cs typeface="Arial" panose="020B0604020202020204" pitchFamily="34" charset="0"/>
+              </a:defRPr>
+            </a:lvl1pPr>
+          </a:lstStyle>
+          <a:p>
+            <a:r>
+              <a:rPr lang="en-US" dirty="0" err="1"/>
+              <a:t>Xây</a:t>
+            </a:r>
+            <a:r>
+              <a:rPr lang="en-US" dirty="0"/>
+              <a:t> </a:t>
+            </a:r>
+            <a:r>
+              <a:rPr lang="en-US" dirty="0" err="1"/>
+              <a:t>dựng</a:t>
+            </a:r>
+            <a:r>
+              <a:rPr lang="en-US" dirty="0"/>
+              <a:t> </a:t>
+            </a:r>
+            <a:r>
+              <a:rPr lang="en-US" dirty="0" err="1"/>
+              <a:t>Chiến</a:t>
+            </a:r>
+            <a:r>
+              <a:rPr lang="en-US" dirty="0"/>
+              <a:t> </a:t>
+            </a:r>
+            <a:r>
+              <a:rPr lang="en-US" dirty="0" err="1"/>
+              <a:t>lược</a:t>
+            </a:r>
+            <a:r>
+              <a:rPr lang="en-US" dirty="0"/>
+              <a:t> </a:t>
+            </a:r>
+            <a:r>
+              <a:rPr lang="en-US" dirty="0" err="1"/>
+              <a:t>tổng</a:t>
+            </a:r>
+            <a:r>
+              <a:rPr lang="en-US" dirty="0"/>
+              <a:t> </a:t>
+            </a:r>
+            <a:r>
+              <a:rPr lang="en-US" dirty="0" err="1"/>
+              <a:t>hợp</a:t>
+            </a:r>
+            <a:r>
+              <a:rPr lang="en-US" dirty="0"/>
+              <a:t> </a:t>
+            </a:r>
+            <a:r>
+              <a:rPr lang="en-US" dirty="0" err="1"/>
+              <a:t>trọng</a:t>
+            </a:r>
+            <a:r>
+              <a:rPr lang="en-US" dirty="0"/>
+              <a:t> </a:t>
+            </a:r>
+            <a:r>
+              <a:rPr lang="en-US" dirty="0" err="1"/>
+              <a:t>số</a:t>
+            </a:r>
+            <a:endParaRPr lang="en-US" dirty="0"/>
+          </a:p>
+        </p:txBody>
+      </p:sp>
     </p:spTree>
     <p:extLst>
       <p:ext uri="{BB962C8B-B14F-4D97-AF65-F5344CB8AC3E}">
@@ -13940,7 +14000,7 @@
             </a:pPr>
             <a:r>
               <a:rPr lang="vi-VN" dirty="0"/>
-              <a:t>Bộ dữ liệu CIC-UNSW-NB15 được phát triển bởi Trung tâm An ninh Mạng của Đại học New South Wales (UNSW) </a:t>
+              <a:t>Bộ dữ liệu UNSW-NB15 được phát triển bởi Trung tâm An ninh Mạng của Đại học New South Wales (UNSW) </a:t>
             </a:r>
             <a:r>
               <a:rPr lang="en-US" dirty="0" err="1"/>
@@ -14085,46 +14145,63 @@
             <a:endParaRPr lang="en-US" dirty="0"/>
           </a:p>
           <a:p>
-            <a:pPr algn="l">
-              <a:spcAft>
-                <a:spcPts val="1875"/>
-              </a:spcAft>
-            </a:pPr>
-            <a:r>
-              <a:rPr lang="vi-VN" b="0" i="0" dirty="0">
-                <a:solidFill>
-                  <a:srgbClr val="2D2D2D"/>
-                </a:solidFill>
-                <a:effectLst/>
-              </a:rPr>
-              <a:t>Để tạo CIC-UNSW-NB15, sử dụng </a:t>
-            </a:r>
-            <a:r>
-              <a:rPr lang="vi-VN" b="0" i="0" u="none" strike="noStrike" dirty="0">
-                <a:solidFill>
-                  <a:srgbClr val="007FA3"/>
-                </a:solidFill>
-                <a:effectLst/>
-                <a:hlinkClick r:id="rId3"/>
-              </a:rPr>
-              <a:t>CICFlowMeter</a:t>
-            </a:r>
-            <a:r>
-              <a:rPr lang="vi-VN" b="0" i="0" dirty="0">
-                <a:solidFill>
-                  <a:srgbClr val="2D2D2D"/>
-                </a:solidFill>
-                <a:effectLst/>
-              </a:rPr>
-              <a:t> để trích xuất bộ tính năng mới từ dữ liệu lưu lượng mạng được UNSW-NB15 thu thập.</a:t>
-            </a:r>
-          </a:p>
-          <a:p>
             <a:r>
               <a:rPr lang="vi-VN" dirty="0"/>
               <a:t>Bao gồm khoảng 2.5 triệu records với 49 features</a:t>
             </a:r>
+            <a:r>
+              <a:rPr lang="en-US" dirty="0"/>
+              <a:t> – UNSW-NB15 (Agus, Bros IDS extract)</a:t>
+            </a:r>
+          </a:p>
+          <a:p>
             <a:endParaRPr lang="en-US" dirty="0"/>
+          </a:p>
+          <a:p>
+            <a:r>
+              <a:rPr lang="en-US" dirty="0"/>
+              <a:t>CIC-UNSW-NB15 </a:t>
+            </a:r>
+            <a:r>
+              <a:rPr lang="en-US" dirty="0" err="1"/>
+              <a:t>sử</a:t>
+            </a:r>
+            <a:r>
+              <a:rPr lang="en-US" dirty="0"/>
+              <a:t> </a:t>
+            </a:r>
+            <a:r>
+              <a:rPr lang="en-US" dirty="0" err="1"/>
+              <a:t>dụng</a:t>
+            </a:r>
+            <a:r>
+              <a:rPr lang="en-US" dirty="0"/>
+              <a:t> </a:t>
+            </a:r>
+            <a:r>
+              <a:rPr lang="en-US" dirty="0" err="1"/>
+              <a:t>CICFlowMeter</a:t>
+            </a:r>
+            <a:r>
+              <a:rPr lang="en-US" dirty="0"/>
+              <a:t> (</a:t>
+            </a:r>
+            <a:r>
+              <a:rPr lang="en-US" b="1" dirty="0"/>
+              <a:t>2024</a:t>
+            </a:r>
+            <a:r>
+              <a:rPr lang="en-US" dirty="0"/>
+              <a:t>) – </a:t>
+            </a:r>
+            <a:r>
+              <a:rPr lang="en-US" dirty="0" err="1"/>
+              <a:t>hơn</a:t>
+            </a:r>
+            <a:r>
+              <a:rPr lang="en-US" dirty="0"/>
+              <a:t> 80 features.</a:t>
+            </a:r>
           </a:p>
           <a:p>
             <a:endParaRPr lang="vi-VN" dirty="0"/>
@@ -14458,7 +14535,7 @@
             </a:r>
             <a:r>
               <a:rPr lang="en-US" dirty="0" err="1"/>
-              <a:t>mô</a:t>
+              <a:t>Chiến</a:t>
             </a:r>
             <a:r>
               <a:rPr lang="en-US" dirty="0"/>
@@ -14466,7 +14543,39 @@
             </a:r>
             <a:r>
               <a:rPr lang="en-US" dirty="0" err="1"/>
-              <a:t>hình</a:t>
+              <a:t>lược</a:t>
+            </a:r>
+            <a:r>
+              <a:rPr lang="en-US" dirty="0"/>
+              <a:t> </a:t>
+            </a:r>
+            <a:r>
+              <a:rPr lang="en-US" dirty="0" err="1"/>
+              <a:t>tổng</a:t>
+            </a:r>
+            <a:r>
+              <a:rPr lang="en-US" dirty="0"/>
+              <a:t> </a:t>
+            </a:r>
+            <a:r>
+              <a:rPr lang="en-US" dirty="0" err="1"/>
+              <a:t>hợp</a:t>
+            </a:r>
+            <a:r>
+              <a:rPr lang="en-US" dirty="0"/>
+              <a:t> </a:t>
+            </a:r>
+            <a:r>
+              <a:rPr lang="en-US" dirty="0" err="1"/>
+              <a:t>trọng</a:t>
+            </a:r>
+            <a:r>
+              <a:rPr lang="en-US" dirty="0"/>
+              <a:t> </a:t>
+            </a:r>
+            <a:r>
+              <a:rPr lang="en-US" dirty="0" err="1"/>
+              <a:t>số</a:t>
             </a:r>
             <a:endParaRPr lang="en-US" dirty="0"/>
           </a:p>
@@ -14817,59 +14926,6 @@
       </p:grpSpPr>
       <p:sp>
         <p:nvSpPr>
-          <p:cNvPr id="2" name="Title 1">
-            <a:extLst>
-              <a:ext uri="{FF2B5EF4-FFF2-40B4-BE49-F238E27FC236}">
-                <a16:creationId xmlns:a16="http://schemas.microsoft.com/office/drawing/2014/main" id="{73BE091E-E0AB-71AB-5A55-9F6AAD490D48}"/>
-              </a:ext>
-            </a:extLst>
-          </p:cNvPr>
-          <p:cNvSpPr>
-            <a:spLocks noGrp="1"/>
-          </p:cNvSpPr>
-          <p:nvPr>
-            <p:ph type="title"/>
-          </p:nvPr>
-        </p:nvSpPr>
-        <p:spPr/>
-        <p:txBody>
-          <a:bodyPr/>
-          <a:lstStyle/>
-          <a:p>
-            <a:r>
-              <a:rPr lang="en-US" dirty="0" err="1"/>
-              <a:t>Xây</a:t>
-            </a:r>
-            <a:r>
-              <a:rPr lang="en-US" dirty="0"/>
-              <a:t> </a:t>
-            </a:r>
-            <a:r>
-              <a:rPr lang="en-US" dirty="0" err="1"/>
-              <a:t>dựng</a:t>
-            </a:r>
-            <a:r>
-              <a:rPr lang="en-US" dirty="0"/>
-              <a:t> </a:t>
-            </a:r>
-            <a:r>
-              <a:rPr lang="en-US" dirty="0" err="1"/>
-              <a:t>mô</a:t>
-            </a:r>
-            <a:r>
-              <a:rPr lang="en-US" dirty="0"/>
-              <a:t> </a:t>
-            </a:r>
-            <a:r>
-              <a:rPr lang="en-US" dirty="0" err="1"/>
-              <a:t>hình</a:t>
-            </a:r>
-            <a:endParaRPr lang="en-US" dirty="0"/>
-          </a:p>
-        </p:txBody>
-      </p:sp>
-      <p:sp>
-        <p:nvSpPr>
           <p:cNvPr id="4" name="Slide Number Placeholder 3">
             <a:extLst>
               <a:ext uri="{FF2B5EF4-FFF2-40B4-BE49-F238E27FC236}">
@@ -15133,6 +15189,96 @@
               <a:latin typeface="Arial" panose="020B0604020202020204" pitchFamily="34" charset="0"/>
               <a:cs typeface="Arial" panose="020B0604020202020204" pitchFamily="34" charset="0"/>
             </a:endParaRPr>
+          </a:p>
+        </p:txBody>
+      </p:sp>
+      <p:sp>
+        <p:nvSpPr>
+          <p:cNvPr id="10" name="Title 1">
+            <a:extLst>
+              <a:ext uri="{FF2B5EF4-FFF2-40B4-BE49-F238E27FC236}">
+                <a16:creationId xmlns:a16="http://schemas.microsoft.com/office/drawing/2014/main" id="{C498BA8E-B995-FD88-635D-6A2E877C16E5}"/>
+              </a:ext>
+            </a:extLst>
+          </p:cNvPr>
+          <p:cNvSpPr>
+            <a:spLocks noGrp="1"/>
+          </p:cNvSpPr>
+          <p:nvPr>
+            <p:ph type="title"/>
+          </p:nvPr>
+        </p:nvSpPr>
+        <p:spPr>
+          <a:xfrm>
+            <a:off x="169946" y="144644"/>
+            <a:ext cx="8214072" cy="510111"/>
+          </a:xfrm>
+        </p:spPr>
+        <p:txBody>
+          <a:bodyPr/>
+          <a:lstStyle/>
+          <a:p>
+            <a:r>
+              <a:rPr lang="en-US" dirty="0" err="1"/>
+              <a:t>Xây</a:t>
+            </a:r>
+            <a:r>
+              <a:rPr lang="en-US" dirty="0"/>
+              <a:t> </a:t>
+            </a:r>
+            <a:r>
+              <a:rPr lang="en-US" dirty="0" err="1"/>
+              <a:t>dựng</a:t>
+            </a:r>
+            <a:r>
+              <a:rPr lang="en-US" dirty="0"/>
+              <a:t> </a:t>
+            </a:r>
+            <a:r>
+              <a:rPr lang="en-US" dirty="0" err="1"/>
+              <a:t>Chiến</a:t>
+            </a:r>
+            <a:r>
+              <a:rPr lang="en-US" dirty="0"/>
+              <a:t> </a:t>
+            </a:r>
+            <a:r>
+              <a:rPr lang="en-US" dirty="0" err="1"/>
+              <a:t>lược</a:t>
+            </a:r>
+            <a:r>
+              <a:rPr lang="en-US" dirty="0"/>
+              <a:t> </a:t>
+            </a:r>
+            <a:r>
+              <a:rPr lang="en-US" dirty="0" err="1"/>
+              <a:t>tổng</a:t>
+            </a:r>
+            <a:r>
+              <a:rPr lang="en-US" dirty="0"/>
+              <a:t> </a:t>
+            </a:r>
+            <a:r>
+              <a:rPr lang="en-US" dirty="0" err="1"/>
+              <a:t>hợp</a:t>
+            </a:r>
+            <a:r>
+              <a:rPr lang="en-US" dirty="0"/>
+              <a:t> </a:t>
+            </a:r>
+            <a:r>
+              <a:rPr lang="en-US" dirty="0" err="1"/>
+              <a:t>trọng</a:t>
+            </a:r>
+            <a:r>
+              <a:rPr lang="en-US" dirty="0"/>
+              <a:t> </a:t>
+            </a:r>
+            <a:r>
+              <a:rPr lang="en-US" dirty="0" err="1"/>
+              <a:t>số</a:t>
+            </a:r>
+            <a:endParaRPr lang="en-US" dirty="0"/>
           </a:p>
         </p:txBody>
       </p:sp>

</xml_diff>